<commit_message>
Dependencies , Technology Stack , Show Stoppers updated
</commit_message>
<xml_diff>
--- a/Documents/terna ppt.pptx
+++ b/Documents/terna ppt.pptx
@@ -114,7 +114,18 @@
   </p:defaultTextStyle>
   <p:extLst>
     <p:ext uri="{EFAFB233-063F-42B5-8137-9DF3F51BA10A}">
-      <p15:sldGuideLst xmlns:p15="http://schemas.microsoft.com/office/powerpoint/2012/main" xmlns=""/>
+      <p15:sldGuideLst xmlns:p15="http://schemas.microsoft.com/office/powerpoint/2012/main">
+        <p15:guide id="1" orient="horz" pos="2160">
+          <p15:clr>
+            <a:srgbClr val="A4A3A4"/>
+          </p15:clr>
+        </p15:guide>
+        <p15:guide id="2" pos="3840">
+          <p15:clr>
+            <a:srgbClr val="A4A3A4"/>
+          </p15:clr>
+        </p15:guide>
+      </p15:sldGuideLst>
     </p:ext>
   </p:extLst>
 </p:presentation>
@@ -266,38 +277,37 @@
           <a:p>
             <a:pPr lvl="0"/>
             <a:r>
-              <a:rPr lang="en-US" smtClean="0"/>
+              <a:rPr lang="en-US"/>
               <a:t>Click to edit Master text styles</a:t>
             </a:r>
           </a:p>
           <a:p>
             <a:pPr lvl="1"/>
             <a:r>
-              <a:rPr lang="en-US" smtClean="0"/>
+              <a:rPr lang="en-US"/>
               <a:t>Second level</a:t>
             </a:r>
           </a:p>
           <a:p>
             <a:pPr lvl="2"/>
             <a:r>
-              <a:rPr lang="en-US" smtClean="0"/>
+              <a:rPr lang="en-US"/>
               <a:t>Third level</a:t>
             </a:r>
           </a:p>
           <a:p>
             <a:pPr lvl="3"/>
             <a:r>
-              <a:rPr lang="en-US" smtClean="0"/>
+              <a:rPr lang="en-US"/>
               <a:t>Fourth level</a:t>
             </a:r>
           </a:p>
           <a:p>
             <a:pPr lvl="4"/>
             <a:r>
-              <a:rPr lang="en-US" smtClean="0"/>
+              <a:rPr lang="en-US"/>
               <a:t>Fifth level</a:t>
             </a:r>
-            <a:endParaRPr lang="en-US"/>
           </a:p>
         </p:txBody>
       </p:sp>
@@ -492,7 +502,7 @@
           <p:cNvPr id="2" name="Title 1">
             <a:extLst>
               <a:ext uri="{FF2B5EF4-FFF2-40B4-BE49-F238E27FC236}">
-                <a16:creationId xmlns:a16="http://schemas.microsoft.com/office/drawing/2014/main" xmlns="" id="{9BAE51D7-305B-4DD8-A2E8-BB526E203E8E}"/>
+                <a16:creationId xmlns:a16="http://schemas.microsoft.com/office/drawing/2014/main" id="{9BAE51D7-305B-4DD8-A2E8-BB526E203E8E}"/>
               </a:ext>
             </a:extLst>
           </p:cNvPr>
@@ -530,7 +540,7 @@
           <p:cNvPr id="3" name="Subtitle 2">
             <a:extLst>
               <a:ext uri="{FF2B5EF4-FFF2-40B4-BE49-F238E27FC236}">
-                <a16:creationId xmlns:a16="http://schemas.microsoft.com/office/drawing/2014/main" xmlns="" id="{8F2BD6C8-963D-413D-83AD-A0AC771F00C2}"/>
+                <a16:creationId xmlns:a16="http://schemas.microsoft.com/office/drawing/2014/main" id="{8F2BD6C8-963D-413D-83AD-A0AC771F00C2}"/>
               </a:ext>
             </a:extLst>
           </p:cNvPr>
@@ -601,7 +611,7 @@
           <p:cNvPr id="4" name="Date Placeholder 3">
             <a:extLst>
               <a:ext uri="{FF2B5EF4-FFF2-40B4-BE49-F238E27FC236}">
-                <a16:creationId xmlns:a16="http://schemas.microsoft.com/office/drawing/2014/main" xmlns="" id="{DDC916B3-C26D-4187-84C8-D7AA2D4F41A1}"/>
+                <a16:creationId xmlns:a16="http://schemas.microsoft.com/office/drawing/2014/main" id="{DDC916B3-C26D-4187-84C8-D7AA2D4F41A1}"/>
               </a:ext>
             </a:extLst>
           </p:cNvPr>
@@ -630,7 +640,7 @@
           <p:cNvPr id="5" name="Footer Placeholder 4">
             <a:extLst>
               <a:ext uri="{FF2B5EF4-FFF2-40B4-BE49-F238E27FC236}">
-                <a16:creationId xmlns:a16="http://schemas.microsoft.com/office/drawing/2014/main" xmlns="" id="{E419BCB6-9AAC-4C7D-BACD-1B2835BE7F92}"/>
+                <a16:creationId xmlns:a16="http://schemas.microsoft.com/office/drawing/2014/main" id="{E419BCB6-9AAC-4C7D-BACD-1B2835BE7F92}"/>
               </a:ext>
             </a:extLst>
           </p:cNvPr>
@@ -655,7 +665,7 @@
           <p:cNvPr id="6" name="Slide Number Placeholder 5">
             <a:extLst>
               <a:ext uri="{FF2B5EF4-FFF2-40B4-BE49-F238E27FC236}">
-                <a16:creationId xmlns:a16="http://schemas.microsoft.com/office/drawing/2014/main" xmlns="" id="{6C7FFE01-CC79-408E-8A3F-A353C38956A3}"/>
+                <a16:creationId xmlns:a16="http://schemas.microsoft.com/office/drawing/2014/main" id="{6C7FFE01-CC79-408E-8A3F-A353C38956A3}"/>
               </a:ext>
             </a:extLst>
           </p:cNvPr>
@@ -714,7 +724,7 @@
           <p:cNvPr id="2" name="Title 1">
             <a:extLst>
               <a:ext uri="{FF2B5EF4-FFF2-40B4-BE49-F238E27FC236}">
-                <a16:creationId xmlns:a16="http://schemas.microsoft.com/office/drawing/2014/main" xmlns="" id="{7FFFB261-40EE-4ED9-BA95-78B7DC7D267D}"/>
+                <a16:creationId xmlns:a16="http://schemas.microsoft.com/office/drawing/2014/main" id="{7FFFB261-40EE-4ED9-BA95-78B7DC7D267D}"/>
               </a:ext>
             </a:extLst>
           </p:cNvPr>
@@ -743,7 +753,7 @@
           <p:cNvPr id="3" name="Vertical Text Placeholder 2">
             <a:extLst>
               <a:ext uri="{FF2B5EF4-FFF2-40B4-BE49-F238E27FC236}">
-                <a16:creationId xmlns:a16="http://schemas.microsoft.com/office/drawing/2014/main" xmlns="" id="{3CCBB90C-19A6-4100-8BDF-7CE624B23C65}"/>
+                <a16:creationId xmlns:a16="http://schemas.microsoft.com/office/drawing/2014/main" id="{3CCBB90C-19A6-4100-8BDF-7CE624B23C65}"/>
               </a:ext>
             </a:extLst>
           </p:cNvPr>
@@ -801,7 +811,7 @@
           <p:cNvPr id="4" name="Date Placeholder 3">
             <a:extLst>
               <a:ext uri="{FF2B5EF4-FFF2-40B4-BE49-F238E27FC236}">
-                <a16:creationId xmlns:a16="http://schemas.microsoft.com/office/drawing/2014/main" xmlns="" id="{BAD0DD6A-49DB-4112-85F6-86E8F9219B13}"/>
+                <a16:creationId xmlns:a16="http://schemas.microsoft.com/office/drawing/2014/main" id="{BAD0DD6A-49DB-4112-85F6-86E8F9219B13}"/>
               </a:ext>
             </a:extLst>
           </p:cNvPr>
@@ -830,7 +840,7 @@
           <p:cNvPr id="5" name="Footer Placeholder 4">
             <a:extLst>
               <a:ext uri="{FF2B5EF4-FFF2-40B4-BE49-F238E27FC236}">
-                <a16:creationId xmlns:a16="http://schemas.microsoft.com/office/drawing/2014/main" xmlns="" id="{F22A1371-6336-466D-B6EB-13FB6271B4DD}"/>
+                <a16:creationId xmlns:a16="http://schemas.microsoft.com/office/drawing/2014/main" id="{F22A1371-6336-466D-B6EB-13FB6271B4DD}"/>
               </a:ext>
             </a:extLst>
           </p:cNvPr>
@@ -855,7 +865,7 @@
           <p:cNvPr id="6" name="Slide Number Placeholder 5">
             <a:extLst>
               <a:ext uri="{FF2B5EF4-FFF2-40B4-BE49-F238E27FC236}">
-                <a16:creationId xmlns:a16="http://schemas.microsoft.com/office/drawing/2014/main" xmlns="" id="{78E9109B-996D-403D-BC57-F5CC6C85150B}"/>
+                <a16:creationId xmlns:a16="http://schemas.microsoft.com/office/drawing/2014/main" id="{78E9109B-996D-403D-BC57-F5CC6C85150B}"/>
               </a:ext>
             </a:extLst>
           </p:cNvPr>
@@ -914,7 +924,7 @@
           <p:cNvPr id="2" name="Vertical Title 1">
             <a:extLst>
               <a:ext uri="{FF2B5EF4-FFF2-40B4-BE49-F238E27FC236}">
-                <a16:creationId xmlns:a16="http://schemas.microsoft.com/office/drawing/2014/main" xmlns="" id="{39D70EF0-691E-41A9-8829-AC60A91453CE}"/>
+                <a16:creationId xmlns:a16="http://schemas.microsoft.com/office/drawing/2014/main" id="{39D70EF0-691E-41A9-8829-AC60A91453CE}"/>
               </a:ext>
             </a:extLst>
           </p:cNvPr>
@@ -948,7 +958,7 @@
           <p:cNvPr id="3" name="Vertical Text Placeholder 2">
             <a:extLst>
               <a:ext uri="{FF2B5EF4-FFF2-40B4-BE49-F238E27FC236}">
-                <a16:creationId xmlns:a16="http://schemas.microsoft.com/office/drawing/2014/main" xmlns="" id="{15D3B5C3-E9DC-4311-B121-CC94C88695AD}"/>
+                <a16:creationId xmlns:a16="http://schemas.microsoft.com/office/drawing/2014/main" id="{15D3B5C3-E9DC-4311-B121-CC94C88695AD}"/>
               </a:ext>
             </a:extLst>
           </p:cNvPr>
@@ -1011,7 +1021,7 @@
           <p:cNvPr id="4" name="Date Placeholder 3">
             <a:extLst>
               <a:ext uri="{FF2B5EF4-FFF2-40B4-BE49-F238E27FC236}">
-                <a16:creationId xmlns:a16="http://schemas.microsoft.com/office/drawing/2014/main" xmlns="" id="{8DF79FEC-77CF-4BAC-9C46-A26D468AFFFB}"/>
+                <a16:creationId xmlns:a16="http://schemas.microsoft.com/office/drawing/2014/main" id="{8DF79FEC-77CF-4BAC-9C46-A26D468AFFFB}"/>
               </a:ext>
             </a:extLst>
           </p:cNvPr>
@@ -1040,7 +1050,7 @@
           <p:cNvPr id="5" name="Footer Placeholder 4">
             <a:extLst>
               <a:ext uri="{FF2B5EF4-FFF2-40B4-BE49-F238E27FC236}">
-                <a16:creationId xmlns:a16="http://schemas.microsoft.com/office/drawing/2014/main" xmlns="" id="{E3B6A8B3-667D-427C-8BF6-C28E66D9B079}"/>
+                <a16:creationId xmlns:a16="http://schemas.microsoft.com/office/drawing/2014/main" id="{E3B6A8B3-667D-427C-8BF6-C28E66D9B079}"/>
               </a:ext>
             </a:extLst>
           </p:cNvPr>
@@ -1065,7 +1075,7 @@
           <p:cNvPr id="6" name="Slide Number Placeholder 5">
             <a:extLst>
               <a:ext uri="{FF2B5EF4-FFF2-40B4-BE49-F238E27FC236}">
-                <a16:creationId xmlns:a16="http://schemas.microsoft.com/office/drawing/2014/main" xmlns="" id="{AABE71C4-5256-4977-BDD4-0983969CADAF}"/>
+                <a16:creationId xmlns:a16="http://schemas.microsoft.com/office/drawing/2014/main" id="{AABE71C4-5256-4977-BDD4-0983969CADAF}"/>
               </a:ext>
             </a:extLst>
           </p:cNvPr>
@@ -1124,7 +1134,7 @@
           <p:cNvPr id="2" name="Title 1">
             <a:extLst>
               <a:ext uri="{FF2B5EF4-FFF2-40B4-BE49-F238E27FC236}">
-                <a16:creationId xmlns:a16="http://schemas.microsoft.com/office/drawing/2014/main" xmlns="" id="{6A9889E2-F14D-44A0-ADE5-1E62C1BFA8B4}"/>
+                <a16:creationId xmlns:a16="http://schemas.microsoft.com/office/drawing/2014/main" id="{6A9889E2-F14D-44A0-ADE5-1E62C1BFA8B4}"/>
               </a:ext>
             </a:extLst>
           </p:cNvPr>
@@ -1153,7 +1163,7 @@
           <p:cNvPr id="3" name="Content Placeholder 2">
             <a:extLst>
               <a:ext uri="{FF2B5EF4-FFF2-40B4-BE49-F238E27FC236}">
-                <a16:creationId xmlns:a16="http://schemas.microsoft.com/office/drawing/2014/main" xmlns="" id="{171C197E-0402-4295-996B-421DB5A282CE}"/>
+                <a16:creationId xmlns:a16="http://schemas.microsoft.com/office/drawing/2014/main" id="{171C197E-0402-4295-996B-421DB5A282CE}"/>
               </a:ext>
             </a:extLst>
           </p:cNvPr>
@@ -1211,7 +1221,7 @@
           <p:cNvPr id="4" name="Date Placeholder 3">
             <a:extLst>
               <a:ext uri="{FF2B5EF4-FFF2-40B4-BE49-F238E27FC236}">
-                <a16:creationId xmlns:a16="http://schemas.microsoft.com/office/drawing/2014/main" xmlns="" id="{686176FA-D347-4525-AF8C-2687A327940A}"/>
+                <a16:creationId xmlns:a16="http://schemas.microsoft.com/office/drawing/2014/main" id="{686176FA-D347-4525-AF8C-2687A327940A}"/>
               </a:ext>
             </a:extLst>
           </p:cNvPr>
@@ -1240,7 +1250,7 @@
           <p:cNvPr id="5" name="Footer Placeholder 4">
             <a:extLst>
               <a:ext uri="{FF2B5EF4-FFF2-40B4-BE49-F238E27FC236}">
-                <a16:creationId xmlns:a16="http://schemas.microsoft.com/office/drawing/2014/main" xmlns="" id="{E627373D-CD13-403D-8309-4EAA77A616E5}"/>
+                <a16:creationId xmlns:a16="http://schemas.microsoft.com/office/drawing/2014/main" id="{E627373D-CD13-403D-8309-4EAA77A616E5}"/>
               </a:ext>
             </a:extLst>
           </p:cNvPr>
@@ -1265,7 +1275,7 @@
           <p:cNvPr id="6" name="Slide Number Placeholder 5">
             <a:extLst>
               <a:ext uri="{FF2B5EF4-FFF2-40B4-BE49-F238E27FC236}">
-                <a16:creationId xmlns:a16="http://schemas.microsoft.com/office/drawing/2014/main" xmlns="" id="{F191C00D-9CD2-47E5-8698-2682735AB6E1}"/>
+                <a16:creationId xmlns:a16="http://schemas.microsoft.com/office/drawing/2014/main" id="{F191C00D-9CD2-47E5-8698-2682735AB6E1}"/>
               </a:ext>
             </a:extLst>
           </p:cNvPr>
@@ -1324,7 +1334,7 @@
           <p:cNvPr id="2" name="Title 1">
             <a:extLst>
               <a:ext uri="{FF2B5EF4-FFF2-40B4-BE49-F238E27FC236}">
-                <a16:creationId xmlns:a16="http://schemas.microsoft.com/office/drawing/2014/main" xmlns="" id="{57651FEC-BCF9-4422-AC1D-8E613C454C19}"/>
+                <a16:creationId xmlns:a16="http://schemas.microsoft.com/office/drawing/2014/main" id="{57651FEC-BCF9-4422-AC1D-8E613C454C19}"/>
               </a:ext>
             </a:extLst>
           </p:cNvPr>
@@ -1362,7 +1372,7 @@
           <p:cNvPr id="3" name="Text Placeholder 2">
             <a:extLst>
               <a:ext uri="{FF2B5EF4-FFF2-40B4-BE49-F238E27FC236}">
-                <a16:creationId xmlns:a16="http://schemas.microsoft.com/office/drawing/2014/main" xmlns="" id="{2B0C989C-B1CA-4606-BEBA-0663C0DB9CA1}"/>
+                <a16:creationId xmlns:a16="http://schemas.microsoft.com/office/drawing/2014/main" id="{2B0C989C-B1CA-4606-BEBA-0663C0DB9CA1}"/>
               </a:ext>
             </a:extLst>
           </p:cNvPr>
@@ -1487,7 +1497,7 @@
           <p:cNvPr id="4" name="Date Placeholder 3">
             <a:extLst>
               <a:ext uri="{FF2B5EF4-FFF2-40B4-BE49-F238E27FC236}">
-                <a16:creationId xmlns:a16="http://schemas.microsoft.com/office/drawing/2014/main" xmlns="" id="{CF28F8AC-686F-4A71-8CDF-D986AE118A24}"/>
+                <a16:creationId xmlns:a16="http://schemas.microsoft.com/office/drawing/2014/main" id="{CF28F8AC-686F-4A71-8CDF-D986AE118A24}"/>
               </a:ext>
             </a:extLst>
           </p:cNvPr>
@@ -1516,7 +1526,7 @@
           <p:cNvPr id="5" name="Footer Placeholder 4">
             <a:extLst>
               <a:ext uri="{FF2B5EF4-FFF2-40B4-BE49-F238E27FC236}">
-                <a16:creationId xmlns:a16="http://schemas.microsoft.com/office/drawing/2014/main" xmlns="" id="{7877B3F1-1D4B-4E04-BBC2-D3FA4EF25F0F}"/>
+                <a16:creationId xmlns:a16="http://schemas.microsoft.com/office/drawing/2014/main" id="{7877B3F1-1D4B-4E04-BBC2-D3FA4EF25F0F}"/>
               </a:ext>
             </a:extLst>
           </p:cNvPr>
@@ -1541,7 +1551,7 @@
           <p:cNvPr id="6" name="Slide Number Placeholder 5">
             <a:extLst>
               <a:ext uri="{FF2B5EF4-FFF2-40B4-BE49-F238E27FC236}">
-                <a16:creationId xmlns:a16="http://schemas.microsoft.com/office/drawing/2014/main" xmlns="" id="{6779DF2D-B3C0-40B6-910F-C032B9EDF8E4}"/>
+                <a16:creationId xmlns:a16="http://schemas.microsoft.com/office/drawing/2014/main" id="{6779DF2D-B3C0-40B6-910F-C032B9EDF8E4}"/>
               </a:ext>
             </a:extLst>
           </p:cNvPr>
@@ -1600,7 +1610,7 @@
           <p:cNvPr id="2" name="Title 1">
             <a:extLst>
               <a:ext uri="{FF2B5EF4-FFF2-40B4-BE49-F238E27FC236}">
-                <a16:creationId xmlns:a16="http://schemas.microsoft.com/office/drawing/2014/main" xmlns="" id="{DFBFEDAE-26C5-4FCE-A7BA-DDBD28FB161B}"/>
+                <a16:creationId xmlns:a16="http://schemas.microsoft.com/office/drawing/2014/main" id="{DFBFEDAE-26C5-4FCE-A7BA-DDBD28FB161B}"/>
               </a:ext>
             </a:extLst>
           </p:cNvPr>
@@ -1629,7 +1639,7 @@
           <p:cNvPr id="3" name="Content Placeholder 2">
             <a:extLst>
               <a:ext uri="{FF2B5EF4-FFF2-40B4-BE49-F238E27FC236}">
-                <a16:creationId xmlns:a16="http://schemas.microsoft.com/office/drawing/2014/main" xmlns="" id="{2F041F28-299E-4C67-9F93-575BD7371060}"/>
+                <a16:creationId xmlns:a16="http://schemas.microsoft.com/office/drawing/2014/main" id="{2F041F28-299E-4C67-9F93-575BD7371060}"/>
               </a:ext>
             </a:extLst>
           </p:cNvPr>
@@ -1692,7 +1702,7 @@
           <p:cNvPr id="4" name="Content Placeholder 3">
             <a:extLst>
               <a:ext uri="{FF2B5EF4-FFF2-40B4-BE49-F238E27FC236}">
-                <a16:creationId xmlns:a16="http://schemas.microsoft.com/office/drawing/2014/main" xmlns="" id="{B0CE9931-B83F-4A01-A3A4-C4D8C0EE263F}"/>
+                <a16:creationId xmlns:a16="http://schemas.microsoft.com/office/drawing/2014/main" id="{B0CE9931-B83F-4A01-A3A4-C4D8C0EE263F}"/>
               </a:ext>
             </a:extLst>
           </p:cNvPr>
@@ -1755,7 +1765,7 @@
           <p:cNvPr id="5" name="Date Placeholder 4">
             <a:extLst>
               <a:ext uri="{FF2B5EF4-FFF2-40B4-BE49-F238E27FC236}">
-                <a16:creationId xmlns:a16="http://schemas.microsoft.com/office/drawing/2014/main" xmlns="" id="{4F9C96A2-E7F0-45A7-A823-8661BFF77933}"/>
+                <a16:creationId xmlns:a16="http://schemas.microsoft.com/office/drawing/2014/main" id="{4F9C96A2-E7F0-45A7-A823-8661BFF77933}"/>
               </a:ext>
             </a:extLst>
           </p:cNvPr>
@@ -1784,7 +1794,7 @@
           <p:cNvPr id="6" name="Footer Placeholder 5">
             <a:extLst>
               <a:ext uri="{FF2B5EF4-FFF2-40B4-BE49-F238E27FC236}">
-                <a16:creationId xmlns:a16="http://schemas.microsoft.com/office/drawing/2014/main" xmlns="" id="{88BD6AA9-EA70-4D31-B659-66D167627948}"/>
+                <a16:creationId xmlns:a16="http://schemas.microsoft.com/office/drawing/2014/main" id="{88BD6AA9-EA70-4D31-B659-66D167627948}"/>
               </a:ext>
             </a:extLst>
           </p:cNvPr>
@@ -1809,7 +1819,7 @@
           <p:cNvPr id="7" name="Slide Number Placeholder 6">
             <a:extLst>
               <a:ext uri="{FF2B5EF4-FFF2-40B4-BE49-F238E27FC236}">
-                <a16:creationId xmlns:a16="http://schemas.microsoft.com/office/drawing/2014/main" xmlns="" id="{6CC755AD-652C-448B-A8B6-775A5F84EE55}"/>
+                <a16:creationId xmlns:a16="http://schemas.microsoft.com/office/drawing/2014/main" id="{6CC755AD-652C-448B-A8B6-775A5F84EE55}"/>
               </a:ext>
             </a:extLst>
           </p:cNvPr>
@@ -1868,7 +1878,7 @@
           <p:cNvPr id="2" name="Title 1">
             <a:extLst>
               <a:ext uri="{FF2B5EF4-FFF2-40B4-BE49-F238E27FC236}">
-                <a16:creationId xmlns:a16="http://schemas.microsoft.com/office/drawing/2014/main" xmlns="" id="{2152CE10-EBDE-45A0-9DBE-8D04E3EC10E2}"/>
+                <a16:creationId xmlns:a16="http://schemas.microsoft.com/office/drawing/2014/main" id="{2152CE10-EBDE-45A0-9DBE-8D04E3EC10E2}"/>
               </a:ext>
             </a:extLst>
           </p:cNvPr>
@@ -1902,7 +1912,7 @@
           <p:cNvPr id="3" name="Text Placeholder 2">
             <a:extLst>
               <a:ext uri="{FF2B5EF4-FFF2-40B4-BE49-F238E27FC236}">
-                <a16:creationId xmlns:a16="http://schemas.microsoft.com/office/drawing/2014/main" xmlns="" id="{FB66022D-91BC-40E0-B287-D46E5E52F1C5}"/>
+                <a16:creationId xmlns:a16="http://schemas.microsoft.com/office/drawing/2014/main" id="{FB66022D-91BC-40E0-B287-D46E5E52F1C5}"/>
               </a:ext>
             </a:extLst>
           </p:cNvPr>
@@ -1973,7 +1983,7 @@
           <p:cNvPr id="4" name="Content Placeholder 3">
             <a:extLst>
               <a:ext uri="{FF2B5EF4-FFF2-40B4-BE49-F238E27FC236}">
-                <a16:creationId xmlns:a16="http://schemas.microsoft.com/office/drawing/2014/main" xmlns="" id="{59A894AF-17A4-4307-A44A-40FCBCDDA6B7}"/>
+                <a16:creationId xmlns:a16="http://schemas.microsoft.com/office/drawing/2014/main" id="{59A894AF-17A4-4307-A44A-40FCBCDDA6B7}"/>
               </a:ext>
             </a:extLst>
           </p:cNvPr>
@@ -2036,7 +2046,7 @@
           <p:cNvPr id="5" name="Text Placeholder 4">
             <a:extLst>
               <a:ext uri="{FF2B5EF4-FFF2-40B4-BE49-F238E27FC236}">
-                <a16:creationId xmlns:a16="http://schemas.microsoft.com/office/drawing/2014/main" xmlns="" id="{BF23285A-D2A1-4902-9065-3EF2A5B54CBE}"/>
+                <a16:creationId xmlns:a16="http://schemas.microsoft.com/office/drawing/2014/main" id="{BF23285A-D2A1-4902-9065-3EF2A5B54CBE}"/>
               </a:ext>
             </a:extLst>
           </p:cNvPr>
@@ -2107,7 +2117,7 @@
           <p:cNvPr id="6" name="Content Placeholder 5">
             <a:extLst>
               <a:ext uri="{FF2B5EF4-FFF2-40B4-BE49-F238E27FC236}">
-                <a16:creationId xmlns:a16="http://schemas.microsoft.com/office/drawing/2014/main" xmlns="" id="{BED61A5D-A179-4C5B-81E3-ED5B41E3A0F8}"/>
+                <a16:creationId xmlns:a16="http://schemas.microsoft.com/office/drawing/2014/main" id="{BED61A5D-A179-4C5B-81E3-ED5B41E3A0F8}"/>
               </a:ext>
             </a:extLst>
           </p:cNvPr>
@@ -2170,7 +2180,7 @@
           <p:cNvPr id="7" name="Date Placeholder 6">
             <a:extLst>
               <a:ext uri="{FF2B5EF4-FFF2-40B4-BE49-F238E27FC236}">
-                <a16:creationId xmlns:a16="http://schemas.microsoft.com/office/drawing/2014/main" xmlns="" id="{CB331CE8-B61C-41DA-A612-29F2C7DC346A}"/>
+                <a16:creationId xmlns:a16="http://schemas.microsoft.com/office/drawing/2014/main" id="{CB331CE8-B61C-41DA-A612-29F2C7DC346A}"/>
               </a:ext>
             </a:extLst>
           </p:cNvPr>
@@ -2199,7 +2209,7 @@
           <p:cNvPr id="8" name="Footer Placeholder 7">
             <a:extLst>
               <a:ext uri="{FF2B5EF4-FFF2-40B4-BE49-F238E27FC236}">
-                <a16:creationId xmlns:a16="http://schemas.microsoft.com/office/drawing/2014/main" xmlns="" id="{D0547763-8BFE-4F98-8CBE-494414FDC27D}"/>
+                <a16:creationId xmlns:a16="http://schemas.microsoft.com/office/drawing/2014/main" id="{D0547763-8BFE-4F98-8CBE-494414FDC27D}"/>
               </a:ext>
             </a:extLst>
           </p:cNvPr>
@@ -2224,7 +2234,7 @@
           <p:cNvPr id="9" name="Slide Number Placeholder 8">
             <a:extLst>
               <a:ext uri="{FF2B5EF4-FFF2-40B4-BE49-F238E27FC236}">
-                <a16:creationId xmlns:a16="http://schemas.microsoft.com/office/drawing/2014/main" xmlns="" id="{5E4534F3-88DF-4719-B2FF-CB7D2C06CF6B}"/>
+                <a16:creationId xmlns:a16="http://schemas.microsoft.com/office/drawing/2014/main" id="{5E4534F3-88DF-4719-B2FF-CB7D2C06CF6B}"/>
               </a:ext>
             </a:extLst>
           </p:cNvPr>
@@ -2283,7 +2293,7 @@
           <p:cNvPr id="2" name="Title 1">
             <a:extLst>
               <a:ext uri="{FF2B5EF4-FFF2-40B4-BE49-F238E27FC236}">
-                <a16:creationId xmlns:a16="http://schemas.microsoft.com/office/drawing/2014/main" xmlns="" id="{AC63379E-9D1B-41EC-9D63-F8BF2C17A6AB}"/>
+                <a16:creationId xmlns:a16="http://schemas.microsoft.com/office/drawing/2014/main" id="{AC63379E-9D1B-41EC-9D63-F8BF2C17A6AB}"/>
               </a:ext>
             </a:extLst>
           </p:cNvPr>
@@ -2312,7 +2322,7 @@
           <p:cNvPr id="3" name="Date Placeholder 2">
             <a:extLst>
               <a:ext uri="{FF2B5EF4-FFF2-40B4-BE49-F238E27FC236}">
-                <a16:creationId xmlns:a16="http://schemas.microsoft.com/office/drawing/2014/main" xmlns="" id="{FA248BC8-8992-4080-A71A-027CD861BE20}"/>
+                <a16:creationId xmlns:a16="http://schemas.microsoft.com/office/drawing/2014/main" id="{FA248BC8-8992-4080-A71A-027CD861BE20}"/>
               </a:ext>
             </a:extLst>
           </p:cNvPr>
@@ -2341,7 +2351,7 @@
           <p:cNvPr id="4" name="Footer Placeholder 3">
             <a:extLst>
               <a:ext uri="{FF2B5EF4-FFF2-40B4-BE49-F238E27FC236}">
-                <a16:creationId xmlns:a16="http://schemas.microsoft.com/office/drawing/2014/main" xmlns="" id="{7BE25585-2A0F-403B-978B-44CDEDA3AEF1}"/>
+                <a16:creationId xmlns:a16="http://schemas.microsoft.com/office/drawing/2014/main" id="{7BE25585-2A0F-403B-978B-44CDEDA3AEF1}"/>
               </a:ext>
             </a:extLst>
           </p:cNvPr>
@@ -2366,7 +2376,7 @@
           <p:cNvPr id="5" name="Slide Number Placeholder 4">
             <a:extLst>
               <a:ext uri="{FF2B5EF4-FFF2-40B4-BE49-F238E27FC236}">
-                <a16:creationId xmlns:a16="http://schemas.microsoft.com/office/drawing/2014/main" xmlns="" id="{CC695F71-F829-416B-A0E9-5A2AFBE55825}"/>
+                <a16:creationId xmlns:a16="http://schemas.microsoft.com/office/drawing/2014/main" id="{CC695F71-F829-416B-A0E9-5A2AFBE55825}"/>
               </a:ext>
             </a:extLst>
           </p:cNvPr>
@@ -2425,7 +2435,7 @@
           <p:cNvPr id="2" name="Date Placeholder 1">
             <a:extLst>
               <a:ext uri="{FF2B5EF4-FFF2-40B4-BE49-F238E27FC236}">
-                <a16:creationId xmlns:a16="http://schemas.microsoft.com/office/drawing/2014/main" xmlns="" id="{73A3DD05-83E5-42E0-A657-0261661A4E4B}"/>
+                <a16:creationId xmlns:a16="http://schemas.microsoft.com/office/drawing/2014/main" id="{73A3DD05-83E5-42E0-A657-0261661A4E4B}"/>
               </a:ext>
             </a:extLst>
           </p:cNvPr>
@@ -2454,7 +2464,7 @@
           <p:cNvPr id="3" name="Footer Placeholder 2">
             <a:extLst>
               <a:ext uri="{FF2B5EF4-FFF2-40B4-BE49-F238E27FC236}">
-                <a16:creationId xmlns:a16="http://schemas.microsoft.com/office/drawing/2014/main" xmlns="" id="{03E47466-AE72-4236-AC5E-5BE8FB2AE256}"/>
+                <a16:creationId xmlns:a16="http://schemas.microsoft.com/office/drawing/2014/main" id="{03E47466-AE72-4236-AC5E-5BE8FB2AE256}"/>
               </a:ext>
             </a:extLst>
           </p:cNvPr>
@@ -2479,7 +2489,7 @@
           <p:cNvPr id="4" name="Slide Number Placeholder 3">
             <a:extLst>
               <a:ext uri="{FF2B5EF4-FFF2-40B4-BE49-F238E27FC236}">
-                <a16:creationId xmlns:a16="http://schemas.microsoft.com/office/drawing/2014/main" xmlns="" id="{BB24F5BE-A287-4EA9-B061-5A80C4299CE4}"/>
+                <a16:creationId xmlns:a16="http://schemas.microsoft.com/office/drawing/2014/main" id="{BB24F5BE-A287-4EA9-B061-5A80C4299CE4}"/>
               </a:ext>
             </a:extLst>
           </p:cNvPr>
@@ -2538,7 +2548,7 @@
           <p:cNvPr id="2" name="Title 1">
             <a:extLst>
               <a:ext uri="{FF2B5EF4-FFF2-40B4-BE49-F238E27FC236}">
-                <a16:creationId xmlns:a16="http://schemas.microsoft.com/office/drawing/2014/main" xmlns="" id="{D4C39B6D-EEA7-45E5-95E6-916DE32F49B1}"/>
+                <a16:creationId xmlns:a16="http://schemas.microsoft.com/office/drawing/2014/main" id="{D4C39B6D-EEA7-45E5-95E6-916DE32F49B1}"/>
               </a:ext>
             </a:extLst>
           </p:cNvPr>
@@ -2576,7 +2586,7 @@
           <p:cNvPr id="3" name="Content Placeholder 2">
             <a:extLst>
               <a:ext uri="{FF2B5EF4-FFF2-40B4-BE49-F238E27FC236}">
-                <a16:creationId xmlns:a16="http://schemas.microsoft.com/office/drawing/2014/main" xmlns="" id="{FC703F8C-EBB5-4CEF-84F8-BCE317B1CA75}"/>
+                <a16:creationId xmlns:a16="http://schemas.microsoft.com/office/drawing/2014/main" id="{FC703F8C-EBB5-4CEF-84F8-BCE317B1CA75}"/>
               </a:ext>
             </a:extLst>
           </p:cNvPr>
@@ -2667,7 +2677,7 @@
           <p:cNvPr id="4" name="Text Placeholder 3">
             <a:extLst>
               <a:ext uri="{FF2B5EF4-FFF2-40B4-BE49-F238E27FC236}">
-                <a16:creationId xmlns:a16="http://schemas.microsoft.com/office/drawing/2014/main" xmlns="" id="{253407BE-45B1-413F-ADD9-6F76AF326B3F}"/>
+                <a16:creationId xmlns:a16="http://schemas.microsoft.com/office/drawing/2014/main" id="{253407BE-45B1-413F-ADD9-6F76AF326B3F}"/>
               </a:ext>
             </a:extLst>
           </p:cNvPr>
@@ -2738,7 +2748,7 @@
           <p:cNvPr id="5" name="Date Placeholder 4">
             <a:extLst>
               <a:ext uri="{FF2B5EF4-FFF2-40B4-BE49-F238E27FC236}">
-                <a16:creationId xmlns:a16="http://schemas.microsoft.com/office/drawing/2014/main" xmlns="" id="{95D7FB6C-4471-48B3-93FC-82D01A8E497D}"/>
+                <a16:creationId xmlns:a16="http://schemas.microsoft.com/office/drawing/2014/main" id="{95D7FB6C-4471-48B3-93FC-82D01A8E497D}"/>
               </a:ext>
             </a:extLst>
           </p:cNvPr>
@@ -2767,7 +2777,7 @@
           <p:cNvPr id="6" name="Footer Placeholder 5">
             <a:extLst>
               <a:ext uri="{FF2B5EF4-FFF2-40B4-BE49-F238E27FC236}">
-                <a16:creationId xmlns:a16="http://schemas.microsoft.com/office/drawing/2014/main" xmlns="" id="{FED7C163-8EB0-44D0-BDDD-BE373FC55377}"/>
+                <a16:creationId xmlns:a16="http://schemas.microsoft.com/office/drawing/2014/main" id="{FED7C163-8EB0-44D0-BDDD-BE373FC55377}"/>
               </a:ext>
             </a:extLst>
           </p:cNvPr>
@@ -2792,7 +2802,7 @@
           <p:cNvPr id="7" name="Slide Number Placeholder 6">
             <a:extLst>
               <a:ext uri="{FF2B5EF4-FFF2-40B4-BE49-F238E27FC236}">
-                <a16:creationId xmlns:a16="http://schemas.microsoft.com/office/drawing/2014/main" xmlns="" id="{41A0AA32-1145-4E98-981F-BA50041DE39C}"/>
+                <a16:creationId xmlns:a16="http://schemas.microsoft.com/office/drawing/2014/main" id="{41A0AA32-1145-4E98-981F-BA50041DE39C}"/>
               </a:ext>
             </a:extLst>
           </p:cNvPr>
@@ -2851,7 +2861,7 @@
           <p:cNvPr id="2" name="Title 1">
             <a:extLst>
               <a:ext uri="{FF2B5EF4-FFF2-40B4-BE49-F238E27FC236}">
-                <a16:creationId xmlns:a16="http://schemas.microsoft.com/office/drawing/2014/main" xmlns="" id="{15C51104-A030-4153-A2E0-704E3A2DE4B7}"/>
+                <a16:creationId xmlns:a16="http://schemas.microsoft.com/office/drawing/2014/main" id="{15C51104-A030-4153-A2E0-704E3A2DE4B7}"/>
               </a:ext>
             </a:extLst>
           </p:cNvPr>
@@ -2889,7 +2899,7 @@
           <p:cNvPr id="3" name="Picture Placeholder 2">
             <a:extLst>
               <a:ext uri="{FF2B5EF4-FFF2-40B4-BE49-F238E27FC236}">
-                <a16:creationId xmlns:a16="http://schemas.microsoft.com/office/drawing/2014/main" xmlns="" id="{F027F777-E774-4460-9CC5-C068B56AADAA}"/>
+                <a16:creationId xmlns:a16="http://schemas.microsoft.com/office/drawing/2014/main" id="{F027F777-E774-4460-9CC5-C068B56AADAA}"/>
               </a:ext>
             </a:extLst>
           </p:cNvPr>
@@ -2956,7 +2966,7 @@
           <p:cNvPr id="4" name="Text Placeholder 3">
             <a:extLst>
               <a:ext uri="{FF2B5EF4-FFF2-40B4-BE49-F238E27FC236}">
-                <a16:creationId xmlns:a16="http://schemas.microsoft.com/office/drawing/2014/main" xmlns="" id="{4B5D0418-6AF5-4696-98BB-0D52F6545F66}"/>
+                <a16:creationId xmlns:a16="http://schemas.microsoft.com/office/drawing/2014/main" id="{4B5D0418-6AF5-4696-98BB-0D52F6545F66}"/>
               </a:ext>
             </a:extLst>
           </p:cNvPr>
@@ -3027,7 +3037,7 @@
           <p:cNvPr id="5" name="Date Placeholder 4">
             <a:extLst>
               <a:ext uri="{FF2B5EF4-FFF2-40B4-BE49-F238E27FC236}">
-                <a16:creationId xmlns:a16="http://schemas.microsoft.com/office/drawing/2014/main" xmlns="" id="{DFD53448-671D-40AA-AB31-2FD409E0A309}"/>
+                <a16:creationId xmlns:a16="http://schemas.microsoft.com/office/drawing/2014/main" id="{DFD53448-671D-40AA-AB31-2FD409E0A309}"/>
               </a:ext>
             </a:extLst>
           </p:cNvPr>
@@ -3056,7 +3066,7 @@
           <p:cNvPr id="6" name="Footer Placeholder 5">
             <a:extLst>
               <a:ext uri="{FF2B5EF4-FFF2-40B4-BE49-F238E27FC236}">
-                <a16:creationId xmlns:a16="http://schemas.microsoft.com/office/drawing/2014/main" xmlns="" id="{8BFB73CB-F6DD-4319-AE9C-ABB003234FE6}"/>
+                <a16:creationId xmlns:a16="http://schemas.microsoft.com/office/drawing/2014/main" id="{8BFB73CB-F6DD-4319-AE9C-ABB003234FE6}"/>
               </a:ext>
             </a:extLst>
           </p:cNvPr>
@@ -3081,7 +3091,7 @@
           <p:cNvPr id="7" name="Slide Number Placeholder 6">
             <a:extLst>
               <a:ext uri="{FF2B5EF4-FFF2-40B4-BE49-F238E27FC236}">
-                <a16:creationId xmlns:a16="http://schemas.microsoft.com/office/drawing/2014/main" xmlns="" id="{A4ACAC2A-BA0F-4C06-878D-71AA56AEE701}"/>
+                <a16:creationId xmlns:a16="http://schemas.microsoft.com/office/drawing/2014/main" id="{A4ACAC2A-BA0F-4C06-878D-71AA56AEE701}"/>
               </a:ext>
             </a:extLst>
           </p:cNvPr>
@@ -3145,7 +3155,7 @@
           <p:cNvPr id="2" name="Title Placeholder 1">
             <a:extLst>
               <a:ext uri="{FF2B5EF4-FFF2-40B4-BE49-F238E27FC236}">
-                <a16:creationId xmlns:a16="http://schemas.microsoft.com/office/drawing/2014/main" xmlns="" id="{BFABCFB0-E316-472B-9B8A-B0383E8606BA}"/>
+                <a16:creationId xmlns:a16="http://schemas.microsoft.com/office/drawing/2014/main" id="{BFABCFB0-E316-472B-9B8A-B0383E8606BA}"/>
               </a:ext>
             </a:extLst>
           </p:cNvPr>
@@ -3184,7 +3194,7 @@
           <p:cNvPr id="3" name="Text Placeholder 2">
             <a:extLst>
               <a:ext uri="{FF2B5EF4-FFF2-40B4-BE49-F238E27FC236}">
-                <a16:creationId xmlns:a16="http://schemas.microsoft.com/office/drawing/2014/main" xmlns="" id="{83080E44-75FF-44F6-9AF5-DB79643E2B85}"/>
+                <a16:creationId xmlns:a16="http://schemas.microsoft.com/office/drawing/2014/main" id="{83080E44-75FF-44F6-9AF5-DB79643E2B85}"/>
               </a:ext>
             </a:extLst>
           </p:cNvPr>
@@ -3252,7 +3262,7 @@
           <p:cNvPr id="4" name="Date Placeholder 3">
             <a:extLst>
               <a:ext uri="{FF2B5EF4-FFF2-40B4-BE49-F238E27FC236}">
-                <a16:creationId xmlns:a16="http://schemas.microsoft.com/office/drawing/2014/main" xmlns="" id="{9F5B0DB0-4BC0-4B3A-B5D4-77F03DF8E55D}"/>
+                <a16:creationId xmlns:a16="http://schemas.microsoft.com/office/drawing/2014/main" id="{9F5B0DB0-4BC0-4B3A-B5D4-77F03DF8E55D}"/>
               </a:ext>
             </a:extLst>
           </p:cNvPr>
@@ -3299,7 +3309,7 @@
           <p:cNvPr id="5" name="Footer Placeholder 4">
             <a:extLst>
               <a:ext uri="{FF2B5EF4-FFF2-40B4-BE49-F238E27FC236}">
-                <a16:creationId xmlns:a16="http://schemas.microsoft.com/office/drawing/2014/main" xmlns="" id="{76B9B652-078E-4DC8-9CBC-9456B920B2FD}"/>
+                <a16:creationId xmlns:a16="http://schemas.microsoft.com/office/drawing/2014/main" id="{76B9B652-078E-4DC8-9CBC-9456B920B2FD}"/>
               </a:ext>
             </a:extLst>
           </p:cNvPr>
@@ -3342,7 +3352,7 @@
           <p:cNvPr id="6" name="Slide Number Placeholder 5">
             <a:extLst>
               <a:ext uri="{FF2B5EF4-FFF2-40B4-BE49-F238E27FC236}">
-                <a16:creationId xmlns:a16="http://schemas.microsoft.com/office/drawing/2014/main" xmlns="" id="{E30CCA17-7EC6-47C3-9715-1C5C4B3533C2}"/>
+                <a16:creationId xmlns:a16="http://schemas.microsoft.com/office/drawing/2014/main" id="{E30CCA17-7EC6-47C3-9715-1C5C4B3533C2}"/>
               </a:ext>
             </a:extLst>
           </p:cNvPr>
@@ -4217,13 +4227,7 @@
               <a:rPr lang="en-IN" sz="2000" dirty="0">
                 <a:sym typeface="+mn-ea"/>
               </a:rPr>
-              <a:t> </a:t>
-            </a:r>
-            <a:r>
-              <a:rPr lang="en-IN" sz="2000" dirty="0" smtClean="0">
-                <a:sym typeface="+mn-ea"/>
-              </a:rPr>
-              <a:t>S-Park.</a:t>
+              <a:t> S-Park.</a:t>
             </a:r>
           </a:p>
           <a:p>
@@ -4231,26 +4235,22 @@
               <a:buNone/>
             </a:pPr>
             <a:r>
-              <a:rPr lang="en-IN" b="1" dirty="0" smtClean="0"/>
+              <a:rPr lang="en-IN" b="1" dirty="0"/>
               <a:t>S-Park is a smart parking system, with a pure vision to eliminate time wastage at parking spaces and increase the security factors.</a:t>
             </a:r>
             <a:r>
               <a:rPr lang="en-US" b="1" dirty="0"/>
-              <a:t> </a:t>
-            </a:r>
-            <a:r>
-              <a:rPr lang="en-US" b="1" dirty="0" smtClean="0"/>
-              <a:t>It helps in reducing human </a:t>
-            </a:r>
-            <a:r>
-              <a:rPr lang="en-US" b="1" dirty="0" err="1" smtClean="0"/>
+              <a:t> It helps in reducing human </a:t>
+            </a:r>
+            <a:r>
+              <a:rPr lang="en-US" b="1" dirty="0" err="1"/>
               <a:t>labour</a:t>
             </a:r>
             <a:r>
-              <a:rPr lang="en-US" b="1" dirty="0" smtClean="0"/>
+              <a:rPr lang="en-US" b="1" dirty="0"/>
               <a:t>, fuel consumption and pollution ensuring the efficiency and reliability of the parking system. </a:t>
             </a:r>
-            <a:endParaRPr lang="en-IN" b="1" dirty="0" smtClean="0">
+            <a:endParaRPr lang="en-IN" b="1" dirty="0">
               <a:sym typeface="+mn-ea"/>
             </a:endParaRPr>
           </a:p>
@@ -4266,13 +4266,6 @@
   <p:clrMapOvr>
     <a:masterClrMapping/>
   </p:clrMapOvr>
-  <p:timing>
-    <p:tnLst>
-      <p:par>
-        <p:cTn id="1" dur="indefinite" restart="never" nodeType="tmRoot"/>
-      </p:par>
-    </p:tnLst>
-  </p:timing>
 </p:sld>
 </file>
 
@@ -4333,7 +4326,7 @@
           <a:p>
             <a:pPr algn="ctr"/>
             <a:r>
-              <a:rPr lang="en-US" sz="2400" b="1" cap="all" dirty="0" smtClean="0">
+              <a:rPr lang="en-US" sz="2400" b="1" cap="all" dirty="0">
                 <a:ln w="0"/>
                 <a:effectLst>
                   <a:reflection blurRad="12700" stA="50000" endPos="50000" dist="5000" dir="5400000" sy="-100000" rotWithShape="0"/>
@@ -4397,7 +4390,7 @@
           <a:p>
             <a:pPr algn="ctr"/>
             <a:r>
-              <a:rPr lang="en-US" dirty="0" smtClean="0">
+              <a:rPr lang="en-US" dirty="0">
                 <a:solidFill>
                   <a:schemeClr val="tx1"/>
                 </a:solidFill>
@@ -4405,7 +4398,7 @@
               <a:t>The automated system will detect the number plate of the vehicle at the entrance and exit(</a:t>
             </a:r>
             <a:r>
-              <a:rPr lang="en-US" dirty="0" err="1" smtClean="0">
+              <a:rPr lang="en-US" dirty="0" err="1">
                 <a:solidFill>
                   <a:schemeClr val="tx1"/>
                 </a:solidFill>
@@ -4413,7 +4406,7 @@
               <a:t>classifiation</a:t>
             </a:r>
             <a:r>
-              <a:rPr lang="en-US" dirty="0" smtClean="0">
+              <a:rPr lang="en-US" dirty="0">
                 <a:solidFill>
                   <a:schemeClr val="tx1"/>
                 </a:solidFill>
@@ -4421,7 +4414,7 @@
               <a:t> </a:t>
             </a:r>
             <a:r>
-              <a:rPr lang="en-US" dirty="0" err="1" smtClean="0">
+              <a:rPr lang="en-US" dirty="0" err="1">
                 <a:solidFill>
                   <a:schemeClr val="tx1"/>
                 </a:solidFill>
@@ -4429,18 +4422,13 @@
               <a:t>algo</a:t>
             </a:r>
             <a:r>
-              <a:rPr lang="en-US" dirty="0" smtClean="0">
+              <a:rPr lang="en-US" dirty="0">
                 <a:solidFill>
                   <a:schemeClr val="tx1"/>
                 </a:solidFill>
               </a:rPr>
               <a:t>)</a:t>
             </a:r>
-            <a:endParaRPr lang="en-US" dirty="0">
-              <a:solidFill>
-                <a:schemeClr val="tx1"/>
-              </a:solidFill>
-            </a:endParaRPr>
           </a:p>
         </p:txBody>
       </p:sp>
@@ -4496,37 +4484,8 @@
                   <a:schemeClr val="tx1"/>
                 </a:solidFill>
               </a:rPr>
-              <a:t>The vehicle type (car, truck</a:t>
-            </a:r>
-            <a:r>
-              <a:rPr lang="en-US" dirty="0" smtClean="0">
-                <a:solidFill>
-                  <a:schemeClr val="tx1"/>
-                </a:solidFill>
-              </a:rPr>
-              <a:t>, two </a:t>
-            </a:r>
-            <a:r>
-              <a:rPr lang="en-US" dirty="0">
-                <a:solidFill>
-                  <a:schemeClr val="tx1"/>
-                </a:solidFill>
-              </a:rPr>
-              <a:t>wheeler) will </a:t>
-            </a:r>
-            <a:r>
-              <a:rPr lang="en-US" dirty="0" smtClean="0">
-                <a:solidFill>
-                  <a:schemeClr val="tx1"/>
-                </a:solidFill>
-              </a:rPr>
-              <a:t>be noted because every type will have a different parking area.</a:t>
-            </a:r>
-            <a:endParaRPr lang="en-US" dirty="0">
-              <a:solidFill>
-                <a:schemeClr val="tx1"/>
-              </a:solidFill>
-            </a:endParaRPr>
+              <a:t>The vehicle type (car, truck, two wheeler) will be noted because every type will have a different parking area.</a:t>
+            </a:r>
           </a:p>
         </p:txBody>
       </p:sp>
@@ -4577,18 +4536,13 @@
           <a:p>
             <a:pPr algn="ctr"/>
             <a:r>
-              <a:rPr lang="en-US" dirty="0" smtClean="0">
+              <a:rPr lang="en-US" dirty="0">
                 <a:solidFill>
                   <a:schemeClr val="tx1"/>
                 </a:solidFill>
               </a:rPr>
               <a:t>The vacant parking spots in each floor will be made visible on site and on the app after which he can move toward his desired floor.(</a:t>
             </a:r>
-            <a:endParaRPr lang="en-US" dirty="0">
-              <a:solidFill>
-                <a:schemeClr val="tx1"/>
-              </a:solidFill>
-            </a:endParaRPr>
           </a:p>
         </p:txBody>
       </p:sp>
@@ -4639,18 +4593,13 @@
           <a:p>
             <a:pPr algn="ctr"/>
             <a:r>
-              <a:rPr lang="en-US" dirty="0" smtClean="0">
+              <a:rPr lang="en-US" dirty="0">
                 <a:solidFill>
                   <a:schemeClr val="tx1"/>
                 </a:solidFill>
               </a:rPr>
               <a:t>The registered users can get direct entry using their registered RFID.</a:t>
             </a:r>
-            <a:endParaRPr lang="en-US" dirty="0">
-              <a:solidFill>
-                <a:schemeClr val="tx1"/>
-              </a:solidFill>
-            </a:endParaRPr>
           </a:p>
         </p:txBody>
       </p:sp>
@@ -4774,7 +4723,7 @@
           <a:p>
             <a:pPr algn="ctr"/>
             <a:r>
-              <a:rPr lang="en-US" sz="2400" b="1" cap="all" spc="0" dirty="0" smtClean="0">
+              <a:rPr lang="en-US" sz="2400" b="1" cap="all" spc="0" dirty="0">
                 <a:ln w="0"/>
                 <a:effectLst>
                   <a:reflection blurRad="12700" stA="50000" endPos="50000" dist="5000" dir="5400000" sy="-100000" rotWithShape="0"/>
@@ -4782,12 +4731,6 @@
               </a:rPr>
               <a:t>parking</a:t>
             </a:r>
-            <a:endParaRPr lang="en-US" sz="2400" b="1" cap="all" spc="0" dirty="0">
-              <a:ln w="0"/>
-              <a:effectLst>
-                <a:reflection blurRad="12700" stA="50000" endPos="50000" dist="5000" dir="5400000" sy="-100000" rotWithShape="0"/>
-              </a:effectLst>
-            </a:endParaRPr>
           </a:p>
         </p:txBody>
       </p:sp>
@@ -4843,18 +4786,13 @@
           <a:p>
             <a:pPr algn="ctr"/>
             <a:r>
-              <a:rPr lang="en-US" dirty="0" smtClean="0">
+              <a:rPr lang="en-US" dirty="0">
                 <a:solidFill>
                   <a:schemeClr val="tx1"/>
                 </a:solidFill>
               </a:rPr>
               <a:t>On the desired floor, the layout of the floor will be displayed (app and LCD on site) with the vacant and occupied highlighted.</a:t>
             </a:r>
-            <a:endParaRPr lang="en-US" dirty="0">
-              <a:solidFill>
-                <a:schemeClr val="tx1"/>
-              </a:solidFill>
-            </a:endParaRPr>
           </a:p>
         </p:txBody>
       </p:sp>
@@ -4910,18 +4848,13 @@
           <a:p>
             <a:pPr algn="ctr"/>
             <a:r>
-              <a:rPr lang="en-US" dirty="0" smtClean="0">
+              <a:rPr lang="en-US" dirty="0">
                 <a:solidFill>
                   <a:schemeClr val="tx1"/>
                 </a:solidFill>
               </a:rPr>
               <a:t>On the app, if he clicks on any empty spot, he will be shown directions to that spot. </a:t>
             </a:r>
-            <a:endParaRPr lang="en-US" dirty="0">
-              <a:solidFill>
-                <a:schemeClr val="tx1"/>
-              </a:solidFill>
-            </a:endParaRPr>
           </a:p>
         </p:txBody>
       </p:sp>
@@ -4977,7 +4910,7 @@
           <a:p>
             <a:pPr algn="ctr"/>
             <a:r>
-              <a:rPr lang="en-US" dirty="0" smtClean="0">
+              <a:rPr lang="en-US" dirty="0">
                 <a:solidFill>
                   <a:schemeClr val="tx1"/>
                 </a:solidFill>
@@ -5027,18 +4960,13 @@
           <a:p>
             <a:pPr algn="ctr"/>
             <a:r>
-              <a:rPr lang="en-US" dirty="0" smtClean="0">
+              <a:rPr lang="en-US" dirty="0">
                 <a:solidFill>
                   <a:schemeClr val="tx1"/>
                 </a:solidFill>
               </a:rPr>
               <a:t>The user can pay at the cash counter on exit, or use PayTm.</a:t>
             </a:r>
-            <a:endParaRPr lang="en-US" dirty="0">
-              <a:solidFill>
-                <a:schemeClr val="tx1"/>
-              </a:solidFill>
-            </a:endParaRPr>
           </a:p>
         </p:txBody>
       </p:sp>
@@ -5052,13 +4980,6 @@
   <p:clrMapOvr>
     <a:masterClrMapping/>
   </p:clrMapOvr>
-  <p:timing>
-    <p:tnLst>
-      <p:par>
-        <p:cTn id="1" dur="indefinite" restart="never" nodeType="tmRoot"/>
-      </p:par>
-    </p:tnLst>
-  </p:timing>
 </p:sld>
 </file>
 
@@ -5087,14 +5008,14 @@
         </p:nvSpPr>
         <p:spPr>
           <a:xfrm>
-            <a:off x="-1" y="96982"/>
-            <a:ext cx="2460171" cy="2895600"/>
+            <a:off x="53150" y="726439"/>
+            <a:ext cx="2878390" cy="2514601"/>
           </a:xfrm>
           <a:prstGeom prst="cloud">
             <a:avLst/>
           </a:prstGeom>
           <a:solidFill>
-            <a:srgbClr val="DA8008"/>
+            <a:srgbClr val="AAAFEE"/>
           </a:solidFill>
         </p:spPr>
         <p:style>
@@ -5119,35 +5040,32 @@
           <a:p>
             <a:pPr algn="ctr"/>
             <a:r>
-              <a:rPr lang="en-US" dirty="0" smtClean="0"/>
+              <a:rPr lang="en-US" dirty="0"/>
               <a:t> </a:t>
             </a:r>
             <a:r>
-              <a:rPr lang="en-US" b="1" dirty="0" smtClean="0">
+              <a:rPr lang="en-US" b="1" dirty="0">
                 <a:solidFill>
                   <a:schemeClr val="tx1"/>
                 </a:solidFill>
               </a:rPr>
-              <a:t>BOOKING SYSTEM.</a:t>
-            </a:r>
-            <a:r>
-              <a:rPr lang="en-US" dirty="0" smtClean="0">
+              <a:t>BOOKING SYSTEM</a:t>
+            </a:r>
+            <a:endParaRPr lang="en-US" dirty="0">
+              <a:solidFill>
+                <a:schemeClr val="tx1"/>
+              </a:solidFill>
+            </a:endParaRPr>
+          </a:p>
+          <a:p>
+            <a:pPr algn="ctr"/>
+            <a:r>
+              <a:rPr lang="en-US" dirty="0">
                 <a:solidFill>
                   <a:schemeClr val="tx1"/>
                 </a:solidFill>
               </a:rPr>
-              <a:t> </a:t>
-            </a:r>
-          </a:p>
-          <a:p>
-            <a:pPr algn="ctr"/>
-            <a:r>
-              <a:rPr lang="en-US" dirty="0" smtClean="0">
-                <a:solidFill>
-                  <a:schemeClr val="tx1"/>
-                </a:solidFill>
-              </a:rPr>
-              <a:t>(The user can book his parking slot when he is within 20 meters radius).</a:t>
+              <a:t>The user can book his parking slot when he is in queue</a:t>
             </a:r>
           </a:p>
         </p:txBody>
@@ -5160,17 +5078,14 @@
         </p:nvSpPr>
         <p:spPr>
           <a:xfrm>
-            <a:off x="3203971" y="4329544"/>
+            <a:off x="4215448" y="3732796"/>
             <a:ext cx="3089564" cy="2840181"/>
           </a:xfrm>
           <a:prstGeom prst="cloud">
             <a:avLst/>
           </a:prstGeom>
           <a:solidFill>
-            <a:schemeClr val="tx2">
-              <a:lumMod val="40000"/>
-              <a:lumOff val="60000"/>
-            </a:schemeClr>
+            <a:srgbClr val="AAAFEE"/>
           </a:solidFill>
         </p:spPr>
         <p:style>
@@ -5195,23 +5110,18 @@
           <a:p>
             <a:pPr algn="ctr"/>
             <a:r>
-              <a:rPr lang="en-US" b="1" dirty="0" smtClean="0">
+              <a:rPr lang="en-US" b="1" dirty="0">
                 <a:solidFill>
                   <a:schemeClr val="tx1"/>
                 </a:solidFill>
               </a:rPr>
-              <a:t> LIGHTING SYSTEM.</a:t>
-            </a:r>
-            <a:endParaRPr lang="en-US" b="1" dirty="0">
-              <a:solidFill>
-                <a:schemeClr val="tx1"/>
-              </a:solidFill>
-            </a:endParaRPr>
+              <a:t> LIGHTING SYSTEM</a:t>
+            </a:r>
           </a:p>
           <a:p>
             <a:pPr algn="ctr"/>
             <a:r>
-              <a:rPr lang="en-US" dirty="0" smtClean="0">
+              <a:rPr lang="en-US" dirty="0">
                 <a:solidFill>
                   <a:schemeClr val="tx1"/>
                 </a:solidFill>
@@ -5222,7 +5132,7 @@
           <a:p>
             <a:pPr algn="ctr"/>
             <a:r>
-              <a:rPr lang="en-US" dirty="0" smtClean="0">
+              <a:rPr lang="en-US" dirty="0">
                 <a:solidFill>
                   <a:schemeClr val="tx1"/>
                 </a:solidFill>
@@ -5233,21 +5143,13 @@
           <a:p>
             <a:pPr algn="ctr"/>
             <a:r>
-              <a:rPr lang="en-US" dirty="0" smtClean="0">
+              <a:rPr lang="en-US" dirty="0">
                 <a:solidFill>
                   <a:schemeClr val="tx1"/>
                 </a:solidFill>
               </a:rPr>
-              <a:t>Green-Vacant.</a:t>
-            </a:r>
-          </a:p>
-          <a:p>
-            <a:pPr algn="ctr"/>
-            <a:endParaRPr lang="en-US" dirty="0" smtClean="0">
-              <a:solidFill>
-                <a:schemeClr val="tx1"/>
-              </a:solidFill>
-            </a:endParaRPr>
+              <a:t>Green-Vacant</a:t>
+            </a:r>
           </a:p>
         </p:txBody>
       </p:sp>
@@ -5259,17 +5161,14 @@
         </p:nvSpPr>
         <p:spPr>
           <a:xfrm>
-            <a:off x="6366164" y="4294907"/>
-            <a:ext cx="2701636" cy="2895600"/>
+            <a:off x="7650820" y="3492669"/>
+            <a:ext cx="3545500" cy="2591031"/>
           </a:xfrm>
           <a:prstGeom prst="cloud">
             <a:avLst/>
           </a:prstGeom>
           <a:solidFill>
-            <a:schemeClr val="tx2">
-              <a:lumMod val="40000"/>
-              <a:lumOff val="60000"/>
-            </a:schemeClr>
+            <a:srgbClr val="E46A81"/>
           </a:solidFill>
         </p:spPr>
         <p:style>
@@ -5294,7 +5193,7 @@
           <a:p>
             <a:pPr algn="ctr"/>
             <a:r>
-              <a:rPr lang="en-US" b="1" dirty="0" smtClean="0">
+              <a:rPr lang="en-US" b="1" dirty="0">
                 <a:solidFill>
                   <a:schemeClr val="tx1"/>
                 </a:solidFill>
@@ -5305,12 +5204,12 @@
           <a:p>
             <a:pPr algn="ctr"/>
             <a:r>
-              <a:rPr lang="en-US" dirty="0" smtClean="0">
+              <a:rPr lang="en-US" dirty="0">
                 <a:solidFill>
                   <a:schemeClr val="tx1"/>
                 </a:solidFill>
               </a:rPr>
-              <a:t>When no vehicles in motion are detected, the lights will dim which saves energy.</a:t>
+              <a:t>When no vehicles in motion are detected(using radar sensor), the lights will dim which saves energy</a:t>
             </a:r>
           </a:p>
         </p:txBody>
@@ -5323,17 +5222,14 @@
         </p:nvSpPr>
         <p:spPr>
           <a:xfrm>
-            <a:off x="-1" y="3422072"/>
-            <a:ext cx="3131127" cy="2895600"/>
+            <a:off x="598452" y="3730927"/>
+            <a:ext cx="3225403" cy="2840181"/>
           </a:xfrm>
           <a:prstGeom prst="cloud">
             <a:avLst/>
           </a:prstGeom>
           <a:solidFill>
-            <a:schemeClr val="tx2">
-              <a:lumMod val="40000"/>
-              <a:lumOff val="60000"/>
-            </a:schemeClr>
+            <a:srgbClr val="E46A81"/>
           </a:solidFill>
         </p:spPr>
         <p:style>
@@ -5358,50 +5254,47 @@
           <a:p>
             <a:pPr algn="ctr"/>
             <a:r>
-              <a:rPr lang="en-US" dirty="0" smtClean="0"/>
+              <a:rPr lang="en-US" dirty="0"/>
               <a:t> </a:t>
             </a:r>
             <a:r>
-              <a:rPr lang="en-US" b="1" dirty="0" smtClean="0">
+              <a:rPr lang="en-US" b="1" dirty="0">
                 <a:solidFill>
                   <a:schemeClr val="tx1"/>
                 </a:solidFill>
               </a:rPr>
-              <a:t>PARKING ALLOCATION.</a:t>
+              <a:t>PARKING ALLOCATION</a:t>
             </a:r>
           </a:p>
           <a:p>
             <a:pPr algn="ctr"/>
             <a:r>
-              <a:rPr lang="en-US" dirty="0" smtClean="0">
+              <a:rPr lang="en-US" dirty="0">
                 <a:solidFill>
                   <a:schemeClr val="tx1"/>
                 </a:solidFill>
               </a:rPr>
-              <a:t>Every type of vehicle will have its own parking area. Electric cars will have slots with the charging segment.</a:t>
-            </a:r>
-          </a:p>
-        </p:txBody>
-      </p:sp>
-      <p:sp>
-        <p:nvSpPr>
-          <p:cNvPr id="10" name="Cloud 9"/>
+              <a:t>Every type of vehicle will have its own parking area. Electric cars will have slots with the charging segment</a:t>
+            </a:r>
+          </a:p>
+        </p:txBody>
+      </p:sp>
+      <p:sp>
+        <p:nvSpPr>
+          <p:cNvPr id="11" name="Cloud 10"/>
           <p:cNvSpPr/>
           <p:nvPr/>
         </p:nvSpPr>
         <p:spPr>
           <a:xfrm>
-            <a:off x="9387443" y="3117273"/>
-            <a:ext cx="2460171" cy="2895600"/>
+            <a:off x="8865393" y="265234"/>
+            <a:ext cx="3255817" cy="2975806"/>
           </a:xfrm>
           <a:prstGeom prst="cloud">
             <a:avLst/>
           </a:prstGeom>
           <a:solidFill>
-            <a:schemeClr val="tx2">
-              <a:lumMod val="40000"/>
-              <a:lumOff val="60000"/>
-            </a:schemeClr>
+            <a:srgbClr val="AAAFEE"/>
           </a:solidFill>
         </p:spPr>
         <p:style>
@@ -5426,50 +5319,47 @@
           <a:p>
             <a:pPr algn="ctr"/>
             <a:r>
-              <a:rPr lang="en-US" b="1" dirty="0" smtClean="0">
+              <a:rPr lang="en-US" dirty="0"/>
+              <a:t> </a:t>
+            </a:r>
+            <a:r>
+              <a:rPr lang="en-US" b="1" dirty="0">
                 <a:solidFill>
                   <a:schemeClr val="tx1"/>
                 </a:solidFill>
               </a:rPr>
-              <a:t>BEEP SYSTEM.</a:t>
-            </a:r>
-            <a:r>
-              <a:rPr lang="en-US" dirty="0" smtClean="0"/>
-              <a:t> </a:t>
+              <a:t>EASY ACCESS</a:t>
             </a:r>
           </a:p>
           <a:p>
             <a:pPr algn="ctr"/>
             <a:r>
-              <a:rPr lang="en-US" dirty="0" smtClean="0">
+              <a:rPr lang="en-US" dirty="0">
                 <a:solidFill>
                   <a:schemeClr val="tx1"/>
                 </a:solidFill>
               </a:rPr>
-              <a:t>If the car is  not parked properly (slanted), the beep system will indicate the same.</a:t>
-            </a:r>
-          </a:p>
-        </p:txBody>
-      </p:sp>
-      <p:sp>
-        <p:nvSpPr>
-          <p:cNvPr id="11" name="Cloud 10"/>
+              <a:t>The user can locate his vehicle by entering the number plate details in the app and they will be provided by the shortest path</a:t>
+            </a:r>
+          </a:p>
+        </p:txBody>
+      </p:sp>
+      <p:sp>
+        <p:nvSpPr>
+          <p:cNvPr id="12" name="Oval 11"/>
           <p:cNvSpPr/>
           <p:nvPr/>
         </p:nvSpPr>
         <p:spPr>
           <a:xfrm>
-            <a:off x="8272154" y="-152400"/>
-            <a:ext cx="3255817" cy="3394364"/>
+            <a:off x="3546764" y="401782"/>
+            <a:ext cx="3643745" cy="1143000"/>
           </a:xfrm>
-          <a:prstGeom prst="cloud">
+          <a:prstGeom prst="ellipse">
             <a:avLst/>
           </a:prstGeom>
           <a:solidFill>
-            <a:schemeClr val="tx2">
-              <a:lumMod val="40000"/>
-              <a:lumOff val="60000"/>
-            </a:schemeClr>
+            <a:srgbClr val="FFC000"/>
           </a:solidFill>
         </p:spPr>
         <p:style>
@@ -5494,80 +5384,13 @@
           <a:p>
             <a:pPr algn="ctr"/>
             <a:r>
-              <a:rPr lang="en-US" dirty="0" smtClean="0"/>
-              <a:t> </a:t>
-            </a:r>
-            <a:r>
-              <a:rPr lang="en-US" b="1" dirty="0" smtClean="0">
+              <a:rPr lang="en-US" sz="2400" b="1" dirty="0">
                 <a:solidFill>
                   <a:schemeClr val="tx1"/>
                 </a:solidFill>
               </a:rPr>
-              <a:t>EASY ACCESS.</a:t>
-            </a:r>
-          </a:p>
-          <a:p>
-            <a:pPr algn="ctr"/>
-            <a:r>
-              <a:rPr lang="en-US" dirty="0" smtClean="0">
-                <a:solidFill>
-                  <a:schemeClr val="tx1"/>
-                </a:solidFill>
-              </a:rPr>
-              <a:t>At the exit, the user has to enter his car number plate(app or on site), and the system will provide the slot number where the car is parked.</a:t>
-            </a:r>
-          </a:p>
-        </p:txBody>
-      </p:sp>
-      <p:sp>
-        <p:nvSpPr>
-          <p:cNvPr id="12" name="Oval 11"/>
-          <p:cNvSpPr/>
-          <p:nvPr/>
-        </p:nvSpPr>
-        <p:spPr>
-          <a:xfrm>
-            <a:off x="3546764" y="401782"/>
-            <a:ext cx="3643745" cy="1143000"/>
-          </a:xfrm>
-          <a:prstGeom prst="ellipse">
-            <a:avLst/>
-          </a:prstGeom>
-        </p:spPr>
-        <p:style>
-          <a:lnRef idx="2">
-            <a:schemeClr val="accent1">
-              <a:shade val="50000"/>
-            </a:schemeClr>
-          </a:lnRef>
-          <a:fillRef idx="1">
-            <a:schemeClr val="accent1"/>
-          </a:fillRef>
-          <a:effectRef idx="0">
-            <a:schemeClr val="accent1"/>
-          </a:effectRef>
-          <a:fontRef idx="minor">
-            <a:schemeClr val="lt1"/>
-          </a:fontRef>
-        </p:style>
-        <p:txBody>
-          <a:bodyPr rtlCol="0" anchor="ctr"/>
-          <a:lstStyle/>
-          <a:p>
-            <a:pPr algn="ctr"/>
-            <a:r>
-              <a:rPr lang="en-US" b="1" dirty="0" smtClean="0">
-                <a:solidFill>
-                  <a:schemeClr val="tx1"/>
-                </a:solidFill>
-              </a:rPr>
               <a:t>SHOWSTOPPERS</a:t>
             </a:r>
-            <a:endParaRPr lang="en-US" b="1" dirty="0">
-              <a:solidFill>
-                <a:schemeClr val="tx1"/>
-              </a:solidFill>
-            </a:endParaRPr>
           </a:p>
         </p:txBody>
       </p:sp>
@@ -5575,15 +5398,15 @@
         <p:nvCxnSpPr>
           <p:cNvPr id="14" name="Straight Arrow Connector 13"/>
           <p:cNvCxnSpPr>
+            <a:cxnSpLocks/>
             <a:stCxn id="12" idx="2"/>
-            <a:endCxn id="6" idx="0"/>
           </p:cNvCxnSpPr>
           <p:nvPr/>
         </p:nvCxnSpPr>
         <p:spPr>
           <a:xfrm flipH="1">
-            <a:off x="2458120" y="973282"/>
-            <a:ext cx="1088644" cy="571500"/>
+            <a:off x="2768430" y="973282"/>
+            <a:ext cx="778334" cy="404112"/>
           </a:xfrm>
           <a:prstGeom prst="straightConnector1">
             <a:avLst/>
@@ -5611,15 +5434,16 @@
         <p:nvCxnSpPr>
           <p:cNvPr id="18" name="Straight Arrow Connector 17"/>
           <p:cNvCxnSpPr>
-            <a:stCxn id="12" idx="3"/>
+            <a:cxnSpLocks/>
+            <a:stCxn id="12" idx="4"/>
             <a:endCxn id="7" idx="3"/>
           </p:cNvCxnSpPr>
           <p:nvPr/>
         </p:nvCxnSpPr>
         <p:spPr>
           <a:xfrm>
-            <a:off x="4080378" y="1377394"/>
-            <a:ext cx="668375" cy="3114540"/>
+            <a:off x="5368637" y="1544782"/>
+            <a:ext cx="391593" cy="2350404"/>
           </a:xfrm>
           <a:prstGeom prst="straightConnector1">
             <a:avLst/>
@@ -5647,6 +5471,7 @@
         <p:nvCxnSpPr>
           <p:cNvPr id="20" name="Straight Arrow Connector 19"/>
           <p:cNvCxnSpPr>
+            <a:cxnSpLocks/>
             <a:stCxn id="12" idx="5"/>
             <a:endCxn id="8" idx="3"/>
           </p:cNvCxnSpPr>
@@ -5655,42 +5480,7 @@
         <p:spPr>
           <a:xfrm>
             <a:off x="6656895" y="1377394"/>
-            <a:ext cx="1060087" cy="3083072"/>
-          </a:xfrm>
-          <a:prstGeom prst="straightConnector1">
-            <a:avLst/>
-          </a:prstGeom>
-          <a:ln>
-            <a:tailEnd type="arrow"/>
-          </a:ln>
-        </p:spPr>
-        <p:style>
-          <a:lnRef idx="1">
-            <a:schemeClr val="accent1"/>
-          </a:lnRef>
-          <a:fillRef idx="0">
-            <a:schemeClr val="accent1"/>
-          </a:fillRef>
-          <a:effectRef idx="0">
-            <a:schemeClr val="accent1"/>
-          </a:effectRef>
-          <a:fontRef idx="minor">
-            <a:schemeClr val="tx1"/>
-          </a:fontRef>
-        </p:style>
-      </p:cxnSp>
-      <p:cxnSp>
-        <p:nvCxnSpPr>
-          <p:cNvPr id="22" name="Straight Arrow Connector 21"/>
-          <p:cNvCxnSpPr>
-            <a:stCxn id="12" idx="5"/>
-          </p:cNvCxnSpPr>
-          <p:nvPr/>
-        </p:nvCxnSpPr>
-        <p:spPr>
-          <a:xfrm>
-            <a:off x="6656895" y="1377394"/>
-            <a:ext cx="3013578" cy="2266351"/>
+            <a:ext cx="2766675" cy="2263420"/>
           </a:xfrm>
           <a:prstGeom prst="straightConnector1">
             <a:avLst/>
@@ -5718,14 +5508,16 @@
         <p:nvCxnSpPr>
           <p:cNvPr id="24" name="Straight Arrow Connector 23"/>
           <p:cNvCxnSpPr>
+            <a:cxnSpLocks/>
             <a:stCxn id="12" idx="6"/>
+            <a:endCxn id="11" idx="2"/>
           </p:cNvCxnSpPr>
           <p:nvPr/>
         </p:nvCxnSpPr>
         <p:spPr>
-          <a:xfrm flipV="1">
-            <a:off x="7190509" y="789709"/>
-            <a:ext cx="1357746" cy="183573"/>
+          <a:xfrm>
+            <a:off x="7190509" y="973282"/>
+            <a:ext cx="1684983" cy="779855"/>
           </a:xfrm>
           <a:prstGeom prst="straightConnector1">
             <a:avLst/>
@@ -5753,14 +5545,16 @@
         <p:nvCxnSpPr>
           <p:cNvPr id="29" name="Straight Arrow Connector 28"/>
           <p:cNvCxnSpPr>
+            <a:cxnSpLocks/>
             <a:stCxn id="12" idx="3"/>
+            <a:endCxn id="9" idx="3"/>
           </p:cNvCxnSpPr>
           <p:nvPr/>
         </p:nvCxnSpPr>
         <p:spPr>
           <a:xfrm flipH="1">
-            <a:off x="2632364" y="1377394"/>
-            <a:ext cx="1448014" cy="2141661"/>
+            <a:off x="2211154" y="1377394"/>
+            <a:ext cx="1869224" cy="2515923"/>
           </a:xfrm>
           <a:prstGeom prst="straightConnector1">
             <a:avLst/>
@@ -5794,13 +5588,6 @@
   <p:clrMapOvr>
     <a:masterClrMapping/>
   </p:clrMapOvr>
-  <p:timing>
-    <p:tnLst>
-      <p:par>
-        <p:cTn id="1" dur="indefinite" restart="never" nodeType="tmRoot"/>
-      </p:par>
-    </p:tnLst>
-  </p:timing>
 </p:sld>
 </file>
 
@@ -5846,18 +5633,13 @@
           <a:lstStyle/>
           <a:p>
             <a:r>
-              <a:rPr lang="en-US" b="1" dirty="0" smtClean="0">
+              <a:rPr lang="en-US" b="1" dirty="0">
                 <a:solidFill>
                   <a:schemeClr val="bg1"/>
                 </a:solidFill>
               </a:rPr>
               <a:t>REGISTERED USERS BENEFITS:</a:t>
             </a:r>
-            <a:endParaRPr lang="en-US" b="1" dirty="0">
-              <a:solidFill>
-                <a:schemeClr val="bg1"/>
-              </a:solidFill>
-            </a:endParaRPr>
           </a:p>
         </p:txBody>
       </p:sp>
@@ -5869,7 +5651,7 @@
         </p:nvSpPr>
         <p:spPr>
           <a:xfrm>
-            <a:off x="0" y="369332"/>
+            <a:off x="0" y="328692"/>
             <a:ext cx="6137564" cy="3139321"/>
           </a:xfrm>
           <a:prstGeom prst="rect">
@@ -5888,42 +5670,8 @@
               <a:buChar char="q"/>
             </a:pPr>
             <a:r>
-              <a:rPr lang="en-US" dirty="0" smtClean="0"/>
+              <a:rPr lang="en-US" dirty="0"/>
               <a:t>Fixed parking spot.</a:t>
-            </a:r>
-          </a:p>
-          <a:p>
-            <a:pPr marL="285750" indent="-285750">
-              <a:buFont typeface="Wingdings" pitchFamily="2" charset="2"/>
-              <a:buChar char="q"/>
-            </a:pPr>
-            <a:endParaRPr lang="en-US" dirty="0" smtClean="0"/>
-          </a:p>
-          <a:p>
-            <a:pPr marL="285750" indent="-285750">
-              <a:buFont typeface="Wingdings" pitchFamily="2" charset="2"/>
-              <a:buChar char="q"/>
-            </a:pPr>
-            <a:r>
-              <a:rPr lang="en-US" dirty="0" smtClean="0"/>
-              <a:t>Monthly payment. (For the time, the parking slot was used)</a:t>
-            </a:r>
-          </a:p>
-          <a:p>
-            <a:pPr marL="285750" indent="-285750">
-              <a:buFont typeface="Wingdings" pitchFamily="2" charset="2"/>
-              <a:buChar char="q"/>
-            </a:pPr>
-            <a:endParaRPr lang="en-US" dirty="0" smtClean="0"/>
-          </a:p>
-          <a:p>
-            <a:pPr marL="285750" indent="-285750">
-              <a:buFont typeface="Wingdings" pitchFamily="2" charset="2"/>
-              <a:buChar char="q"/>
-            </a:pPr>
-            <a:r>
-              <a:rPr lang="en-US" dirty="0" smtClean="0"/>
-              <a:t>Net banking. (Automatically money deducted).</a:t>
             </a:r>
           </a:p>
           <a:p>
@@ -5939,8 +5687,8 @@
               <a:buChar char="q"/>
             </a:pPr>
             <a:r>
-              <a:rPr lang="en-US" dirty="0" smtClean="0"/>
-              <a:t>All the visit details (entry and exit time) will be visible to him at all times.</a:t>
+              <a:rPr lang="en-US" dirty="0"/>
+              <a:t>Monthly payment. (For the time, the parking slot was used)</a:t>
             </a:r>
           </a:p>
           <a:p>
@@ -5956,7 +5704,41 @@
               <a:buChar char="q"/>
             </a:pPr>
             <a:r>
-              <a:rPr lang="en-US" dirty="0" smtClean="0"/>
+              <a:rPr lang="en-US" dirty="0"/>
+              <a:t>Net banking. (Automatically money deducted).</a:t>
+            </a:r>
+          </a:p>
+          <a:p>
+            <a:pPr marL="285750" indent="-285750">
+              <a:buFont typeface="Wingdings" pitchFamily="2" charset="2"/>
+              <a:buChar char="q"/>
+            </a:pPr>
+            <a:endParaRPr lang="en-US" dirty="0"/>
+          </a:p>
+          <a:p>
+            <a:pPr marL="285750" indent="-285750">
+              <a:buFont typeface="Wingdings" pitchFamily="2" charset="2"/>
+              <a:buChar char="q"/>
+            </a:pPr>
+            <a:r>
+              <a:rPr lang="en-US" dirty="0"/>
+              <a:t>All the visit details (entry and exit time) will be visible to him at all times.</a:t>
+            </a:r>
+          </a:p>
+          <a:p>
+            <a:pPr marL="285750" indent="-285750">
+              <a:buFont typeface="Wingdings" pitchFamily="2" charset="2"/>
+              <a:buChar char="q"/>
+            </a:pPr>
+            <a:endParaRPr lang="en-US" dirty="0"/>
+          </a:p>
+          <a:p>
+            <a:pPr marL="285750" indent="-285750">
+              <a:buFont typeface="Wingdings" pitchFamily="2" charset="2"/>
+              <a:buChar char="q"/>
+            </a:pPr>
+            <a:r>
+              <a:rPr lang="en-US" dirty="0"/>
               <a:t> If his slot gets occupied by someone else, the admin will be notified immediately.</a:t>
             </a:r>
           </a:p>
@@ -5970,8 +5752,8 @@
         </p:nvSpPr>
         <p:spPr>
           <a:xfrm>
-            <a:off x="0" y="3508653"/>
-            <a:ext cx="7038109" cy="3139321"/>
+            <a:off x="1" y="3508652"/>
+            <a:ext cx="6137564" cy="2985433"/>
           </a:xfrm>
           <a:prstGeom prst="rect">
             <a:avLst/>
@@ -5986,7 +5768,12 @@
           <a:p>
             <a:pPr algn="ctr"/>
             <a:r>
-              <a:rPr lang="en-IN" b="1" dirty="0" smtClean="0">
+              <a:rPr lang="en-IN" sz="2400" b="1" i="1" u="sng" dirty="0">
+                <a:solidFill>
+                  <a:schemeClr val="accent5">
+                    <a:lumMod val="75000"/>
+                  </a:schemeClr>
+                </a:solidFill>
                 <a:latin typeface="Calibri" panose="020F0502020204030204" pitchFamily="34" charset="0"/>
                 <a:cs typeface="Calibri" panose="020F0502020204030204" pitchFamily="34" charset="0"/>
                 <a:sym typeface="+mn-ea"/>
@@ -5995,21 +5782,20 @@
             </a:r>
           </a:p>
           <a:p>
-            <a:r>
-              <a:rPr lang="en-IN" b="1" dirty="0" smtClean="0">
-                <a:latin typeface="Calibri" panose="020F0502020204030204" pitchFamily="34" charset="0"/>
-                <a:cs typeface="Calibri" panose="020F0502020204030204" pitchFamily="34" charset="0"/>
-                <a:sym typeface="+mn-ea"/>
-              </a:rPr>
-              <a:t>Modern </a:t>
-            </a:r>
+            <a:pPr marL="285750" indent="-285750">
+              <a:spcBef>
+                <a:spcPts val="600"/>
+              </a:spcBef>
+              <a:buFont typeface="Arial" panose="020B0604020202020204" pitchFamily="34" charset="0"/>
+              <a:buChar char="•"/>
+            </a:pPr>
             <a:r>
               <a:rPr lang="en-IN" b="1" dirty="0">
                 <a:latin typeface="Calibri" panose="020F0502020204030204" pitchFamily="34" charset="0"/>
                 <a:cs typeface="Calibri" panose="020F0502020204030204" pitchFamily="34" charset="0"/>
                 <a:sym typeface="+mn-ea"/>
               </a:rPr>
-              <a:t>Technology </a:t>
+              <a:t>Modern Technology </a:t>
             </a:r>
             <a:r>
               <a:rPr lang="en-IN" dirty="0">
@@ -6017,69 +5803,72 @@
                 <a:cs typeface="Calibri" panose="020F0502020204030204" pitchFamily="34" charset="0"/>
                 <a:sym typeface="+mn-ea"/>
               </a:rPr>
-              <a:t>:- </a:t>
-            </a:r>
-            <a:r>
-              <a:rPr lang="en-IN" dirty="0" smtClean="0">
+              <a:t>:-  Machine learning and Deep learning, 		            Cloud Computing, Visualization</a:t>
+            </a:r>
+            <a:endParaRPr lang="en-IN" dirty="0"/>
+          </a:p>
+          <a:p>
+            <a:pPr marL="285750" indent="-285750">
+              <a:spcBef>
+                <a:spcPts val="600"/>
+              </a:spcBef>
+              <a:buFont typeface="Arial" panose="020B0604020202020204" pitchFamily="34" charset="0"/>
+              <a:buChar char="•"/>
+            </a:pPr>
+            <a:r>
+              <a:rPr lang="en-IN" b="1" dirty="0"/>
+              <a:t>Mobile Development </a:t>
+            </a:r>
+            <a:r>
+              <a:rPr lang="en-IN" dirty="0"/>
+              <a:t>:-Android Studio, Android SDK</a:t>
+            </a:r>
+          </a:p>
+          <a:p>
+            <a:pPr marL="285750" indent="-285750">
+              <a:spcBef>
+                <a:spcPts val="600"/>
+              </a:spcBef>
+              <a:buFont typeface="Arial" panose="020B0604020202020204" pitchFamily="34" charset="0"/>
+              <a:buChar char="•"/>
+            </a:pPr>
+            <a:r>
+              <a:rPr lang="en-IN" b="1" dirty="0">
                 <a:latin typeface="Calibri" panose="020F0502020204030204" pitchFamily="34" charset="0"/>
                 <a:cs typeface="Calibri" panose="020F0502020204030204" pitchFamily="34" charset="0"/>
-                <a:sym typeface="+mn-ea"/>
-              </a:rPr>
-              <a:t> </a:t>
+              </a:rPr>
+              <a:t>Backend Development</a:t>
             </a:r>
             <a:r>
               <a:rPr lang="en-IN" dirty="0">
                 <a:latin typeface="Calibri" panose="020F0502020204030204" pitchFamily="34" charset="0"/>
                 <a:cs typeface="Calibri" panose="020F0502020204030204" pitchFamily="34" charset="0"/>
-                <a:sym typeface="+mn-ea"/>
-              </a:rPr>
-              <a:t>Data </a:t>
-            </a:r>
-            <a:r>
-              <a:rPr lang="en-IN" dirty="0" err="1" smtClean="0">
+              </a:rPr>
+              <a:t> :- </a:t>
+            </a:r>
+            <a:r>
+              <a:rPr lang="en-IN" dirty="0" err="1">
                 <a:latin typeface="Calibri" panose="020F0502020204030204" pitchFamily="34" charset="0"/>
                 <a:cs typeface="Calibri" panose="020F0502020204030204" pitchFamily="34" charset="0"/>
-                <a:sym typeface="+mn-ea"/>
-              </a:rPr>
-              <a:t>Preprocessing</a:t>
-            </a:r>
-            <a:r>
-              <a:rPr lang="en-IN" dirty="0" smtClean="0">
-                <a:latin typeface="Calibri" panose="020F0502020204030204" pitchFamily="34" charset="0"/>
-                <a:cs typeface="Calibri" panose="020F0502020204030204" pitchFamily="34" charset="0"/>
-                <a:sym typeface="+mn-ea"/>
-              </a:rPr>
-              <a:t>, </a:t>
+              </a:rPr>
+              <a:t>Firestore</a:t>
             </a:r>
             <a:r>
               <a:rPr lang="en-IN" dirty="0">
                 <a:latin typeface="Calibri" panose="020F0502020204030204" pitchFamily="34" charset="0"/>
                 <a:cs typeface="Calibri" panose="020F0502020204030204" pitchFamily="34" charset="0"/>
-                <a:sym typeface="+mn-ea"/>
-              </a:rPr>
-              <a:t>Visualization, Machine </a:t>
-            </a:r>
-            <a:r>
-              <a:rPr lang="en-IN" dirty="0" smtClean="0">
-                <a:latin typeface="Calibri" panose="020F0502020204030204" pitchFamily="34" charset="0"/>
-                <a:cs typeface="Calibri" panose="020F0502020204030204" pitchFamily="34" charset="0"/>
-                <a:sym typeface="+mn-ea"/>
-              </a:rPr>
-              <a:t>learning and Deep learning, Cloud Computing.</a:t>
-            </a:r>
-            <a:endParaRPr lang="en-IN" dirty="0"/>
-          </a:p>
-          <a:p>
-            <a:r>
-              <a:rPr lang="en-IN" b="1" dirty="0"/>
-              <a:t>Mobile Development </a:t>
-            </a:r>
-            <a:r>
-              <a:rPr lang="en-IN" dirty="0"/>
-              <a:t>:-Android Studio, Android SDK and Jellybean version and above.</a:t>
-            </a:r>
-          </a:p>
-          <a:p>
+              </a:rPr>
+              <a:t> and Firebase.</a:t>
+            </a:r>
+          </a:p>
+          <a:p>
+            <a:pPr marL="285750" indent="-285750">
+              <a:spcBef>
+                <a:spcPts val="600"/>
+              </a:spcBef>
+              <a:buFont typeface="Arial" panose="020B0604020202020204" pitchFamily="34" charset="0"/>
+              <a:buChar char="•"/>
+            </a:pPr>
             <a:r>
               <a:rPr lang="en-IN" b="1" dirty="0">
                 <a:effectLst>
@@ -6091,118 +5880,10 @@
                 </a:effectLst>
                 <a:sym typeface="+mn-ea"/>
               </a:rPr>
-              <a:t>Web Technology </a:t>
+              <a:t>Hardware Components </a:t>
             </a:r>
             <a:r>
               <a:rPr lang="en-IN" dirty="0">
-                <a:ln w="12700">
-                  <a:solidFill>
-                    <a:schemeClr val="accent3">
-                      <a:lumMod val="50000"/>
-                    </a:schemeClr>
-                  </a:solidFill>
-                  <a:prstDash val="solid"/>
-                </a:ln>
-                <a:pattFill prst="narHorz">
-                  <a:fgClr>
-                    <a:schemeClr val="accent3"/>
-                  </a:fgClr>
-                  <a:bgClr>
-                    <a:schemeClr val="accent3">
-                      <a:lumMod val="40000"/>
-                      <a:lumOff val="60000"/>
-                    </a:schemeClr>
-                  </a:bgClr>
-                </a:pattFill>
-                <a:effectLst>
-                  <a:innerShdw blurRad="177800">
-                    <a:schemeClr val="accent3">
-                      <a:lumMod val="50000"/>
-                    </a:schemeClr>
-                  </a:innerShdw>
-                </a:effectLst>
-                <a:sym typeface="+mn-ea"/>
-              </a:rPr>
-              <a:t>:</a:t>
-            </a:r>
-            <a:r>
-              <a:rPr lang="en-IN" dirty="0">
-                <a:sym typeface="+mn-ea"/>
-              </a:rPr>
-              <a:t> - HTML, CSS, JavaScript, AJAX, Bootstrap , </a:t>
-            </a:r>
-            <a:r>
-              <a:rPr lang="en-IN" dirty="0" err="1">
-                <a:sym typeface="+mn-ea"/>
-              </a:rPr>
-              <a:t>Django</a:t>
-            </a:r>
-            <a:r>
-              <a:rPr lang="en-IN" dirty="0">
-                <a:sym typeface="+mn-ea"/>
-              </a:rPr>
-              <a:t> and </a:t>
-            </a:r>
-            <a:r>
-              <a:rPr lang="en-IN" dirty="0" err="1">
-                <a:sym typeface="+mn-ea"/>
-              </a:rPr>
-              <a:t>nodeJS</a:t>
-            </a:r>
-            <a:r>
-              <a:rPr lang="en-IN" dirty="0">
-                <a:sym typeface="+mn-ea"/>
-              </a:rPr>
-              <a:t>  .</a:t>
-            </a:r>
-          </a:p>
-          <a:p>
-            <a:r>
-              <a:rPr lang="en-IN" b="1" dirty="0">
-                <a:latin typeface="Calibri" panose="020F0502020204030204" pitchFamily="34" charset="0"/>
-                <a:cs typeface="Calibri" panose="020F0502020204030204" pitchFamily="34" charset="0"/>
-              </a:rPr>
-              <a:t>Backend Development</a:t>
-            </a:r>
-            <a:r>
-              <a:rPr lang="en-IN" dirty="0">
-                <a:latin typeface="Calibri" panose="020F0502020204030204" pitchFamily="34" charset="0"/>
-                <a:cs typeface="Calibri" panose="020F0502020204030204" pitchFamily="34" charset="0"/>
-              </a:rPr>
-              <a:t> </a:t>
-            </a:r>
-            <a:r>
-              <a:rPr lang="en-IN" dirty="0" smtClean="0">
-                <a:latin typeface="Calibri" panose="020F0502020204030204" pitchFamily="34" charset="0"/>
-                <a:cs typeface="Calibri" panose="020F0502020204030204" pitchFamily="34" charset="0"/>
-              </a:rPr>
-              <a:t>:- </a:t>
-            </a:r>
-            <a:r>
-              <a:rPr lang="en-IN" dirty="0" err="1" smtClean="0">
-                <a:latin typeface="Calibri" panose="020F0502020204030204" pitchFamily="34" charset="0"/>
-                <a:cs typeface="Calibri" panose="020F0502020204030204" pitchFamily="34" charset="0"/>
-              </a:rPr>
-              <a:t>Firestore</a:t>
-            </a:r>
-            <a:r>
-              <a:rPr lang="en-IN" dirty="0" smtClean="0">
-                <a:latin typeface="Calibri" panose="020F0502020204030204" pitchFamily="34" charset="0"/>
-                <a:cs typeface="Calibri" panose="020F0502020204030204" pitchFamily="34" charset="0"/>
-              </a:rPr>
-              <a:t> </a:t>
-            </a:r>
-            <a:r>
-              <a:rPr lang="en-IN" dirty="0">
-                <a:latin typeface="Calibri" panose="020F0502020204030204" pitchFamily="34" charset="0"/>
-                <a:cs typeface="Calibri" panose="020F0502020204030204" pitchFamily="34" charset="0"/>
-              </a:rPr>
-              <a:t>and Firebase.</a:t>
-            </a:r>
-          </a:p>
-          <a:p>
-            <a:r>
-              <a:rPr lang="en-IN" b="1" dirty="0" smtClean="0">
                 <a:effectLst>
                   <a:outerShdw blurRad="38100" dist="19050" dir="2700000" algn="tl" rotWithShape="0">
                     <a:schemeClr val="dk1">
@@ -6212,10 +5893,10 @@
                 </a:effectLst>
                 <a:sym typeface="+mn-ea"/>
               </a:rPr>
-              <a:t>Hardware Components </a:t>
-            </a:r>
-            <a:r>
-              <a:rPr lang="en-IN" dirty="0" smtClean="0">
+              <a:t>:- </a:t>
+            </a:r>
+            <a:r>
+              <a:rPr lang="en-IN" b="1" dirty="0">
                 <a:effectLst>
                   <a:outerShdw blurRad="38100" dist="19050" dir="2700000" algn="tl" rotWithShape="0">
                     <a:schemeClr val="dk1">
@@ -6225,10 +5906,10 @@
                 </a:effectLst>
                 <a:sym typeface="+mn-ea"/>
               </a:rPr>
-              <a:t>:- </a:t>
-            </a:r>
-            <a:r>
-              <a:rPr lang="en-IN" b="1" dirty="0" smtClean="0">
+              <a:t> </a:t>
+            </a:r>
+            <a:r>
+              <a:rPr lang="en-IN" dirty="0">
                 <a:effectLst>
                   <a:outerShdw blurRad="38100" dist="19050" dir="2700000" algn="tl" rotWithShape="0">
                     <a:schemeClr val="dk1">
@@ -6238,46 +5919,7 @@
                 </a:effectLst>
                 <a:sym typeface="+mn-ea"/>
               </a:rPr>
-              <a:t> </a:t>
-            </a:r>
-            <a:r>
-              <a:rPr lang="en-IN" dirty="0" smtClean="0">
-                <a:effectLst>
-                  <a:outerShdw blurRad="38100" dist="19050" dir="2700000" algn="tl" rotWithShape="0">
-                    <a:schemeClr val="dk1">
-                      <a:alpha val="40000"/>
-                    </a:schemeClr>
-                  </a:outerShdw>
-                </a:effectLst>
-                <a:sym typeface="+mn-ea"/>
-              </a:rPr>
-              <a:t>Raspberry pi 4,RFID,Sensors,Servo motors , Camera , LCD , BULB ,</a:t>
-            </a:r>
-            <a:r>
-              <a:rPr lang="en-IN" dirty="0" err="1" smtClean="0">
-                <a:effectLst>
-                  <a:outerShdw blurRad="38100" dist="19050" dir="2700000" algn="tl" rotWithShape="0">
-                    <a:schemeClr val="dk1">
-                      <a:alpha val="40000"/>
-                    </a:schemeClr>
-                  </a:outerShdw>
-                </a:effectLst>
-                <a:sym typeface="+mn-ea"/>
-              </a:rPr>
-              <a:t>etc</a:t>
-            </a:r>
-            <a:r>
-              <a:rPr lang="en-IN" dirty="0" smtClean="0">
-                <a:effectLst>
-                  <a:outerShdw blurRad="38100" dist="19050" dir="2700000" algn="tl" rotWithShape="0">
-                    <a:schemeClr val="dk1">
-                      <a:alpha val="40000"/>
-                    </a:schemeClr>
-                  </a:outerShdw>
-                </a:effectLst>
-                <a:sym typeface="+mn-ea"/>
-              </a:rPr>
-              <a:t> . </a:t>
+              <a:t>Raspberry pi 4, RFID, Sensors, 			Servo motors , Camera , LCD, 				BULB  etc . </a:t>
             </a:r>
             <a:endParaRPr lang="en-IN" u="sng" dirty="0"/>
           </a:p>
@@ -6295,7 +5937,7 @@
         <p:spPr>
           <a:xfrm>
             <a:off x="6857999" y="498764"/>
-            <a:ext cx="4807527" cy="2308324"/>
+            <a:ext cx="4897121" cy="1292662"/>
           </a:xfrm>
           <a:prstGeom prst="rect">
             <a:avLst/>
@@ -6310,7 +5952,13 @@
           <a:p>
             <a:pPr algn="ctr"/>
             <a:r>
-              <a:rPr lang="en-US" dirty="0" smtClean="0"/>
+              <a:rPr lang="en-US" sz="2400" b="1" i="1" u="sng" dirty="0">
+                <a:solidFill>
+                  <a:schemeClr val="accent5">
+                    <a:lumMod val="75000"/>
+                  </a:schemeClr>
+                </a:solidFill>
+              </a:rPr>
               <a:t>Dependencies</a:t>
             </a:r>
           </a:p>
@@ -6323,7 +5971,7 @@
               <a:rPr lang="en-IN" dirty="0">
                 <a:sym typeface="+mn-ea"/>
               </a:rPr>
-              <a:t>This application can be installed in all devices having </a:t>
+              <a:t>Requires </a:t>
             </a:r>
             <a:r>
               <a:rPr lang="en-IN" b="1" dirty="0">
@@ -6331,13 +5979,6 @@
               </a:rPr>
               <a:t>Android version Jellybean and higher</a:t>
             </a:r>
-            <a:r>
-              <a:rPr lang="en-IN" dirty="0">
-                <a:sym typeface="+mn-ea"/>
-              </a:rPr>
-              <a:t>.</a:t>
-            </a:r>
-            <a:endParaRPr lang="en-IN" dirty="0"/>
           </a:p>
           <a:p>
             <a:pPr marL="285750" indent="-285750">
@@ -6345,77 +5986,10 @@
               <a:buChar char="§"/>
             </a:pPr>
             <a:r>
-              <a:rPr lang="en-IN" dirty="0">
-                <a:sym typeface="+mn-ea"/>
-              </a:rPr>
-              <a:t>An </a:t>
-            </a:r>
-            <a:r>
               <a:rPr lang="en-IN" b="1" dirty="0">
                 <a:sym typeface="+mn-ea"/>
               </a:rPr>
-              <a:t>online portal</a:t>
-            </a:r>
-            <a:r>
-              <a:rPr lang="en-IN" dirty="0">
-                <a:sym typeface="+mn-ea"/>
-              </a:rPr>
-              <a:t> generated shall require IE v9 or higher, Google Chrome, Mozilla Firefox, or any other </a:t>
-            </a:r>
-            <a:r>
-              <a:rPr lang="en-IN" b="1" dirty="0">
-                <a:sym typeface="+mn-ea"/>
-              </a:rPr>
-              <a:t>web </a:t>
-            </a:r>
-            <a:r>
-              <a:rPr lang="en-IN" b="1" dirty="0" smtClean="0">
-                <a:sym typeface="+mn-ea"/>
-              </a:rPr>
-              <a:t>browser</a:t>
-            </a:r>
-          </a:p>
-          <a:p>
-            <a:pPr marL="285750" indent="-285750">
-              <a:buFont typeface="Wingdings" panose="05000000000000000000" charset="0"/>
-              <a:buChar char="§"/>
-            </a:pPr>
-            <a:r>
-              <a:rPr lang="en-IN" b="1" dirty="0" smtClean="0">
-                <a:sym typeface="+mn-ea"/>
-              </a:rPr>
-              <a:t>Hardware components and their installation and power supply. </a:t>
-            </a:r>
-            <a:endParaRPr lang="en-US" dirty="0"/>
-          </a:p>
-        </p:txBody>
-      </p:sp>
-      <p:sp>
-        <p:nvSpPr>
-          <p:cNvPr id="12" name="TextBox 11"/>
-          <p:cNvSpPr txBox="1"/>
-          <p:nvPr/>
-        </p:nvSpPr>
-        <p:spPr>
-          <a:xfrm>
-            <a:off x="7162800" y="3186545"/>
-            <a:ext cx="4156364" cy="369332"/>
-          </a:xfrm>
-          <a:prstGeom prst="rect">
-            <a:avLst/>
-          </a:prstGeom>
-          <a:noFill/>
-        </p:spPr>
-        <p:txBody>
-          <a:bodyPr wrap="square" rtlCol="0">
-            <a:spAutoFit/>
-          </a:bodyPr>
-          <a:lstStyle/>
-          <a:p>
-            <a:pPr algn="ctr"/>
-            <a:r>
-              <a:rPr lang="en-US" dirty="0" smtClean="0"/>
-              <a:t>Conventional v/s S-Park</a:t>
+              <a:t>Hardware components and their installation and power supply</a:t>
             </a:r>
             <a:endParaRPr lang="en-US" dirty="0"/>
           </a:p>
@@ -6431,13 +6005,6 @@
   <p:clrMapOvr>
     <a:masterClrMapping/>
   </p:clrMapOvr>
-  <p:timing>
-    <p:tnLst>
-      <p:par>
-        <p:cTn id="1" dur="indefinite" restart="never" nodeType="tmRoot"/>
-      </p:par>
-    </p:tnLst>
-  </p:timing>
 </p:sld>
 </file>
 
@@ -6482,7 +6049,7 @@
           <a:p>
             <a:pPr algn="ctr"/>
             <a:r>
-              <a:rPr lang="en-US" b="1" dirty="0" smtClean="0"/>
+              <a:rPr lang="en-US" b="1" dirty="0"/>
               <a:t>DATA COLLECTION</a:t>
             </a:r>
           </a:p>
@@ -6492,14 +6059,9 @@
               <a:buChar char="q"/>
             </a:pPr>
             <a:r>
-              <a:rPr lang="en-US" dirty="0" smtClean="0"/>
-              <a:t>At </a:t>
-            </a:r>
-            <a:r>
               <a:rPr lang="en-US" dirty="0"/>
-              <a:t>the gate, the number plate and the entry-exit time is saved to the database using camera module. </a:t>
-            </a:r>
-            <a:endParaRPr lang="en-US" dirty="0" smtClean="0"/>
+              <a:t>At the gate, the number plate and the entry-exit time is saved to the database using camera module. </a:t>
+            </a:r>
           </a:p>
           <a:p>
             <a:pPr marL="285750" indent="-285750">
@@ -6507,20 +6069,8 @@
               <a:buChar char="q"/>
             </a:pPr>
             <a:r>
-              <a:rPr lang="en-US" dirty="0" smtClean="0"/>
-              <a:t>At </a:t>
-            </a:r>
-            <a:r>
               <a:rPr lang="en-US" dirty="0"/>
-              <a:t>the parking area</a:t>
-            </a:r>
-            <a:r>
-              <a:rPr lang="en-US" dirty="0" smtClean="0"/>
-              <a:t>, </a:t>
-            </a:r>
-            <a:r>
-              <a:rPr lang="en-US" dirty="0"/>
-              <a:t>which car(number plate)  is parked in which slot is also saved to the database.  </a:t>
+              <a:t>At the parking area, which car(number plate)  is parked in which slot is also saved to the database.  </a:t>
             </a:r>
           </a:p>
         </p:txBody>
@@ -6549,7 +6099,7 @@
           <a:p>
             <a:pPr algn="ctr"/>
             <a:r>
-              <a:rPr lang="en-US" b="1" dirty="0" smtClean="0"/>
+              <a:rPr lang="en-US" b="1" dirty="0"/>
               <a:t>DATA LOCAL STORAGE</a:t>
             </a:r>
           </a:p>
@@ -6559,7 +6109,7 @@
               <a:buChar char="q"/>
             </a:pPr>
             <a:r>
-              <a:rPr lang="en-US" dirty="0" smtClean="0"/>
+              <a:rPr lang="en-US" dirty="0"/>
               <a:t>The images taken by the camera will be locally stored in the raspberry pi. </a:t>
             </a:r>
           </a:p>
@@ -6569,10 +6119,9 @@
               <a:buChar char="q"/>
             </a:pPr>
             <a:r>
-              <a:rPr lang="en-US" dirty="0" smtClean="0"/>
+              <a:rPr lang="en-US" dirty="0"/>
               <a:t>Once the data is processed, the raspberry will automatically free the data.</a:t>
             </a:r>
-            <a:endParaRPr lang="en-US" dirty="0"/>
           </a:p>
         </p:txBody>
       </p:sp>
@@ -6600,7 +6149,7 @@
           <a:p>
             <a:pPr algn="ctr"/>
             <a:r>
-              <a:rPr lang="en-US" b="1" dirty="0" smtClean="0"/>
+              <a:rPr lang="en-US" b="1" dirty="0"/>
               <a:t>DATA PROCESSING</a:t>
             </a:r>
           </a:p>
@@ -6610,7 +6159,7 @@
               <a:buChar char="q"/>
             </a:pPr>
             <a:r>
-              <a:rPr lang="en-US" dirty="0" smtClean="0"/>
+              <a:rPr lang="en-US" dirty="0"/>
               <a:t>The number plate detection, motion detection, entry-exit time detection will take place. </a:t>
             </a:r>
           </a:p>
@@ -6620,10 +6169,9 @@
               <a:buChar char="q"/>
             </a:pPr>
             <a:r>
-              <a:rPr lang="en-US" dirty="0" smtClean="0"/>
+              <a:rPr lang="en-US" dirty="0"/>
               <a:t>The output of the processed data will be stored in the cloud. </a:t>
             </a:r>
-            <a:endParaRPr lang="en-US" dirty="0"/>
           </a:p>
         </p:txBody>
       </p:sp>
@@ -6651,7 +6199,7 @@
           <a:p>
             <a:pPr algn="ctr"/>
             <a:r>
-              <a:rPr lang="en-US" b="1" dirty="0" smtClean="0"/>
+              <a:rPr lang="en-US" b="1" dirty="0"/>
               <a:t>DATA CLOUD STORAGE</a:t>
             </a:r>
           </a:p>
@@ -6661,10 +6209,9 @@
               <a:buChar char="q"/>
             </a:pPr>
             <a:r>
-              <a:rPr lang="en-US" dirty="0" smtClean="0"/>
+              <a:rPr lang="en-US" dirty="0"/>
               <a:t>The filtered output will be stored in the cloud. The data required for the android app and the website that has to be shown to the user, will be retrieved from the cloud.</a:t>
             </a:r>
-            <a:endParaRPr lang="en-US" dirty="0"/>
           </a:p>
         </p:txBody>
       </p:sp>
@@ -6692,7 +6239,7 @@
           <a:p>
             <a:pPr algn="ctr"/>
             <a:r>
-              <a:rPr lang="en-US" b="1" dirty="0" smtClean="0"/>
+              <a:rPr lang="en-US" b="1" dirty="0"/>
               <a:t>DATA VISUALIZATION</a:t>
             </a:r>
           </a:p>
@@ -6702,7 +6249,7 @@
               <a:buChar char="q"/>
             </a:pPr>
             <a:r>
-              <a:rPr lang="en-US" dirty="0" smtClean="0"/>
+              <a:rPr lang="en-US" dirty="0"/>
               <a:t>The information which concerns the user will be shown in the android app and the website. </a:t>
             </a:r>
           </a:p>
@@ -6712,10 +6259,9 @@
               <a:buChar char="q"/>
             </a:pPr>
             <a:r>
-              <a:rPr lang="en-US" dirty="0" smtClean="0"/>
+              <a:rPr lang="en-US" dirty="0"/>
               <a:t>This information includes the map guidance, the number of available slots, etc.</a:t>
             </a:r>
-            <a:endParaRPr lang="en-US" dirty="0"/>
           </a:p>
         </p:txBody>
       </p:sp>
@@ -6842,7 +6388,6 @@
               <a:rPr lang="en-US" dirty="0"/>
               <a:t>At the parking area, which car(number plate)  is parked in which slot is also saved to the database.  </a:t>
             </a:r>
-            <a:endParaRPr lang="en-US" dirty="0"/>
           </a:p>
         </p:txBody>
       </p:sp>
@@ -6909,7 +6454,6 @@
               <a:rPr lang="en-US" dirty="0"/>
               <a:t>Once the data is processed, the raspberry will automatically free the data.</a:t>
             </a:r>
-            <a:endParaRPr lang="en-US" dirty="0"/>
           </a:p>
         </p:txBody>
       </p:sp>
@@ -6976,7 +6520,6 @@
               <a:rPr lang="en-US" dirty="0"/>
               <a:t>The output of the processed data will be stored in the cloud. </a:t>
             </a:r>
-            <a:endParaRPr lang="en-US" dirty="0"/>
           </a:p>
         </p:txBody>
       </p:sp>
@@ -7043,7 +6586,6 @@
               <a:rPr lang="en-US" dirty="0"/>
               <a:t>The output of the processed data will be stored in the cloud. </a:t>
             </a:r>
-            <a:endParaRPr lang="en-US" dirty="0"/>
           </a:p>
         </p:txBody>
       </p:sp>
@@ -7110,7 +6652,6 @@
               <a:rPr lang="en-US" dirty="0"/>
               <a:t>This information includes the map guidance, the number of available slots, etc.</a:t>
             </a:r>
-            <a:endParaRPr lang="en-US" dirty="0"/>
           </a:p>
         </p:txBody>
       </p:sp>
@@ -7416,7 +6957,7 @@
   <a:extraClrSchemeLst/>
   <a:extLst>
     <a:ext uri="{05A4C25C-085E-4340-85A3-A5531E510DB2}">
-      <thm15:themeFamily xmlns:thm15="http://schemas.microsoft.com/office/thememl/2012/main" xmlns="" name="Office Theme" id="{62F939B6-93AF-4DB8-9C6B-D6C7DFDC589F}" vid="{4A3C46E8-61CC-4603-A589-7422A47A8E4A}"/>
+      <thm15:themeFamily xmlns:thm15="http://schemas.microsoft.com/office/thememl/2012/main" name="Office Theme" id="{62F939B6-93AF-4DB8-9C6B-D6C7DFDC589F}" vid="{4A3C46E8-61CC-4603-A589-7422A47A8E4A}"/>
     </a:ext>
   </a:extLst>
 </a:theme>

</xml_diff>

<commit_message>
PPT Animations completed (Map)
</commit_message>
<xml_diff>
--- a/Documents/terna ppt.pptx
+++ b/Documents/terna ppt.pptx
@@ -1,19 +1,19 @@
 
 <file path=ppt/presentation.xml><?xml version="1.0" encoding="utf-8"?>
-<p:presentation xmlns:a="http://schemas.openxmlformats.org/drawingml/2006/main" xmlns:r="http://schemas.openxmlformats.org/officeDocument/2006/relationships" xmlns:p="http://schemas.openxmlformats.org/presentationml/2006/main" saveSubsetFonts="1">
+<p:presentation xmlns:a="http://schemas.openxmlformats.org/drawingml/2006/main" xmlns:r="http://schemas.openxmlformats.org/officeDocument/2006/relationships" xmlns:p="http://schemas.openxmlformats.org/presentationml/2006/main">
   <p:sldMasterIdLst>
     <p:sldMasterId id="2147483648" r:id="rId1"/>
   </p:sldMasterIdLst>
   <p:notesMasterIdLst>
-    <p:notesMasterId r:id="rId8"/>
+    <p:notesMasterId r:id="rId9"/>
   </p:notesMasterIdLst>
   <p:sldIdLst>
-    <p:sldId id="263" r:id="rId2"/>
-    <p:sldId id="260" r:id="rId3"/>
-    <p:sldId id="262" r:id="rId4"/>
-    <p:sldId id="261" r:id="rId5"/>
-    <p:sldId id="265" r:id="rId6"/>
-    <p:sldId id="266" r:id="rId7"/>
+    <p:sldId id="263" r:id="rId3"/>
+    <p:sldId id="260" r:id="rId4"/>
+    <p:sldId id="262" r:id="rId5"/>
+    <p:sldId id="261" r:id="rId6"/>
+    <p:sldId id="265" r:id="rId7"/>
+    <p:sldId id="266" r:id="rId8"/>
   </p:sldIdLst>
   <p:sldSz cx="12192000" cy="6858000"/>
   <p:notesSz cx="6858000" cy="9144000"/>
@@ -112,22 +112,6 @@
       </a:defRPr>
     </a:lvl9pPr>
   </p:defaultTextStyle>
-  <p:extLst>
-    <p:ext uri="{EFAFB233-063F-42B5-8137-9DF3F51BA10A}">
-      <p15:sldGuideLst xmlns:p15="http://schemas.microsoft.com/office/powerpoint/2012/main">
-        <p15:guide id="1" orient="horz" pos="2160">
-          <p15:clr>
-            <a:srgbClr val="A4A3A4"/>
-          </p15:clr>
-        </p15:guide>
-        <p15:guide id="2" pos="3840">
-          <p15:clr>
-            <a:srgbClr val="A4A3A4"/>
-          </p15:clr>
-        </p15:guide>
-      </p15:sldGuideLst>
-    </p:ext>
-  </p:extLst>
 </p:presentation>
 </file>
 
@@ -213,7 +197,6 @@
           <a:p>
             <a:fld id="{DE1739FA-8D86-49DA-B621-117EB9B3EC05}" type="datetimeFigureOut">
               <a:rPr lang="en-US" smtClean="0"/>
-              <a:t>2/20/2020</a:t>
             </a:fld>
             <a:endParaRPr lang="en-US"/>
           </a:p>
@@ -280,6 +263,7 @@
               <a:rPr lang="en-US"/>
               <a:t>Click to edit Master text styles</a:t>
             </a:r>
+            <a:endParaRPr lang="en-US"/>
           </a:p>
           <a:p>
             <a:pPr lvl="1"/>
@@ -287,6 +271,7 @@
               <a:rPr lang="en-US"/>
               <a:t>Second level</a:t>
             </a:r>
+            <a:endParaRPr lang="en-US"/>
           </a:p>
           <a:p>
             <a:pPr lvl="2"/>
@@ -294,6 +279,7 @@
               <a:rPr lang="en-US"/>
               <a:t>Third level</a:t>
             </a:r>
+            <a:endParaRPr lang="en-US"/>
           </a:p>
           <a:p>
             <a:pPr lvl="3"/>
@@ -301,6 +287,7 @@
               <a:rPr lang="en-US"/>
               <a:t>Fourth level</a:t>
             </a:r>
+            <a:endParaRPr lang="en-US"/>
           </a:p>
           <a:p>
             <a:pPr lvl="4"/>
@@ -308,6 +295,7 @@
               <a:rPr lang="en-US"/>
               <a:t>Fifth level</a:t>
             </a:r>
+            <a:endParaRPr lang="en-US"/>
           </a:p>
         </p:txBody>
       </p:sp>
@@ -371,18 +359,12 @@
           <a:p>
             <a:fld id="{9FD5D7AB-7D0F-4744-B848-131B76D0DB31}" type="slidenum">
               <a:rPr lang="en-US" smtClean="0"/>
-              <a:t>‹#›</a:t>
             </a:fld>
             <a:endParaRPr lang="en-US"/>
           </a:p>
         </p:txBody>
       </p:sp>
     </p:spTree>
-    <p:extLst>
-      <p:ext uri="{BB962C8B-B14F-4D97-AF65-F5344CB8AC3E}">
-        <p14:creationId xmlns:p14="http://schemas.microsoft.com/office/powerpoint/2010/main" val="3881951461"/>
-      </p:ext>
-    </p:extLst>
   </p:cSld>
   <p:clrMap bg1="lt1" tx1="dk1" bg2="lt2" tx2="dk2" accent1="accent1" accent2="accent2" accent3="accent3" accent4="accent4" accent5="accent5" accent6="accent6" hlink="hlink" folHlink="folHlink"/>
   <p:notesStyle>
@@ -499,13 +481,7 @@
       </p:grpSpPr>
       <p:sp>
         <p:nvSpPr>
-          <p:cNvPr id="2" name="Title 1">
-            <a:extLst>
-              <a:ext uri="{FF2B5EF4-FFF2-40B4-BE49-F238E27FC236}">
-                <a16:creationId xmlns:a16="http://schemas.microsoft.com/office/drawing/2014/main" id="{9BAE51D7-305B-4DD8-A2E8-BB526E203E8E}"/>
-              </a:ext>
-            </a:extLst>
-          </p:cNvPr>
+          <p:cNvPr id="2" name="Title 1"/>
           <p:cNvSpPr>
             <a:spLocks noGrp="1"/>
           </p:cNvSpPr>
@@ -537,13 +513,7 @@
       </p:sp>
       <p:sp>
         <p:nvSpPr>
-          <p:cNvPr id="3" name="Subtitle 2">
-            <a:extLst>
-              <a:ext uri="{FF2B5EF4-FFF2-40B4-BE49-F238E27FC236}">
-                <a16:creationId xmlns:a16="http://schemas.microsoft.com/office/drawing/2014/main" id="{8F2BD6C8-963D-413D-83AD-A0AC771F00C2}"/>
-              </a:ext>
-            </a:extLst>
-          </p:cNvPr>
+          <p:cNvPr id="3" name="Subtitle 2"/>
           <p:cNvSpPr>
             <a:spLocks noGrp="1"/>
           </p:cNvSpPr>
@@ -608,13 +578,7 @@
       </p:sp>
       <p:sp>
         <p:nvSpPr>
-          <p:cNvPr id="4" name="Date Placeholder 3">
-            <a:extLst>
-              <a:ext uri="{FF2B5EF4-FFF2-40B4-BE49-F238E27FC236}">
-                <a16:creationId xmlns:a16="http://schemas.microsoft.com/office/drawing/2014/main" id="{DDC916B3-C26D-4187-84C8-D7AA2D4F41A1}"/>
-              </a:ext>
-            </a:extLst>
-          </p:cNvPr>
+          <p:cNvPr id="4" name="Date Placeholder 3"/>
           <p:cNvSpPr>
             <a:spLocks noGrp="1"/>
           </p:cNvSpPr>
@@ -629,7 +593,6 @@
           <a:p>
             <a:fld id="{DEBB1A40-CEB4-404B-BDEC-031982722AD1}" type="datetimeFigureOut">
               <a:rPr lang="en-IN" smtClean="0"/>
-              <a:t>20-02-2020</a:t>
             </a:fld>
             <a:endParaRPr lang="en-IN"/>
           </a:p>
@@ -637,13 +600,7 @@
       </p:sp>
       <p:sp>
         <p:nvSpPr>
-          <p:cNvPr id="5" name="Footer Placeholder 4">
-            <a:extLst>
-              <a:ext uri="{FF2B5EF4-FFF2-40B4-BE49-F238E27FC236}">
-                <a16:creationId xmlns:a16="http://schemas.microsoft.com/office/drawing/2014/main" id="{E419BCB6-9AAC-4C7D-BACD-1B2835BE7F92}"/>
-              </a:ext>
-            </a:extLst>
-          </p:cNvPr>
+          <p:cNvPr id="5" name="Footer Placeholder 4"/>
           <p:cNvSpPr>
             <a:spLocks noGrp="1"/>
           </p:cNvSpPr>
@@ -662,13 +619,7 @@
       </p:sp>
       <p:sp>
         <p:nvSpPr>
-          <p:cNvPr id="6" name="Slide Number Placeholder 5">
-            <a:extLst>
-              <a:ext uri="{FF2B5EF4-FFF2-40B4-BE49-F238E27FC236}">
-                <a16:creationId xmlns:a16="http://schemas.microsoft.com/office/drawing/2014/main" id="{6C7FFE01-CC79-408E-8A3F-A353C38956A3}"/>
-              </a:ext>
-            </a:extLst>
-          </p:cNvPr>
+          <p:cNvPr id="6" name="Slide Number Placeholder 5"/>
           <p:cNvSpPr>
             <a:spLocks noGrp="1"/>
           </p:cNvSpPr>
@@ -683,18 +634,12 @@
           <a:p>
             <a:fld id="{78B49F29-8AC5-4E67-9491-285136E831C7}" type="slidenum">
               <a:rPr lang="en-IN" smtClean="0"/>
-              <a:t>‹#›</a:t>
             </a:fld>
             <a:endParaRPr lang="en-IN"/>
           </a:p>
         </p:txBody>
       </p:sp>
     </p:spTree>
-    <p:extLst>
-      <p:ext uri="{BB962C8B-B14F-4D97-AF65-F5344CB8AC3E}">
-        <p14:creationId xmlns:p14="http://schemas.microsoft.com/office/powerpoint/2010/main" val="1299080575"/>
-      </p:ext>
-    </p:extLst>
   </p:cSld>
   <p:clrMapOvr>
     <a:masterClrMapping/>
@@ -721,13 +666,7 @@
       </p:grpSpPr>
       <p:sp>
         <p:nvSpPr>
-          <p:cNvPr id="2" name="Title 1">
-            <a:extLst>
-              <a:ext uri="{FF2B5EF4-FFF2-40B4-BE49-F238E27FC236}">
-                <a16:creationId xmlns:a16="http://schemas.microsoft.com/office/drawing/2014/main" id="{7FFFB261-40EE-4ED9-BA95-78B7DC7D267D}"/>
-              </a:ext>
-            </a:extLst>
-          </p:cNvPr>
+          <p:cNvPr id="2" name="Title 1"/>
           <p:cNvSpPr>
             <a:spLocks noGrp="1"/>
           </p:cNvSpPr>
@@ -750,13 +689,7 @@
       </p:sp>
       <p:sp>
         <p:nvSpPr>
-          <p:cNvPr id="3" name="Vertical Text Placeholder 2">
-            <a:extLst>
-              <a:ext uri="{FF2B5EF4-FFF2-40B4-BE49-F238E27FC236}">
-                <a16:creationId xmlns:a16="http://schemas.microsoft.com/office/drawing/2014/main" id="{3CCBB90C-19A6-4100-8BDF-7CE624B23C65}"/>
-              </a:ext>
-            </a:extLst>
-          </p:cNvPr>
+          <p:cNvPr id="3" name="Vertical Text Placeholder 2"/>
           <p:cNvSpPr>
             <a:spLocks noGrp="1"/>
           </p:cNvSpPr>
@@ -774,6 +707,7 @@
               <a:rPr lang="en-US"/>
               <a:t>Click to edit Master text styles</a:t>
             </a:r>
+            <a:endParaRPr lang="en-US"/>
           </a:p>
           <a:p>
             <a:pPr lvl="1"/>
@@ -781,6 +715,7 @@
               <a:rPr lang="en-US"/>
               <a:t>Second level</a:t>
             </a:r>
+            <a:endParaRPr lang="en-US"/>
           </a:p>
           <a:p>
             <a:pPr lvl="2"/>
@@ -788,6 +723,7 @@
               <a:rPr lang="en-US"/>
               <a:t>Third level</a:t>
             </a:r>
+            <a:endParaRPr lang="en-US"/>
           </a:p>
           <a:p>
             <a:pPr lvl="3"/>
@@ -795,6 +731,7 @@
               <a:rPr lang="en-US"/>
               <a:t>Fourth level</a:t>
             </a:r>
+            <a:endParaRPr lang="en-US"/>
           </a:p>
           <a:p>
             <a:pPr lvl="4"/>
@@ -808,13 +745,7 @@
       </p:sp>
       <p:sp>
         <p:nvSpPr>
-          <p:cNvPr id="4" name="Date Placeholder 3">
-            <a:extLst>
-              <a:ext uri="{FF2B5EF4-FFF2-40B4-BE49-F238E27FC236}">
-                <a16:creationId xmlns:a16="http://schemas.microsoft.com/office/drawing/2014/main" id="{BAD0DD6A-49DB-4112-85F6-86E8F9219B13}"/>
-              </a:ext>
-            </a:extLst>
-          </p:cNvPr>
+          <p:cNvPr id="4" name="Date Placeholder 3"/>
           <p:cNvSpPr>
             <a:spLocks noGrp="1"/>
           </p:cNvSpPr>
@@ -829,7 +760,6 @@
           <a:p>
             <a:fld id="{DEBB1A40-CEB4-404B-BDEC-031982722AD1}" type="datetimeFigureOut">
               <a:rPr lang="en-IN" smtClean="0"/>
-              <a:t>20-02-2020</a:t>
             </a:fld>
             <a:endParaRPr lang="en-IN"/>
           </a:p>
@@ -837,13 +767,7 @@
       </p:sp>
       <p:sp>
         <p:nvSpPr>
-          <p:cNvPr id="5" name="Footer Placeholder 4">
-            <a:extLst>
-              <a:ext uri="{FF2B5EF4-FFF2-40B4-BE49-F238E27FC236}">
-                <a16:creationId xmlns:a16="http://schemas.microsoft.com/office/drawing/2014/main" id="{F22A1371-6336-466D-B6EB-13FB6271B4DD}"/>
-              </a:ext>
-            </a:extLst>
-          </p:cNvPr>
+          <p:cNvPr id="5" name="Footer Placeholder 4"/>
           <p:cNvSpPr>
             <a:spLocks noGrp="1"/>
           </p:cNvSpPr>
@@ -862,13 +786,7 @@
       </p:sp>
       <p:sp>
         <p:nvSpPr>
-          <p:cNvPr id="6" name="Slide Number Placeholder 5">
-            <a:extLst>
-              <a:ext uri="{FF2B5EF4-FFF2-40B4-BE49-F238E27FC236}">
-                <a16:creationId xmlns:a16="http://schemas.microsoft.com/office/drawing/2014/main" id="{78E9109B-996D-403D-BC57-F5CC6C85150B}"/>
-              </a:ext>
-            </a:extLst>
-          </p:cNvPr>
+          <p:cNvPr id="6" name="Slide Number Placeholder 5"/>
           <p:cNvSpPr>
             <a:spLocks noGrp="1"/>
           </p:cNvSpPr>
@@ -883,18 +801,12 @@
           <a:p>
             <a:fld id="{78B49F29-8AC5-4E67-9491-285136E831C7}" type="slidenum">
               <a:rPr lang="en-IN" smtClean="0"/>
-              <a:t>‹#›</a:t>
             </a:fld>
             <a:endParaRPr lang="en-IN"/>
           </a:p>
         </p:txBody>
       </p:sp>
     </p:spTree>
-    <p:extLst>
-      <p:ext uri="{BB962C8B-B14F-4D97-AF65-F5344CB8AC3E}">
-        <p14:creationId xmlns:p14="http://schemas.microsoft.com/office/powerpoint/2010/main" val="1394845655"/>
-      </p:ext>
-    </p:extLst>
   </p:cSld>
   <p:clrMapOvr>
     <a:masterClrMapping/>
@@ -921,13 +833,7 @@
       </p:grpSpPr>
       <p:sp>
         <p:nvSpPr>
-          <p:cNvPr id="2" name="Vertical Title 1">
-            <a:extLst>
-              <a:ext uri="{FF2B5EF4-FFF2-40B4-BE49-F238E27FC236}">
-                <a16:creationId xmlns:a16="http://schemas.microsoft.com/office/drawing/2014/main" id="{39D70EF0-691E-41A9-8829-AC60A91453CE}"/>
-              </a:ext>
-            </a:extLst>
-          </p:cNvPr>
+          <p:cNvPr id="2" name="Vertical Title 1"/>
           <p:cNvSpPr>
             <a:spLocks noGrp="1"/>
           </p:cNvSpPr>
@@ -955,13 +861,7 @@
       </p:sp>
       <p:sp>
         <p:nvSpPr>
-          <p:cNvPr id="3" name="Vertical Text Placeholder 2">
-            <a:extLst>
-              <a:ext uri="{FF2B5EF4-FFF2-40B4-BE49-F238E27FC236}">
-                <a16:creationId xmlns:a16="http://schemas.microsoft.com/office/drawing/2014/main" id="{15D3B5C3-E9DC-4311-B121-CC94C88695AD}"/>
-              </a:ext>
-            </a:extLst>
-          </p:cNvPr>
+          <p:cNvPr id="3" name="Vertical Text Placeholder 2"/>
           <p:cNvSpPr>
             <a:spLocks noGrp="1"/>
           </p:cNvSpPr>
@@ -984,6 +884,7 @@
               <a:rPr lang="en-US"/>
               <a:t>Click to edit Master text styles</a:t>
             </a:r>
+            <a:endParaRPr lang="en-US"/>
           </a:p>
           <a:p>
             <a:pPr lvl="1"/>
@@ -991,6 +892,7 @@
               <a:rPr lang="en-US"/>
               <a:t>Second level</a:t>
             </a:r>
+            <a:endParaRPr lang="en-US"/>
           </a:p>
           <a:p>
             <a:pPr lvl="2"/>
@@ -998,6 +900,7 @@
               <a:rPr lang="en-US"/>
               <a:t>Third level</a:t>
             </a:r>
+            <a:endParaRPr lang="en-US"/>
           </a:p>
           <a:p>
             <a:pPr lvl="3"/>
@@ -1005,6 +908,7 @@
               <a:rPr lang="en-US"/>
               <a:t>Fourth level</a:t>
             </a:r>
+            <a:endParaRPr lang="en-US"/>
           </a:p>
           <a:p>
             <a:pPr lvl="4"/>
@@ -1018,13 +922,7 @@
       </p:sp>
       <p:sp>
         <p:nvSpPr>
-          <p:cNvPr id="4" name="Date Placeholder 3">
-            <a:extLst>
-              <a:ext uri="{FF2B5EF4-FFF2-40B4-BE49-F238E27FC236}">
-                <a16:creationId xmlns:a16="http://schemas.microsoft.com/office/drawing/2014/main" id="{8DF79FEC-77CF-4BAC-9C46-A26D468AFFFB}"/>
-              </a:ext>
-            </a:extLst>
-          </p:cNvPr>
+          <p:cNvPr id="4" name="Date Placeholder 3"/>
           <p:cNvSpPr>
             <a:spLocks noGrp="1"/>
           </p:cNvSpPr>
@@ -1039,7 +937,6 @@
           <a:p>
             <a:fld id="{DEBB1A40-CEB4-404B-BDEC-031982722AD1}" type="datetimeFigureOut">
               <a:rPr lang="en-IN" smtClean="0"/>
-              <a:t>20-02-2020</a:t>
             </a:fld>
             <a:endParaRPr lang="en-IN"/>
           </a:p>
@@ -1047,13 +944,7 @@
       </p:sp>
       <p:sp>
         <p:nvSpPr>
-          <p:cNvPr id="5" name="Footer Placeholder 4">
-            <a:extLst>
-              <a:ext uri="{FF2B5EF4-FFF2-40B4-BE49-F238E27FC236}">
-                <a16:creationId xmlns:a16="http://schemas.microsoft.com/office/drawing/2014/main" id="{E3B6A8B3-667D-427C-8BF6-C28E66D9B079}"/>
-              </a:ext>
-            </a:extLst>
-          </p:cNvPr>
+          <p:cNvPr id="5" name="Footer Placeholder 4"/>
           <p:cNvSpPr>
             <a:spLocks noGrp="1"/>
           </p:cNvSpPr>
@@ -1072,13 +963,7 @@
       </p:sp>
       <p:sp>
         <p:nvSpPr>
-          <p:cNvPr id="6" name="Slide Number Placeholder 5">
-            <a:extLst>
-              <a:ext uri="{FF2B5EF4-FFF2-40B4-BE49-F238E27FC236}">
-                <a16:creationId xmlns:a16="http://schemas.microsoft.com/office/drawing/2014/main" id="{AABE71C4-5256-4977-BDD4-0983969CADAF}"/>
-              </a:ext>
-            </a:extLst>
-          </p:cNvPr>
+          <p:cNvPr id="6" name="Slide Number Placeholder 5"/>
           <p:cNvSpPr>
             <a:spLocks noGrp="1"/>
           </p:cNvSpPr>
@@ -1093,18 +978,12 @@
           <a:p>
             <a:fld id="{78B49F29-8AC5-4E67-9491-285136E831C7}" type="slidenum">
               <a:rPr lang="en-IN" smtClean="0"/>
-              <a:t>‹#›</a:t>
             </a:fld>
             <a:endParaRPr lang="en-IN"/>
           </a:p>
         </p:txBody>
       </p:sp>
     </p:spTree>
-    <p:extLst>
-      <p:ext uri="{BB962C8B-B14F-4D97-AF65-F5344CB8AC3E}">
-        <p14:creationId xmlns:p14="http://schemas.microsoft.com/office/powerpoint/2010/main" val="2268139651"/>
-      </p:ext>
-    </p:extLst>
   </p:cSld>
   <p:clrMapOvr>
     <a:masterClrMapping/>
@@ -1131,13 +1010,7 @@
       </p:grpSpPr>
       <p:sp>
         <p:nvSpPr>
-          <p:cNvPr id="2" name="Title 1">
-            <a:extLst>
-              <a:ext uri="{FF2B5EF4-FFF2-40B4-BE49-F238E27FC236}">
-                <a16:creationId xmlns:a16="http://schemas.microsoft.com/office/drawing/2014/main" id="{6A9889E2-F14D-44A0-ADE5-1E62C1BFA8B4}"/>
-              </a:ext>
-            </a:extLst>
-          </p:cNvPr>
+          <p:cNvPr id="2" name="Title 1"/>
           <p:cNvSpPr>
             <a:spLocks noGrp="1"/>
           </p:cNvSpPr>
@@ -1160,13 +1033,7 @@
       </p:sp>
       <p:sp>
         <p:nvSpPr>
-          <p:cNvPr id="3" name="Content Placeholder 2">
-            <a:extLst>
-              <a:ext uri="{FF2B5EF4-FFF2-40B4-BE49-F238E27FC236}">
-                <a16:creationId xmlns:a16="http://schemas.microsoft.com/office/drawing/2014/main" id="{171C197E-0402-4295-996B-421DB5A282CE}"/>
-              </a:ext>
-            </a:extLst>
-          </p:cNvPr>
+          <p:cNvPr id="3" name="Content Placeholder 2"/>
           <p:cNvSpPr>
             <a:spLocks noGrp="1"/>
           </p:cNvSpPr>
@@ -1184,6 +1051,7 @@
               <a:rPr lang="en-US"/>
               <a:t>Click to edit Master text styles</a:t>
             </a:r>
+            <a:endParaRPr lang="en-US"/>
           </a:p>
           <a:p>
             <a:pPr lvl="1"/>
@@ -1191,6 +1059,7 @@
               <a:rPr lang="en-US"/>
               <a:t>Second level</a:t>
             </a:r>
+            <a:endParaRPr lang="en-US"/>
           </a:p>
           <a:p>
             <a:pPr lvl="2"/>
@@ -1198,6 +1067,7 @@
               <a:rPr lang="en-US"/>
               <a:t>Third level</a:t>
             </a:r>
+            <a:endParaRPr lang="en-US"/>
           </a:p>
           <a:p>
             <a:pPr lvl="3"/>
@@ -1205,6 +1075,7 @@
               <a:rPr lang="en-US"/>
               <a:t>Fourth level</a:t>
             </a:r>
+            <a:endParaRPr lang="en-US"/>
           </a:p>
           <a:p>
             <a:pPr lvl="4"/>
@@ -1218,13 +1089,7 @@
       </p:sp>
       <p:sp>
         <p:nvSpPr>
-          <p:cNvPr id="4" name="Date Placeholder 3">
-            <a:extLst>
-              <a:ext uri="{FF2B5EF4-FFF2-40B4-BE49-F238E27FC236}">
-                <a16:creationId xmlns:a16="http://schemas.microsoft.com/office/drawing/2014/main" id="{686176FA-D347-4525-AF8C-2687A327940A}"/>
-              </a:ext>
-            </a:extLst>
-          </p:cNvPr>
+          <p:cNvPr id="4" name="Date Placeholder 3"/>
           <p:cNvSpPr>
             <a:spLocks noGrp="1"/>
           </p:cNvSpPr>
@@ -1239,7 +1104,6 @@
           <a:p>
             <a:fld id="{DEBB1A40-CEB4-404B-BDEC-031982722AD1}" type="datetimeFigureOut">
               <a:rPr lang="en-IN" smtClean="0"/>
-              <a:t>20-02-2020</a:t>
             </a:fld>
             <a:endParaRPr lang="en-IN"/>
           </a:p>
@@ -1247,13 +1111,7 @@
       </p:sp>
       <p:sp>
         <p:nvSpPr>
-          <p:cNvPr id="5" name="Footer Placeholder 4">
-            <a:extLst>
-              <a:ext uri="{FF2B5EF4-FFF2-40B4-BE49-F238E27FC236}">
-                <a16:creationId xmlns:a16="http://schemas.microsoft.com/office/drawing/2014/main" id="{E627373D-CD13-403D-8309-4EAA77A616E5}"/>
-              </a:ext>
-            </a:extLst>
-          </p:cNvPr>
+          <p:cNvPr id="5" name="Footer Placeholder 4"/>
           <p:cNvSpPr>
             <a:spLocks noGrp="1"/>
           </p:cNvSpPr>
@@ -1272,13 +1130,7 @@
       </p:sp>
       <p:sp>
         <p:nvSpPr>
-          <p:cNvPr id="6" name="Slide Number Placeholder 5">
-            <a:extLst>
-              <a:ext uri="{FF2B5EF4-FFF2-40B4-BE49-F238E27FC236}">
-                <a16:creationId xmlns:a16="http://schemas.microsoft.com/office/drawing/2014/main" id="{F191C00D-9CD2-47E5-8698-2682735AB6E1}"/>
-              </a:ext>
-            </a:extLst>
-          </p:cNvPr>
+          <p:cNvPr id="6" name="Slide Number Placeholder 5"/>
           <p:cNvSpPr>
             <a:spLocks noGrp="1"/>
           </p:cNvSpPr>
@@ -1293,18 +1145,12 @@
           <a:p>
             <a:fld id="{78B49F29-8AC5-4E67-9491-285136E831C7}" type="slidenum">
               <a:rPr lang="en-IN" smtClean="0"/>
-              <a:t>‹#›</a:t>
             </a:fld>
             <a:endParaRPr lang="en-IN"/>
           </a:p>
         </p:txBody>
       </p:sp>
     </p:spTree>
-    <p:extLst>
-      <p:ext uri="{BB962C8B-B14F-4D97-AF65-F5344CB8AC3E}">
-        <p14:creationId xmlns:p14="http://schemas.microsoft.com/office/powerpoint/2010/main" val="3424146829"/>
-      </p:ext>
-    </p:extLst>
   </p:cSld>
   <p:clrMapOvr>
     <a:masterClrMapping/>
@@ -1331,13 +1177,7 @@
       </p:grpSpPr>
       <p:sp>
         <p:nvSpPr>
-          <p:cNvPr id="2" name="Title 1">
-            <a:extLst>
-              <a:ext uri="{FF2B5EF4-FFF2-40B4-BE49-F238E27FC236}">
-                <a16:creationId xmlns:a16="http://schemas.microsoft.com/office/drawing/2014/main" id="{57651FEC-BCF9-4422-AC1D-8E613C454C19}"/>
-              </a:ext>
-            </a:extLst>
-          </p:cNvPr>
+          <p:cNvPr id="2" name="Title 1"/>
           <p:cNvSpPr>
             <a:spLocks noGrp="1"/>
           </p:cNvSpPr>
@@ -1369,13 +1209,7 @@
       </p:sp>
       <p:sp>
         <p:nvSpPr>
-          <p:cNvPr id="3" name="Text Placeholder 2">
-            <a:extLst>
-              <a:ext uri="{FF2B5EF4-FFF2-40B4-BE49-F238E27FC236}">
-                <a16:creationId xmlns:a16="http://schemas.microsoft.com/office/drawing/2014/main" id="{2B0C989C-B1CA-4606-BEBA-0663C0DB9CA1}"/>
-              </a:ext>
-            </a:extLst>
-          </p:cNvPr>
+          <p:cNvPr id="3" name="Text Placeholder 2"/>
           <p:cNvSpPr>
             <a:spLocks noGrp="1"/>
           </p:cNvSpPr>
@@ -1489,18 +1323,13 @@
               <a:rPr lang="en-US"/>
               <a:t>Click to edit Master text styles</a:t>
             </a:r>
-          </a:p>
-        </p:txBody>
-      </p:sp>
-      <p:sp>
-        <p:nvSpPr>
-          <p:cNvPr id="4" name="Date Placeholder 3">
-            <a:extLst>
-              <a:ext uri="{FF2B5EF4-FFF2-40B4-BE49-F238E27FC236}">
-                <a16:creationId xmlns:a16="http://schemas.microsoft.com/office/drawing/2014/main" id="{CF28F8AC-686F-4A71-8CDF-D986AE118A24}"/>
-              </a:ext>
-            </a:extLst>
-          </p:cNvPr>
+            <a:endParaRPr lang="en-US"/>
+          </a:p>
+        </p:txBody>
+      </p:sp>
+      <p:sp>
+        <p:nvSpPr>
+          <p:cNvPr id="4" name="Date Placeholder 3"/>
           <p:cNvSpPr>
             <a:spLocks noGrp="1"/>
           </p:cNvSpPr>
@@ -1515,7 +1344,6 @@
           <a:p>
             <a:fld id="{DEBB1A40-CEB4-404B-BDEC-031982722AD1}" type="datetimeFigureOut">
               <a:rPr lang="en-IN" smtClean="0"/>
-              <a:t>20-02-2020</a:t>
             </a:fld>
             <a:endParaRPr lang="en-IN"/>
           </a:p>
@@ -1523,13 +1351,7 @@
       </p:sp>
       <p:sp>
         <p:nvSpPr>
-          <p:cNvPr id="5" name="Footer Placeholder 4">
-            <a:extLst>
-              <a:ext uri="{FF2B5EF4-FFF2-40B4-BE49-F238E27FC236}">
-                <a16:creationId xmlns:a16="http://schemas.microsoft.com/office/drawing/2014/main" id="{7877B3F1-1D4B-4E04-BBC2-D3FA4EF25F0F}"/>
-              </a:ext>
-            </a:extLst>
-          </p:cNvPr>
+          <p:cNvPr id="5" name="Footer Placeholder 4"/>
           <p:cNvSpPr>
             <a:spLocks noGrp="1"/>
           </p:cNvSpPr>
@@ -1548,13 +1370,7 @@
       </p:sp>
       <p:sp>
         <p:nvSpPr>
-          <p:cNvPr id="6" name="Slide Number Placeholder 5">
-            <a:extLst>
-              <a:ext uri="{FF2B5EF4-FFF2-40B4-BE49-F238E27FC236}">
-                <a16:creationId xmlns:a16="http://schemas.microsoft.com/office/drawing/2014/main" id="{6779DF2D-B3C0-40B6-910F-C032B9EDF8E4}"/>
-              </a:ext>
-            </a:extLst>
-          </p:cNvPr>
+          <p:cNvPr id="6" name="Slide Number Placeholder 5"/>
           <p:cNvSpPr>
             <a:spLocks noGrp="1"/>
           </p:cNvSpPr>
@@ -1569,18 +1385,12 @@
           <a:p>
             <a:fld id="{78B49F29-8AC5-4E67-9491-285136E831C7}" type="slidenum">
               <a:rPr lang="en-IN" smtClean="0"/>
-              <a:t>‹#›</a:t>
             </a:fld>
             <a:endParaRPr lang="en-IN"/>
           </a:p>
         </p:txBody>
       </p:sp>
     </p:spTree>
-    <p:extLst>
-      <p:ext uri="{BB962C8B-B14F-4D97-AF65-F5344CB8AC3E}">
-        <p14:creationId xmlns:p14="http://schemas.microsoft.com/office/powerpoint/2010/main" val="3903645733"/>
-      </p:ext>
-    </p:extLst>
   </p:cSld>
   <p:clrMapOvr>
     <a:masterClrMapping/>
@@ -1607,13 +1417,7 @@
       </p:grpSpPr>
       <p:sp>
         <p:nvSpPr>
-          <p:cNvPr id="2" name="Title 1">
-            <a:extLst>
-              <a:ext uri="{FF2B5EF4-FFF2-40B4-BE49-F238E27FC236}">
-                <a16:creationId xmlns:a16="http://schemas.microsoft.com/office/drawing/2014/main" id="{DFBFEDAE-26C5-4FCE-A7BA-DDBD28FB161B}"/>
-              </a:ext>
-            </a:extLst>
-          </p:cNvPr>
+          <p:cNvPr id="2" name="Title 1"/>
           <p:cNvSpPr>
             <a:spLocks noGrp="1"/>
           </p:cNvSpPr>
@@ -1636,13 +1440,7 @@
       </p:sp>
       <p:sp>
         <p:nvSpPr>
-          <p:cNvPr id="3" name="Content Placeholder 2">
-            <a:extLst>
-              <a:ext uri="{FF2B5EF4-FFF2-40B4-BE49-F238E27FC236}">
-                <a16:creationId xmlns:a16="http://schemas.microsoft.com/office/drawing/2014/main" id="{2F041F28-299E-4C67-9F93-575BD7371060}"/>
-              </a:ext>
-            </a:extLst>
-          </p:cNvPr>
+          <p:cNvPr id="3" name="Content Placeholder 2"/>
           <p:cNvSpPr>
             <a:spLocks noGrp="1"/>
           </p:cNvSpPr>
@@ -1665,6 +1463,7 @@
               <a:rPr lang="en-US"/>
               <a:t>Click to edit Master text styles</a:t>
             </a:r>
+            <a:endParaRPr lang="en-US"/>
           </a:p>
           <a:p>
             <a:pPr lvl="1"/>
@@ -1672,6 +1471,7 @@
               <a:rPr lang="en-US"/>
               <a:t>Second level</a:t>
             </a:r>
+            <a:endParaRPr lang="en-US"/>
           </a:p>
           <a:p>
             <a:pPr lvl="2"/>
@@ -1679,6 +1479,7 @@
               <a:rPr lang="en-US"/>
               <a:t>Third level</a:t>
             </a:r>
+            <a:endParaRPr lang="en-US"/>
           </a:p>
           <a:p>
             <a:pPr lvl="3"/>
@@ -1686,6 +1487,7 @@
               <a:rPr lang="en-US"/>
               <a:t>Fourth level</a:t>
             </a:r>
+            <a:endParaRPr lang="en-US"/>
           </a:p>
           <a:p>
             <a:pPr lvl="4"/>
@@ -1699,13 +1501,7 @@
       </p:sp>
       <p:sp>
         <p:nvSpPr>
-          <p:cNvPr id="4" name="Content Placeholder 3">
-            <a:extLst>
-              <a:ext uri="{FF2B5EF4-FFF2-40B4-BE49-F238E27FC236}">
-                <a16:creationId xmlns:a16="http://schemas.microsoft.com/office/drawing/2014/main" id="{B0CE9931-B83F-4A01-A3A4-C4D8C0EE263F}"/>
-              </a:ext>
-            </a:extLst>
-          </p:cNvPr>
+          <p:cNvPr id="4" name="Content Placeholder 3"/>
           <p:cNvSpPr>
             <a:spLocks noGrp="1"/>
           </p:cNvSpPr>
@@ -1728,6 +1524,7 @@
               <a:rPr lang="en-US"/>
               <a:t>Click to edit Master text styles</a:t>
             </a:r>
+            <a:endParaRPr lang="en-US"/>
           </a:p>
           <a:p>
             <a:pPr lvl="1"/>
@@ -1735,6 +1532,7 @@
               <a:rPr lang="en-US"/>
               <a:t>Second level</a:t>
             </a:r>
+            <a:endParaRPr lang="en-US"/>
           </a:p>
           <a:p>
             <a:pPr lvl="2"/>
@@ -1742,6 +1540,7 @@
               <a:rPr lang="en-US"/>
               <a:t>Third level</a:t>
             </a:r>
+            <a:endParaRPr lang="en-US"/>
           </a:p>
           <a:p>
             <a:pPr lvl="3"/>
@@ -1749,6 +1548,7 @@
               <a:rPr lang="en-US"/>
               <a:t>Fourth level</a:t>
             </a:r>
+            <a:endParaRPr lang="en-US"/>
           </a:p>
           <a:p>
             <a:pPr lvl="4"/>
@@ -1762,13 +1562,7 @@
       </p:sp>
       <p:sp>
         <p:nvSpPr>
-          <p:cNvPr id="5" name="Date Placeholder 4">
-            <a:extLst>
-              <a:ext uri="{FF2B5EF4-FFF2-40B4-BE49-F238E27FC236}">
-                <a16:creationId xmlns:a16="http://schemas.microsoft.com/office/drawing/2014/main" id="{4F9C96A2-E7F0-45A7-A823-8661BFF77933}"/>
-              </a:ext>
-            </a:extLst>
-          </p:cNvPr>
+          <p:cNvPr id="5" name="Date Placeholder 4"/>
           <p:cNvSpPr>
             <a:spLocks noGrp="1"/>
           </p:cNvSpPr>
@@ -1783,7 +1577,6 @@
           <a:p>
             <a:fld id="{DEBB1A40-CEB4-404B-BDEC-031982722AD1}" type="datetimeFigureOut">
               <a:rPr lang="en-IN" smtClean="0"/>
-              <a:t>20-02-2020</a:t>
             </a:fld>
             <a:endParaRPr lang="en-IN"/>
           </a:p>
@@ -1791,13 +1584,7 @@
       </p:sp>
       <p:sp>
         <p:nvSpPr>
-          <p:cNvPr id="6" name="Footer Placeholder 5">
-            <a:extLst>
-              <a:ext uri="{FF2B5EF4-FFF2-40B4-BE49-F238E27FC236}">
-                <a16:creationId xmlns:a16="http://schemas.microsoft.com/office/drawing/2014/main" id="{88BD6AA9-EA70-4D31-B659-66D167627948}"/>
-              </a:ext>
-            </a:extLst>
-          </p:cNvPr>
+          <p:cNvPr id="6" name="Footer Placeholder 5"/>
           <p:cNvSpPr>
             <a:spLocks noGrp="1"/>
           </p:cNvSpPr>
@@ -1816,13 +1603,7 @@
       </p:sp>
       <p:sp>
         <p:nvSpPr>
-          <p:cNvPr id="7" name="Slide Number Placeholder 6">
-            <a:extLst>
-              <a:ext uri="{FF2B5EF4-FFF2-40B4-BE49-F238E27FC236}">
-                <a16:creationId xmlns:a16="http://schemas.microsoft.com/office/drawing/2014/main" id="{6CC755AD-652C-448B-A8B6-775A5F84EE55}"/>
-              </a:ext>
-            </a:extLst>
-          </p:cNvPr>
+          <p:cNvPr id="7" name="Slide Number Placeholder 6"/>
           <p:cNvSpPr>
             <a:spLocks noGrp="1"/>
           </p:cNvSpPr>
@@ -1837,18 +1618,12 @@
           <a:p>
             <a:fld id="{78B49F29-8AC5-4E67-9491-285136E831C7}" type="slidenum">
               <a:rPr lang="en-IN" smtClean="0"/>
-              <a:t>‹#›</a:t>
             </a:fld>
             <a:endParaRPr lang="en-IN"/>
           </a:p>
         </p:txBody>
       </p:sp>
     </p:spTree>
-    <p:extLst>
-      <p:ext uri="{BB962C8B-B14F-4D97-AF65-F5344CB8AC3E}">
-        <p14:creationId xmlns:p14="http://schemas.microsoft.com/office/powerpoint/2010/main" val="1489574926"/>
-      </p:ext>
-    </p:extLst>
   </p:cSld>
   <p:clrMapOvr>
     <a:masterClrMapping/>
@@ -1875,13 +1650,7 @@
       </p:grpSpPr>
       <p:sp>
         <p:nvSpPr>
-          <p:cNvPr id="2" name="Title 1">
-            <a:extLst>
-              <a:ext uri="{FF2B5EF4-FFF2-40B4-BE49-F238E27FC236}">
-                <a16:creationId xmlns:a16="http://schemas.microsoft.com/office/drawing/2014/main" id="{2152CE10-EBDE-45A0-9DBE-8D04E3EC10E2}"/>
-              </a:ext>
-            </a:extLst>
-          </p:cNvPr>
+          <p:cNvPr id="2" name="Title 1"/>
           <p:cNvSpPr>
             <a:spLocks noGrp="1"/>
           </p:cNvSpPr>
@@ -1909,13 +1678,7 @@
       </p:sp>
       <p:sp>
         <p:nvSpPr>
-          <p:cNvPr id="3" name="Text Placeholder 2">
-            <a:extLst>
-              <a:ext uri="{FF2B5EF4-FFF2-40B4-BE49-F238E27FC236}">
-                <a16:creationId xmlns:a16="http://schemas.microsoft.com/office/drawing/2014/main" id="{FB66022D-91BC-40E0-B287-D46E5E52F1C5}"/>
-              </a:ext>
-            </a:extLst>
-          </p:cNvPr>
+          <p:cNvPr id="3" name="Text Placeholder 2"/>
           <p:cNvSpPr>
             <a:spLocks noGrp="1"/>
           </p:cNvSpPr>
@@ -1975,18 +1738,13 @@
               <a:rPr lang="en-US"/>
               <a:t>Click to edit Master text styles</a:t>
             </a:r>
-          </a:p>
-        </p:txBody>
-      </p:sp>
-      <p:sp>
-        <p:nvSpPr>
-          <p:cNvPr id="4" name="Content Placeholder 3">
-            <a:extLst>
-              <a:ext uri="{FF2B5EF4-FFF2-40B4-BE49-F238E27FC236}">
-                <a16:creationId xmlns:a16="http://schemas.microsoft.com/office/drawing/2014/main" id="{59A894AF-17A4-4307-A44A-40FCBCDDA6B7}"/>
-              </a:ext>
-            </a:extLst>
-          </p:cNvPr>
+            <a:endParaRPr lang="en-US"/>
+          </a:p>
+        </p:txBody>
+      </p:sp>
+      <p:sp>
+        <p:nvSpPr>
+          <p:cNvPr id="4" name="Content Placeholder 3"/>
           <p:cNvSpPr>
             <a:spLocks noGrp="1"/>
           </p:cNvSpPr>
@@ -2009,6 +1767,7 @@
               <a:rPr lang="en-US"/>
               <a:t>Click to edit Master text styles</a:t>
             </a:r>
+            <a:endParaRPr lang="en-US"/>
           </a:p>
           <a:p>
             <a:pPr lvl="1"/>
@@ -2016,6 +1775,7 @@
               <a:rPr lang="en-US"/>
               <a:t>Second level</a:t>
             </a:r>
+            <a:endParaRPr lang="en-US"/>
           </a:p>
           <a:p>
             <a:pPr lvl="2"/>
@@ -2023,6 +1783,7 @@
               <a:rPr lang="en-US"/>
               <a:t>Third level</a:t>
             </a:r>
+            <a:endParaRPr lang="en-US"/>
           </a:p>
           <a:p>
             <a:pPr lvl="3"/>
@@ -2030,6 +1791,7 @@
               <a:rPr lang="en-US"/>
               <a:t>Fourth level</a:t>
             </a:r>
+            <a:endParaRPr lang="en-US"/>
           </a:p>
           <a:p>
             <a:pPr lvl="4"/>
@@ -2043,13 +1805,7 @@
       </p:sp>
       <p:sp>
         <p:nvSpPr>
-          <p:cNvPr id="5" name="Text Placeholder 4">
-            <a:extLst>
-              <a:ext uri="{FF2B5EF4-FFF2-40B4-BE49-F238E27FC236}">
-                <a16:creationId xmlns:a16="http://schemas.microsoft.com/office/drawing/2014/main" id="{BF23285A-D2A1-4902-9065-3EF2A5B54CBE}"/>
-              </a:ext>
-            </a:extLst>
-          </p:cNvPr>
+          <p:cNvPr id="5" name="Text Placeholder 4"/>
           <p:cNvSpPr>
             <a:spLocks noGrp="1"/>
           </p:cNvSpPr>
@@ -2109,18 +1865,13 @@
               <a:rPr lang="en-US"/>
               <a:t>Click to edit Master text styles</a:t>
             </a:r>
-          </a:p>
-        </p:txBody>
-      </p:sp>
-      <p:sp>
-        <p:nvSpPr>
-          <p:cNvPr id="6" name="Content Placeholder 5">
-            <a:extLst>
-              <a:ext uri="{FF2B5EF4-FFF2-40B4-BE49-F238E27FC236}">
-                <a16:creationId xmlns:a16="http://schemas.microsoft.com/office/drawing/2014/main" id="{BED61A5D-A179-4C5B-81E3-ED5B41E3A0F8}"/>
-              </a:ext>
-            </a:extLst>
-          </p:cNvPr>
+            <a:endParaRPr lang="en-US"/>
+          </a:p>
+        </p:txBody>
+      </p:sp>
+      <p:sp>
+        <p:nvSpPr>
+          <p:cNvPr id="6" name="Content Placeholder 5"/>
           <p:cNvSpPr>
             <a:spLocks noGrp="1"/>
           </p:cNvSpPr>
@@ -2143,6 +1894,7 @@
               <a:rPr lang="en-US"/>
               <a:t>Click to edit Master text styles</a:t>
             </a:r>
+            <a:endParaRPr lang="en-US"/>
           </a:p>
           <a:p>
             <a:pPr lvl="1"/>
@@ -2150,6 +1902,7 @@
               <a:rPr lang="en-US"/>
               <a:t>Second level</a:t>
             </a:r>
+            <a:endParaRPr lang="en-US"/>
           </a:p>
           <a:p>
             <a:pPr lvl="2"/>
@@ -2157,6 +1910,7 @@
               <a:rPr lang="en-US"/>
               <a:t>Third level</a:t>
             </a:r>
+            <a:endParaRPr lang="en-US"/>
           </a:p>
           <a:p>
             <a:pPr lvl="3"/>
@@ -2164,6 +1918,7 @@
               <a:rPr lang="en-US"/>
               <a:t>Fourth level</a:t>
             </a:r>
+            <a:endParaRPr lang="en-US"/>
           </a:p>
           <a:p>
             <a:pPr lvl="4"/>
@@ -2177,13 +1932,7 @@
       </p:sp>
       <p:sp>
         <p:nvSpPr>
-          <p:cNvPr id="7" name="Date Placeholder 6">
-            <a:extLst>
-              <a:ext uri="{FF2B5EF4-FFF2-40B4-BE49-F238E27FC236}">
-                <a16:creationId xmlns:a16="http://schemas.microsoft.com/office/drawing/2014/main" id="{CB331CE8-B61C-41DA-A612-29F2C7DC346A}"/>
-              </a:ext>
-            </a:extLst>
-          </p:cNvPr>
+          <p:cNvPr id="7" name="Date Placeholder 6"/>
           <p:cNvSpPr>
             <a:spLocks noGrp="1"/>
           </p:cNvSpPr>
@@ -2198,7 +1947,6 @@
           <a:p>
             <a:fld id="{DEBB1A40-CEB4-404B-BDEC-031982722AD1}" type="datetimeFigureOut">
               <a:rPr lang="en-IN" smtClean="0"/>
-              <a:t>20-02-2020</a:t>
             </a:fld>
             <a:endParaRPr lang="en-IN"/>
           </a:p>
@@ -2206,13 +1954,7 @@
       </p:sp>
       <p:sp>
         <p:nvSpPr>
-          <p:cNvPr id="8" name="Footer Placeholder 7">
-            <a:extLst>
-              <a:ext uri="{FF2B5EF4-FFF2-40B4-BE49-F238E27FC236}">
-                <a16:creationId xmlns:a16="http://schemas.microsoft.com/office/drawing/2014/main" id="{D0547763-8BFE-4F98-8CBE-494414FDC27D}"/>
-              </a:ext>
-            </a:extLst>
-          </p:cNvPr>
+          <p:cNvPr id="8" name="Footer Placeholder 7"/>
           <p:cNvSpPr>
             <a:spLocks noGrp="1"/>
           </p:cNvSpPr>
@@ -2231,13 +1973,7 @@
       </p:sp>
       <p:sp>
         <p:nvSpPr>
-          <p:cNvPr id="9" name="Slide Number Placeholder 8">
-            <a:extLst>
-              <a:ext uri="{FF2B5EF4-FFF2-40B4-BE49-F238E27FC236}">
-                <a16:creationId xmlns:a16="http://schemas.microsoft.com/office/drawing/2014/main" id="{5E4534F3-88DF-4719-B2FF-CB7D2C06CF6B}"/>
-              </a:ext>
-            </a:extLst>
-          </p:cNvPr>
+          <p:cNvPr id="9" name="Slide Number Placeholder 8"/>
           <p:cNvSpPr>
             <a:spLocks noGrp="1"/>
           </p:cNvSpPr>
@@ -2252,18 +1988,12 @@
           <a:p>
             <a:fld id="{78B49F29-8AC5-4E67-9491-285136E831C7}" type="slidenum">
               <a:rPr lang="en-IN" smtClean="0"/>
-              <a:t>‹#›</a:t>
             </a:fld>
             <a:endParaRPr lang="en-IN"/>
           </a:p>
         </p:txBody>
       </p:sp>
     </p:spTree>
-    <p:extLst>
-      <p:ext uri="{BB962C8B-B14F-4D97-AF65-F5344CB8AC3E}">
-        <p14:creationId xmlns:p14="http://schemas.microsoft.com/office/powerpoint/2010/main" val="2122554507"/>
-      </p:ext>
-    </p:extLst>
   </p:cSld>
   <p:clrMapOvr>
     <a:masterClrMapping/>
@@ -2290,13 +2020,7 @@
       </p:grpSpPr>
       <p:sp>
         <p:nvSpPr>
-          <p:cNvPr id="2" name="Title 1">
-            <a:extLst>
-              <a:ext uri="{FF2B5EF4-FFF2-40B4-BE49-F238E27FC236}">
-                <a16:creationId xmlns:a16="http://schemas.microsoft.com/office/drawing/2014/main" id="{AC63379E-9D1B-41EC-9D63-F8BF2C17A6AB}"/>
-              </a:ext>
-            </a:extLst>
-          </p:cNvPr>
+          <p:cNvPr id="2" name="Title 1"/>
           <p:cNvSpPr>
             <a:spLocks noGrp="1"/>
           </p:cNvSpPr>
@@ -2319,13 +2043,7 @@
       </p:sp>
       <p:sp>
         <p:nvSpPr>
-          <p:cNvPr id="3" name="Date Placeholder 2">
-            <a:extLst>
-              <a:ext uri="{FF2B5EF4-FFF2-40B4-BE49-F238E27FC236}">
-                <a16:creationId xmlns:a16="http://schemas.microsoft.com/office/drawing/2014/main" id="{FA248BC8-8992-4080-A71A-027CD861BE20}"/>
-              </a:ext>
-            </a:extLst>
-          </p:cNvPr>
+          <p:cNvPr id="3" name="Date Placeholder 2"/>
           <p:cNvSpPr>
             <a:spLocks noGrp="1"/>
           </p:cNvSpPr>
@@ -2340,7 +2058,6 @@
           <a:p>
             <a:fld id="{DEBB1A40-CEB4-404B-BDEC-031982722AD1}" type="datetimeFigureOut">
               <a:rPr lang="en-IN" smtClean="0"/>
-              <a:t>20-02-2020</a:t>
             </a:fld>
             <a:endParaRPr lang="en-IN"/>
           </a:p>
@@ -2348,13 +2065,7 @@
       </p:sp>
       <p:sp>
         <p:nvSpPr>
-          <p:cNvPr id="4" name="Footer Placeholder 3">
-            <a:extLst>
-              <a:ext uri="{FF2B5EF4-FFF2-40B4-BE49-F238E27FC236}">
-                <a16:creationId xmlns:a16="http://schemas.microsoft.com/office/drawing/2014/main" id="{7BE25585-2A0F-403B-978B-44CDEDA3AEF1}"/>
-              </a:ext>
-            </a:extLst>
-          </p:cNvPr>
+          <p:cNvPr id="4" name="Footer Placeholder 3"/>
           <p:cNvSpPr>
             <a:spLocks noGrp="1"/>
           </p:cNvSpPr>
@@ -2373,13 +2084,7 @@
       </p:sp>
       <p:sp>
         <p:nvSpPr>
-          <p:cNvPr id="5" name="Slide Number Placeholder 4">
-            <a:extLst>
-              <a:ext uri="{FF2B5EF4-FFF2-40B4-BE49-F238E27FC236}">
-                <a16:creationId xmlns:a16="http://schemas.microsoft.com/office/drawing/2014/main" id="{CC695F71-F829-416B-A0E9-5A2AFBE55825}"/>
-              </a:ext>
-            </a:extLst>
-          </p:cNvPr>
+          <p:cNvPr id="5" name="Slide Number Placeholder 4"/>
           <p:cNvSpPr>
             <a:spLocks noGrp="1"/>
           </p:cNvSpPr>
@@ -2394,18 +2099,12 @@
           <a:p>
             <a:fld id="{78B49F29-8AC5-4E67-9491-285136E831C7}" type="slidenum">
               <a:rPr lang="en-IN" smtClean="0"/>
-              <a:t>‹#›</a:t>
             </a:fld>
             <a:endParaRPr lang="en-IN"/>
           </a:p>
         </p:txBody>
       </p:sp>
     </p:spTree>
-    <p:extLst>
-      <p:ext uri="{BB962C8B-B14F-4D97-AF65-F5344CB8AC3E}">
-        <p14:creationId xmlns:p14="http://schemas.microsoft.com/office/powerpoint/2010/main" val="4253755559"/>
-      </p:ext>
-    </p:extLst>
   </p:cSld>
   <p:clrMapOvr>
     <a:masterClrMapping/>
@@ -2432,13 +2131,7 @@
       </p:grpSpPr>
       <p:sp>
         <p:nvSpPr>
-          <p:cNvPr id="2" name="Date Placeholder 1">
-            <a:extLst>
-              <a:ext uri="{FF2B5EF4-FFF2-40B4-BE49-F238E27FC236}">
-                <a16:creationId xmlns:a16="http://schemas.microsoft.com/office/drawing/2014/main" id="{73A3DD05-83E5-42E0-A657-0261661A4E4B}"/>
-              </a:ext>
-            </a:extLst>
-          </p:cNvPr>
+          <p:cNvPr id="2" name="Date Placeholder 1"/>
           <p:cNvSpPr>
             <a:spLocks noGrp="1"/>
           </p:cNvSpPr>
@@ -2453,7 +2146,6 @@
           <a:p>
             <a:fld id="{DEBB1A40-CEB4-404B-BDEC-031982722AD1}" type="datetimeFigureOut">
               <a:rPr lang="en-IN" smtClean="0"/>
-              <a:t>20-02-2020</a:t>
             </a:fld>
             <a:endParaRPr lang="en-IN"/>
           </a:p>
@@ -2461,13 +2153,7 @@
       </p:sp>
       <p:sp>
         <p:nvSpPr>
-          <p:cNvPr id="3" name="Footer Placeholder 2">
-            <a:extLst>
-              <a:ext uri="{FF2B5EF4-FFF2-40B4-BE49-F238E27FC236}">
-                <a16:creationId xmlns:a16="http://schemas.microsoft.com/office/drawing/2014/main" id="{03E47466-AE72-4236-AC5E-5BE8FB2AE256}"/>
-              </a:ext>
-            </a:extLst>
-          </p:cNvPr>
+          <p:cNvPr id="3" name="Footer Placeholder 2"/>
           <p:cNvSpPr>
             <a:spLocks noGrp="1"/>
           </p:cNvSpPr>
@@ -2486,13 +2172,7 @@
       </p:sp>
       <p:sp>
         <p:nvSpPr>
-          <p:cNvPr id="4" name="Slide Number Placeholder 3">
-            <a:extLst>
-              <a:ext uri="{FF2B5EF4-FFF2-40B4-BE49-F238E27FC236}">
-                <a16:creationId xmlns:a16="http://schemas.microsoft.com/office/drawing/2014/main" id="{BB24F5BE-A287-4EA9-B061-5A80C4299CE4}"/>
-              </a:ext>
-            </a:extLst>
-          </p:cNvPr>
+          <p:cNvPr id="4" name="Slide Number Placeholder 3"/>
           <p:cNvSpPr>
             <a:spLocks noGrp="1"/>
           </p:cNvSpPr>
@@ -2507,18 +2187,12 @@
           <a:p>
             <a:fld id="{78B49F29-8AC5-4E67-9491-285136E831C7}" type="slidenum">
               <a:rPr lang="en-IN" smtClean="0"/>
-              <a:t>‹#›</a:t>
             </a:fld>
             <a:endParaRPr lang="en-IN"/>
           </a:p>
         </p:txBody>
       </p:sp>
     </p:spTree>
-    <p:extLst>
-      <p:ext uri="{BB962C8B-B14F-4D97-AF65-F5344CB8AC3E}">
-        <p14:creationId xmlns:p14="http://schemas.microsoft.com/office/powerpoint/2010/main" val="2279334298"/>
-      </p:ext>
-    </p:extLst>
   </p:cSld>
   <p:clrMapOvr>
     <a:masterClrMapping/>
@@ -2545,13 +2219,7 @@
       </p:grpSpPr>
       <p:sp>
         <p:nvSpPr>
-          <p:cNvPr id="2" name="Title 1">
-            <a:extLst>
-              <a:ext uri="{FF2B5EF4-FFF2-40B4-BE49-F238E27FC236}">
-                <a16:creationId xmlns:a16="http://schemas.microsoft.com/office/drawing/2014/main" id="{D4C39B6D-EEA7-45E5-95E6-916DE32F49B1}"/>
-              </a:ext>
-            </a:extLst>
-          </p:cNvPr>
+          <p:cNvPr id="2" name="Title 1"/>
           <p:cNvSpPr>
             <a:spLocks noGrp="1"/>
           </p:cNvSpPr>
@@ -2583,13 +2251,7 @@
       </p:sp>
       <p:sp>
         <p:nvSpPr>
-          <p:cNvPr id="3" name="Content Placeholder 2">
-            <a:extLst>
-              <a:ext uri="{FF2B5EF4-FFF2-40B4-BE49-F238E27FC236}">
-                <a16:creationId xmlns:a16="http://schemas.microsoft.com/office/drawing/2014/main" id="{FC703F8C-EBB5-4CEF-84F8-BCE317B1CA75}"/>
-              </a:ext>
-            </a:extLst>
-          </p:cNvPr>
+          <p:cNvPr id="3" name="Content Placeholder 2"/>
           <p:cNvSpPr>
             <a:spLocks noGrp="1"/>
           </p:cNvSpPr>
@@ -2640,6 +2302,7 @@
               <a:rPr lang="en-US"/>
               <a:t>Click to edit Master text styles</a:t>
             </a:r>
+            <a:endParaRPr lang="en-US"/>
           </a:p>
           <a:p>
             <a:pPr lvl="1"/>
@@ -2647,6 +2310,7 @@
               <a:rPr lang="en-US"/>
               <a:t>Second level</a:t>
             </a:r>
+            <a:endParaRPr lang="en-US"/>
           </a:p>
           <a:p>
             <a:pPr lvl="2"/>
@@ -2654,6 +2318,7 @@
               <a:rPr lang="en-US"/>
               <a:t>Third level</a:t>
             </a:r>
+            <a:endParaRPr lang="en-US"/>
           </a:p>
           <a:p>
             <a:pPr lvl="3"/>
@@ -2661,6 +2326,7 @@
               <a:rPr lang="en-US"/>
               <a:t>Fourth level</a:t>
             </a:r>
+            <a:endParaRPr lang="en-US"/>
           </a:p>
           <a:p>
             <a:pPr lvl="4"/>
@@ -2674,13 +2340,7 @@
       </p:sp>
       <p:sp>
         <p:nvSpPr>
-          <p:cNvPr id="4" name="Text Placeholder 3">
-            <a:extLst>
-              <a:ext uri="{FF2B5EF4-FFF2-40B4-BE49-F238E27FC236}">
-                <a16:creationId xmlns:a16="http://schemas.microsoft.com/office/drawing/2014/main" id="{253407BE-45B1-413F-ADD9-6F76AF326B3F}"/>
-              </a:ext>
-            </a:extLst>
-          </p:cNvPr>
+          <p:cNvPr id="4" name="Text Placeholder 3"/>
           <p:cNvSpPr>
             <a:spLocks noGrp="1"/>
           </p:cNvSpPr>
@@ -2740,18 +2400,13 @@
               <a:rPr lang="en-US"/>
               <a:t>Click to edit Master text styles</a:t>
             </a:r>
-          </a:p>
-        </p:txBody>
-      </p:sp>
-      <p:sp>
-        <p:nvSpPr>
-          <p:cNvPr id="5" name="Date Placeholder 4">
-            <a:extLst>
-              <a:ext uri="{FF2B5EF4-FFF2-40B4-BE49-F238E27FC236}">
-                <a16:creationId xmlns:a16="http://schemas.microsoft.com/office/drawing/2014/main" id="{95D7FB6C-4471-48B3-93FC-82D01A8E497D}"/>
-              </a:ext>
-            </a:extLst>
-          </p:cNvPr>
+            <a:endParaRPr lang="en-US"/>
+          </a:p>
+        </p:txBody>
+      </p:sp>
+      <p:sp>
+        <p:nvSpPr>
+          <p:cNvPr id="5" name="Date Placeholder 4"/>
           <p:cNvSpPr>
             <a:spLocks noGrp="1"/>
           </p:cNvSpPr>
@@ -2766,7 +2421,6 @@
           <a:p>
             <a:fld id="{DEBB1A40-CEB4-404B-BDEC-031982722AD1}" type="datetimeFigureOut">
               <a:rPr lang="en-IN" smtClean="0"/>
-              <a:t>20-02-2020</a:t>
             </a:fld>
             <a:endParaRPr lang="en-IN"/>
           </a:p>
@@ -2774,13 +2428,7 @@
       </p:sp>
       <p:sp>
         <p:nvSpPr>
-          <p:cNvPr id="6" name="Footer Placeholder 5">
-            <a:extLst>
-              <a:ext uri="{FF2B5EF4-FFF2-40B4-BE49-F238E27FC236}">
-                <a16:creationId xmlns:a16="http://schemas.microsoft.com/office/drawing/2014/main" id="{FED7C163-8EB0-44D0-BDDD-BE373FC55377}"/>
-              </a:ext>
-            </a:extLst>
-          </p:cNvPr>
+          <p:cNvPr id="6" name="Footer Placeholder 5"/>
           <p:cNvSpPr>
             <a:spLocks noGrp="1"/>
           </p:cNvSpPr>
@@ -2799,13 +2447,7 @@
       </p:sp>
       <p:sp>
         <p:nvSpPr>
-          <p:cNvPr id="7" name="Slide Number Placeholder 6">
-            <a:extLst>
-              <a:ext uri="{FF2B5EF4-FFF2-40B4-BE49-F238E27FC236}">
-                <a16:creationId xmlns:a16="http://schemas.microsoft.com/office/drawing/2014/main" id="{41A0AA32-1145-4E98-981F-BA50041DE39C}"/>
-              </a:ext>
-            </a:extLst>
-          </p:cNvPr>
+          <p:cNvPr id="7" name="Slide Number Placeholder 6"/>
           <p:cNvSpPr>
             <a:spLocks noGrp="1"/>
           </p:cNvSpPr>
@@ -2820,18 +2462,12 @@
           <a:p>
             <a:fld id="{78B49F29-8AC5-4E67-9491-285136E831C7}" type="slidenum">
               <a:rPr lang="en-IN" smtClean="0"/>
-              <a:t>‹#›</a:t>
             </a:fld>
             <a:endParaRPr lang="en-IN"/>
           </a:p>
         </p:txBody>
       </p:sp>
     </p:spTree>
-    <p:extLst>
-      <p:ext uri="{BB962C8B-B14F-4D97-AF65-F5344CB8AC3E}">
-        <p14:creationId xmlns:p14="http://schemas.microsoft.com/office/powerpoint/2010/main" val="2770822272"/>
-      </p:ext>
-    </p:extLst>
   </p:cSld>
   <p:clrMapOvr>
     <a:masterClrMapping/>
@@ -2858,13 +2494,7 @@
       </p:grpSpPr>
       <p:sp>
         <p:nvSpPr>
-          <p:cNvPr id="2" name="Title 1">
-            <a:extLst>
-              <a:ext uri="{FF2B5EF4-FFF2-40B4-BE49-F238E27FC236}">
-                <a16:creationId xmlns:a16="http://schemas.microsoft.com/office/drawing/2014/main" id="{15C51104-A030-4153-A2E0-704E3A2DE4B7}"/>
-              </a:ext>
-            </a:extLst>
-          </p:cNvPr>
+          <p:cNvPr id="2" name="Title 1"/>
           <p:cNvSpPr>
             <a:spLocks noGrp="1"/>
           </p:cNvSpPr>
@@ -2896,13 +2526,7 @@
       </p:sp>
       <p:sp>
         <p:nvSpPr>
-          <p:cNvPr id="3" name="Picture Placeholder 2">
-            <a:extLst>
-              <a:ext uri="{FF2B5EF4-FFF2-40B4-BE49-F238E27FC236}">
-                <a16:creationId xmlns:a16="http://schemas.microsoft.com/office/drawing/2014/main" id="{F027F777-E774-4460-9CC5-C068B56AADAA}"/>
-              </a:ext>
-            </a:extLst>
-          </p:cNvPr>
+          <p:cNvPr id="3" name="Picture Placeholder 2"/>
           <p:cNvSpPr>
             <a:spLocks noGrp="1"/>
           </p:cNvSpPr>
@@ -2963,13 +2587,7 @@
       </p:sp>
       <p:sp>
         <p:nvSpPr>
-          <p:cNvPr id="4" name="Text Placeholder 3">
-            <a:extLst>
-              <a:ext uri="{FF2B5EF4-FFF2-40B4-BE49-F238E27FC236}">
-                <a16:creationId xmlns:a16="http://schemas.microsoft.com/office/drawing/2014/main" id="{4B5D0418-6AF5-4696-98BB-0D52F6545F66}"/>
-              </a:ext>
-            </a:extLst>
-          </p:cNvPr>
+          <p:cNvPr id="4" name="Text Placeholder 3"/>
           <p:cNvSpPr>
             <a:spLocks noGrp="1"/>
           </p:cNvSpPr>
@@ -3029,18 +2647,13 @@
               <a:rPr lang="en-US"/>
               <a:t>Click to edit Master text styles</a:t>
             </a:r>
-          </a:p>
-        </p:txBody>
-      </p:sp>
-      <p:sp>
-        <p:nvSpPr>
-          <p:cNvPr id="5" name="Date Placeholder 4">
-            <a:extLst>
-              <a:ext uri="{FF2B5EF4-FFF2-40B4-BE49-F238E27FC236}">
-                <a16:creationId xmlns:a16="http://schemas.microsoft.com/office/drawing/2014/main" id="{DFD53448-671D-40AA-AB31-2FD409E0A309}"/>
-              </a:ext>
-            </a:extLst>
-          </p:cNvPr>
+            <a:endParaRPr lang="en-US"/>
+          </a:p>
+        </p:txBody>
+      </p:sp>
+      <p:sp>
+        <p:nvSpPr>
+          <p:cNvPr id="5" name="Date Placeholder 4"/>
           <p:cNvSpPr>
             <a:spLocks noGrp="1"/>
           </p:cNvSpPr>
@@ -3055,7 +2668,6 @@
           <a:p>
             <a:fld id="{DEBB1A40-CEB4-404B-BDEC-031982722AD1}" type="datetimeFigureOut">
               <a:rPr lang="en-IN" smtClean="0"/>
-              <a:t>20-02-2020</a:t>
             </a:fld>
             <a:endParaRPr lang="en-IN"/>
           </a:p>
@@ -3063,13 +2675,7 @@
       </p:sp>
       <p:sp>
         <p:nvSpPr>
-          <p:cNvPr id="6" name="Footer Placeholder 5">
-            <a:extLst>
-              <a:ext uri="{FF2B5EF4-FFF2-40B4-BE49-F238E27FC236}">
-                <a16:creationId xmlns:a16="http://schemas.microsoft.com/office/drawing/2014/main" id="{8BFB73CB-F6DD-4319-AE9C-ABB003234FE6}"/>
-              </a:ext>
-            </a:extLst>
-          </p:cNvPr>
+          <p:cNvPr id="6" name="Footer Placeholder 5"/>
           <p:cNvSpPr>
             <a:spLocks noGrp="1"/>
           </p:cNvSpPr>
@@ -3088,13 +2694,7 @@
       </p:sp>
       <p:sp>
         <p:nvSpPr>
-          <p:cNvPr id="7" name="Slide Number Placeholder 6">
-            <a:extLst>
-              <a:ext uri="{FF2B5EF4-FFF2-40B4-BE49-F238E27FC236}">
-                <a16:creationId xmlns:a16="http://schemas.microsoft.com/office/drawing/2014/main" id="{A4ACAC2A-BA0F-4C06-878D-71AA56AEE701}"/>
-              </a:ext>
-            </a:extLst>
-          </p:cNvPr>
+          <p:cNvPr id="7" name="Slide Number Placeholder 6"/>
           <p:cNvSpPr>
             <a:spLocks noGrp="1"/>
           </p:cNvSpPr>
@@ -3109,18 +2709,12 @@
           <a:p>
             <a:fld id="{78B49F29-8AC5-4E67-9491-285136E831C7}" type="slidenum">
               <a:rPr lang="en-IN" smtClean="0"/>
-              <a:t>‹#›</a:t>
             </a:fld>
             <a:endParaRPr lang="en-IN"/>
           </a:p>
         </p:txBody>
       </p:sp>
     </p:spTree>
-    <p:extLst>
-      <p:ext uri="{BB962C8B-B14F-4D97-AF65-F5344CB8AC3E}">
-        <p14:creationId xmlns:p14="http://schemas.microsoft.com/office/powerpoint/2010/main" val="2979760248"/>
-      </p:ext>
-    </p:extLst>
   </p:cSld>
   <p:clrMapOvr>
     <a:masterClrMapping/>
@@ -3152,13 +2746,7 @@
       </p:grpSpPr>
       <p:sp>
         <p:nvSpPr>
-          <p:cNvPr id="2" name="Title Placeholder 1">
-            <a:extLst>
-              <a:ext uri="{FF2B5EF4-FFF2-40B4-BE49-F238E27FC236}">
-                <a16:creationId xmlns:a16="http://schemas.microsoft.com/office/drawing/2014/main" id="{BFABCFB0-E316-472B-9B8A-B0383E8606BA}"/>
-              </a:ext>
-            </a:extLst>
-          </p:cNvPr>
+          <p:cNvPr id="2" name="Title Placeholder 1"/>
           <p:cNvSpPr>
             <a:spLocks noGrp="1"/>
           </p:cNvSpPr>
@@ -3191,13 +2779,7 @@
       </p:sp>
       <p:sp>
         <p:nvSpPr>
-          <p:cNvPr id="3" name="Text Placeholder 2">
-            <a:extLst>
-              <a:ext uri="{FF2B5EF4-FFF2-40B4-BE49-F238E27FC236}">
-                <a16:creationId xmlns:a16="http://schemas.microsoft.com/office/drawing/2014/main" id="{83080E44-75FF-44F6-9AF5-DB79643E2B85}"/>
-              </a:ext>
-            </a:extLst>
-          </p:cNvPr>
+          <p:cNvPr id="3" name="Text Placeholder 2"/>
           <p:cNvSpPr>
             <a:spLocks noGrp="1"/>
           </p:cNvSpPr>
@@ -3225,6 +2807,7 @@
               <a:rPr lang="en-US"/>
               <a:t>Click to edit Master text styles</a:t>
             </a:r>
+            <a:endParaRPr lang="en-US"/>
           </a:p>
           <a:p>
             <a:pPr lvl="1"/>
@@ -3232,6 +2815,7 @@
               <a:rPr lang="en-US"/>
               <a:t>Second level</a:t>
             </a:r>
+            <a:endParaRPr lang="en-US"/>
           </a:p>
           <a:p>
             <a:pPr lvl="2"/>
@@ -3239,6 +2823,7 @@
               <a:rPr lang="en-US"/>
               <a:t>Third level</a:t>
             </a:r>
+            <a:endParaRPr lang="en-US"/>
           </a:p>
           <a:p>
             <a:pPr lvl="3"/>
@@ -3246,6 +2831,7 @@
               <a:rPr lang="en-US"/>
               <a:t>Fourth level</a:t>
             </a:r>
+            <a:endParaRPr lang="en-US"/>
           </a:p>
           <a:p>
             <a:pPr lvl="4"/>
@@ -3259,13 +2845,7 @@
       </p:sp>
       <p:sp>
         <p:nvSpPr>
-          <p:cNvPr id="4" name="Date Placeholder 3">
-            <a:extLst>
-              <a:ext uri="{FF2B5EF4-FFF2-40B4-BE49-F238E27FC236}">
-                <a16:creationId xmlns:a16="http://schemas.microsoft.com/office/drawing/2014/main" id="{9F5B0DB0-4BC0-4B3A-B5D4-77F03DF8E55D}"/>
-              </a:ext>
-            </a:extLst>
-          </p:cNvPr>
+          <p:cNvPr id="4" name="Date Placeholder 3"/>
           <p:cNvSpPr>
             <a:spLocks noGrp="1"/>
           </p:cNvSpPr>
@@ -3298,7 +2878,6 @@
           <a:p>
             <a:fld id="{DEBB1A40-CEB4-404B-BDEC-031982722AD1}" type="datetimeFigureOut">
               <a:rPr lang="en-IN" smtClean="0"/>
-              <a:t>20-02-2020</a:t>
             </a:fld>
             <a:endParaRPr lang="en-IN"/>
           </a:p>
@@ -3306,13 +2885,7 @@
       </p:sp>
       <p:sp>
         <p:nvSpPr>
-          <p:cNvPr id="5" name="Footer Placeholder 4">
-            <a:extLst>
-              <a:ext uri="{FF2B5EF4-FFF2-40B4-BE49-F238E27FC236}">
-                <a16:creationId xmlns:a16="http://schemas.microsoft.com/office/drawing/2014/main" id="{76B9B652-078E-4DC8-9CBC-9456B920B2FD}"/>
-              </a:ext>
-            </a:extLst>
-          </p:cNvPr>
+          <p:cNvPr id="5" name="Footer Placeholder 4"/>
           <p:cNvSpPr>
             <a:spLocks noGrp="1"/>
           </p:cNvSpPr>
@@ -3349,13 +2922,7 @@
       </p:sp>
       <p:sp>
         <p:nvSpPr>
-          <p:cNvPr id="6" name="Slide Number Placeholder 5">
-            <a:extLst>
-              <a:ext uri="{FF2B5EF4-FFF2-40B4-BE49-F238E27FC236}">
-                <a16:creationId xmlns:a16="http://schemas.microsoft.com/office/drawing/2014/main" id="{E30CCA17-7EC6-47C3-9715-1C5C4B3533C2}"/>
-              </a:ext>
-            </a:extLst>
-          </p:cNvPr>
+          <p:cNvPr id="6" name="Slide Number Placeholder 5"/>
           <p:cNvSpPr>
             <a:spLocks noGrp="1"/>
           </p:cNvSpPr>
@@ -3388,18 +2955,12 @@
           <a:p>
             <a:fld id="{78B49F29-8AC5-4E67-9491-285136E831C7}" type="slidenum">
               <a:rPr lang="en-IN" smtClean="0"/>
-              <a:t>‹#›</a:t>
             </a:fld>
             <a:endParaRPr lang="en-IN"/>
           </a:p>
         </p:txBody>
       </p:sp>
     </p:spTree>
-    <p:extLst>
-      <p:ext uri="{BB962C8B-B14F-4D97-AF65-F5344CB8AC3E}">
-        <p14:creationId xmlns:p14="http://schemas.microsoft.com/office/powerpoint/2010/main" val="1766074460"/>
-      </p:ext>
-    </p:extLst>
   </p:cSld>
   <p:clrMap bg1="lt1" tx1="dk1" bg2="lt2" tx2="dk2" accent1="accent1" accent2="accent2" accent3="accent3" accent4="accent4" accent5="accent5" accent6="accent6" hlink="hlink" folHlink="folHlink"/>
   <p:sldLayoutIdLst>
@@ -4079,6 +3640,9 @@
               </a:rPr>
               <a:t>: RA27   </a:t>
             </a:r>
+            <a:endParaRPr lang="en-IN" sz="2000" dirty="0">
+              <a:sym typeface="+mn-ea"/>
+            </a:endParaRPr>
           </a:p>
           <a:p>
             <a:pPr marL="0" indent="0" algn="l">
@@ -4127,6 +3691,9 @@
               </a:rPr>
               <a:t> Abhishek Gupta 	</a:t>
             </a:r>
+            <a:endParaRPr lang="en-IN" sz="2000" dirty="0">
+              <a:sym typeface="+mn-ea"/>
+            </a:endParaRPr>
           </a:p>
           <a:p>
             <a:pPr marL="0" indent="0" algn="l">
@@ -4181,6 +3748,9 @@
               </a:rPr>
               <a:t>#2274        </a:t>
             </a:r>
+            <a:endParaRPr lang="en-IN" sz="2000" dirty="0">
+              <a:sym typeface="+mn-ea"/>
+            </a:endParaRPr>
           </a:p>
           <a:p>
             <a:pPr marL="0" indent="0" algn="l">
@@ -4229,6 +3799,9 @@
               </a:rPr>
               <a:t> S-Park.</a:t>
             </a:r>
+            <a:endParaRPr lang="en-IN" sz="2000" dirty="0">
+              <a:sym typeface="+mn-ea"/>
+            </a:endParaRPr>
           </a:p>
           <a:p>
             <a:pPr marL="0" indent="0" algn="ctr">
@@ -4257,11 +3830,6 @@
         </p:txBody>
       </p:sp>
     </p:spTree>
-    <p:extLst>
-      <p:ext uri="{BB962C8B-B14F-4D97-AF65-F5344CB8AC3E}">
-        <p14:creationId xmlns:p14="http://schemas.microsoft.com/office/powerpoint/2010/main" val="1061198974"/>
-      </p:ext>
-    </p:extLst>
   </p:cSld>
   <p:clrMapOvr>
     <a:masterClrMapping/>
@@ -4429,6 +3997,11 @@
               </a:rPr>
               <a:t>)</a:t>
             </a:r>
+            <a:endParaRPr lang="en-US" dirty="0">
+              <a:solidFill>
+                <a:schemeClr val="tx1"/>
+              </a:solidFill>
+            </a:endParaRPr>
           </a:p>
         </p:txBody>
       </p:sp>
@@ -4486,6 +4059,11 @@
               </a:rPr>
               <a:t>The vehicle type (car, truck, two wheeler) will be noted because every type will have a different parking area.</a:t>
             </a:r>
+            <a:endParaRPr lang="en-US" dirty="0">
+              <a:solidFill>
+                <a:schemeClr val="tx1"/>
+              </a:solidFill>
+            </a:endParaRPr>
           </a:p>
         </p:txBody>
       </p:sp>
@@ -4543,6 +4121,11 @@
               </a:rPr>
               <a:t>The vacant parking spots in each floor will be made visible on site and on the app after which he can move toward his desired floor.(</a:t>
             </a:r>
+            <a:endParaRPr lang="en-US" dirty="0">
+              <a:solidFill>
+                <a:schemeClr val="tx1"/>
+              </a:solidFill>
+            </a:endParaRPr>
           </a:p>
         </p:txBody>
       </p:sp>
@@ -4600,6 +4183,11 @@
               </a:rPr>
               <a:t>The registered users can get direct entry using their registered RFID.</a:t>
             </a:r>
+            <a:endParaRPr lang="en-US" dirty="0">
+              <a:solidFill>
+                <a:schemeClr val="tx1"/>
+              </a:solidFill>
+            </a:endParaRPr>
           </a:p>
         </p:txBody>
       </p:sp>
@@ -4731,6 +4319,12 @@
               </a:rPr>
               <a:t>parking</a:t>
             </a:r>
+            <a:endParaRPr lang="en-US" sz="2400" b="1" cap="all" spc="0" dirty="0">
+              <a:ln w="0"/>
+              <a:effectLst>
+                <a:reflection blurRad="12700" stA="50000" endPos="50000" dist="5000" dir="5400000" sy="-100000" rotWithShape="0"/>
+              </a:effectLst>
+            </a:endParaRPr>
           </a:p>
         </p:txBody>
       </p:sp>
@@ -4793,6 +4387,11 @@
               </a:rPr>
               <a:t>On the desired floor, the layout of the floor will be displayed (app and LCD on site) with the vacant and occupied highlighted.</a:t>
             </a:r>
+            <a:endParaRPr lang="en-US" dirty="0">
+              <a:solidFill>
+                <a:schemeClr val="tx1"/>
+              </a:solidFill>
+            </a:endParaRPr>
           </a:p>
         </p:txBody>
       </p:sp>
@@ -4855,6 +4454,11 @@
               </a:rPr>
               <a:t>On the app, if he clicks on any empty spot, he will be shown directions to that spot. </a:t>
             </a:r>
+            <a:endParaRPr lang="en-US" dirty="0">
+              <a:solidFill>
+                <a:schemeClr val="tx1"/>
+              </a:solidFill>
+            </a:endParaRPr>
           </a:p>
         </p:txBody>
       </p:sp>
@@ -4917,6 +4521,11 @@
               </a:rPr>
               <a:t>If he loses track, he can opt for the “LOST” option, which will detect his location on certain parameters and redirect him.</a:t>
             </a:r>
+            <a:endParaRPr lang="en-US" dirty="0">
+              <a:solidFill>
+                <a:schemeClr val="tx1"/>
+              </a:solidFill>
+            </a:endParaRPr>
           </a:p>
         </p:txBody>
       </p:sp>
@@ -4967,15 +4576,15 @@
               </a:rPr>
               <a:t>The user can pay at the cash counter on exit, or use PayTm.</a:t>
             </a:r>
+            <a:endParaRPr lang="en-US" dirty="0">
+              <a:solidFill>
+                <a:schemeClr val="tx1"/>
+              </a:solidFill>
+            </a:endParaRPr>
           </a:p>
         </p:txBody>
       </p:sp>
     </p:spTree>
-    <p:extLst>
-      <p:ext uri="{BB962C8B-B14F-4D97-AF65-F5344CB8AC3E}">
-        <p14:creationId xmlns:p14="http://schemas.microsoft.com/office/powerpoint/2010/main" val="2696601485"/>
-      </p:ext>
-    </p:extLst>
   </p:cSld>
   <p:clrMapOvr>
     <a:masterClrMapping/>
@@ -5067,6 +4676,11 @@
               </a:rPr>
               <a:t>The user can book his parking slot when he is in queue</a:t>
             </a:r>
+            <a:endParaRPr lang="en-US" dirty="0">
+              <a:solidFill>
+                <a:schemeClr val="tx1"/>
+              </a:solidFill>
+            </a:endParaRPr>
           </a:p>
         </p:txBody>
       </p:sp>
@@ -5117,6 +4731,11 @@
               </a:rPr>
               <a:t> LIGHTING SYSTEM</a:t>
             </a:r>
+            <a:endParaRPr lang="en-US" b="1" dirty="0">
+              <a:solidFill>
+                <a:schemeClr val="tx1"/>
+              </a:solidFill>
+            </a:endParaRPr>
           </a:p>
           <a:p>
             <a:pPr algn="ctr"/>
@@ -5128,6 +4747,11 @@
               </a:rPr>
               <a:t>The color of the lights indicate the occupancy of the slot.</a:t>
             </a:r>
+            <a:endParaRPr lang="en-US" dirty="0">
+              <a:solidFill>
+                <a:schemeClr val="tx1"/>
+              </a:solidFill>
+            </a:endParaRPr>
           </a:p>
           <a:p>
             <a:pPr algn="ctr"/>
@@ -5139,6 +4763,11 @@
               </a:rPr>
               <a:t>Red-Occupied.</a:t>
             </a:r>
+            <a:endParaRPr lang="en-US" dirty="0">
+              <a:solidFill>
+                <a:schemeClr val="tx1"/>
+              </a:solidFill>
+            </a:endParaRPr>
           </a:p>
           <a:p>
             <a:pPr algn="ctr"/>
@@ -5150,6 +4779,11 @@
               </a:rPr>
               <a:t>Green-Vacant</a:t>
             </a:r>
+            <a:endParaRPr lang="en-US" dirty="0">
+              <a:solidFill>
+                <a:schemeClr val="tx1"/>
+              </a:solidFill>
+            </a:endParaRPr>
           </a:p>
         </p:txBody>
       </p:sp>
@@ -5200,6 +4834,11 @@
               </a:rPr>
               <a:t>DIMING LIGHTS </a:t>
             </a:r>
+            <a:endParaRPr lang="en-US" b="1" dirty="0">
+              <a:solidFill>
+                <a:schemeClr val="tx1"/>
+              </a:solidFill>
+            </a:endParaRPr>
           </a:p>
           <a:p>
             <a:pPr algn="ctr"/>
@@ -5211,6 +4850,11 @@
               </a:rPr>
               <a:t>When no vehicles in motion are detected(using radar sensor), the lights will dim which saves energy</a:t>
             </a:r>
+            <a:endParaRPr lang="en-US" dirty="0">
+              <a:solidFill>
+                <a:schemeClr val="tx1"/>
+              </a:solidFill>
+            </a:endParaRPr>
           </a:p>
         </p:txBody>
       </p:sp>
@@ -5265,6 +4909,11 @@
               </a:rPr>
               <a:t>PARKING ALLOCATION</a:t>
             </a:r>
+            <a:endParaRPr lang="en-US" b="1" dirty="0">
+              <a:solidFill>
+                <a:schemeClr val="tx1"/>
+              </a:solidFill>
+            </a:endParaRPr>
           </a:p>
           <a:p>
             <a:pPr algn="ctr"/>
@@ -5276,6 +4925,11 @@
               </a:rPr>
               <a:t>Every type of vehicle will have its own parking area. Electric cars will have slots with the charging segment</a:t>
             </a:r>
+            <a:endParaRPr lang="en-US" dirty="0">
+              <a:solidFill>
+                <a:schemeClr val="tx1"/>
+              </a:solidFill>
+            </a:endParaRPr>
           </a:p>
         </p:txBody>
       </p:sp>
@@ -5330,6 +4984,11 @@
               </a:rPr>
               <a:t>EASY ACCESS</a:t>
             </a:r>
+            <a:endParaRPr lang="en-US" b="1" dirty="0">
+              <a:solidFill>
+                <a:schemeClr val="tx1"/>
+              </a:solidFill>
+            </a:endParaRPr>
           </a:p>
           <a:p>
             <a:pPr algn="ctr"/>
@@ -5341,6 +5000,11 @@
               </a:rPr>
               <a:t>The user can locate his vehicle by entering the number plate details in the app and they will be provided by the shortest path</a:t>
             </a:r>
+            <a:endParaRPr lang="en-US" dirty="0">
+              <a:solidFill>
+                <a:schemeClr val="tx1"/>
+              </a:solidFill>
+            </a:endParaRPr>
           </a:p>
         </p:txBody>
       </p:sp>
@@ -5391,6 +5055,11 @@
               </a:rPr>
               <a:t>SHOWSTOPPERS</a:t>
             </a:r>
+            <a:endParaRPr lang="en-US" sz="2400" b="1" dirty="0">
+              <a:solidFill>
+                <a:schemeClr val="tx1"/>
+              </a:solidFill>
+            </a:endParaRPr>
           </a:p>
         </p:txBody>
       </p:sp>
@@ -5398,7 +5067,6 @@
         <p:nvCxnSpPr>
           <p:cNvPr id="14" name="Straight Arrow Connector 13"/>
           <p:cNvCxnSpPr>
-            <a:cxnSpLocks/>
             <a:stCxn id="12" idx="2"/>
           </p:cNvCxnSpPr>
           <p:nvPr/>
@@ -5434,7 +5102,6 @@
         <p:nvCxnSpPr>
           <p:cNvPr id="18" name="Straight Arrow Connector 17"/>
           <p:cNvCxnSpPr>
-            <a:cxnSpLocks/>
             <a:stCxn id="12" idx="4"/>
             <a:endCxn id="7" idx="3"/>
           </p:cNvCxnSpPr>
@@ -5471,7 +5138,6 @@
         <p:nvCxnSpPr>
           <p:cNvPr id="20" name="Straight Arrow Connector 19"/>
           <p:cNvCxnSpPr>
-            <a:cxnSpLocks/>
             <a:stCxn id="12" idx="5"/>
             <a:endCxn id="8" idx="3"/>
           </p:cNvCxnSpPr>
@@ -5508,7 +5174,6 @@
         <p:nvCxnSpPr>
           <p:cNvPr id="24" name="Straight Arrow Connector 23"/>
           <p:cNvCxnSpPr>
-            <a:cxnSpLocks/>
             <a:stCxn id="12" idx="6"/>
             <a:endCxn id="11" idx="2"/>
           </p:cNvCxnSpPr>
@@ -5545,7 +5210,6 @@
         <p:nvCxnSpPr>
           <p:cNvPr id="29" name="Straight Arrow Connector 28"/>
           <p:cNvCxnSpPr>
-            <a:cxnSpLocks/>
             <a:stCxn id="12" idx="3"/>
             <a:endCxn id="9" idx="3"/>
           </p:cNvCxnSpPr>
@@ -5579,11 +5243,6 @@
         </p:style>
       </p:cxnSp>
     </p:spTree>
-    <p:extLst>
-      <p:ext uri="{BB962C8B-B14F-4D97-AF65-F5344CB8AC3E}">
-        <p14:creationId xmlns:p14="http://schemas.microsoft.com/office/powerpoint/2010/main" val="898379172"/>
-      </p:ext>
-    </p:extLst>
   </p:cSld>
   <p:clrMapOvr>
     <a:masterClrMapping/>
@@ -5640,6 +5299,11 @@
               </a:rPr>
               <a:t>REGISTERED USERS BENEFITS:</a:t>
             </a:r>
+            <a:endParaRPr lang="en-US" b="1" dirty="0">
+              <a:solidFill>
+                <a:schemeClr val="bg1"/>
+              </a:solidFill>
+            </a:endParaRPr>
           </a:p>
         </p:txBody>
       </p:sp>
@@ -5666,81 +5330,86 @@
           <a:lstStyle/>
           <a:p>
             <a:pPr marL="285750" indent="-285750">
-              <a:buFont typeface="Wingdings" pitchFamily="2" charset="2"/>
+              <a:buFont typeface="Wingdings" panose="05000000000000000000" pitchFamily="2" charset="2"/>
               <a:buChar char="q"/>
             </a:pPr>
             <a:r>
               <a:rPr lang="en-US" dirty="0"/>
               <a:t>Fixed parking spot.</a:t>
             </a:r>
+            <a:endParaRPr lang="en-US" dirty="0"/>
           </a:p>
           <a:p>
             <a:pPr marL="285750" indent="-285750">
-              <a:buFont typeface="Wingdings" pitchFamily="2" charset="2"/>
+              <a:buFont typeface="Wingdings" panose="05000000000000000000" pitchFamily="2" charset="2"/>
               <a:buChar char="q"/>
             </a:pPr>
             <a:endParaRPr lang="en-US" dirty="0"/>
           </a:p>
           <a:p>
             <a:pPr marL="285750" indent="-285750">
-              <a:buFont typeface="Wingdings" pitchFamily="2" charset="2"/>
+              <a:buFont typeface="Wingdings" panose="05000000000000000000" pitchFamily="2" charset="2"/>
               <a:buChar char="q"/>
             </a:pPr>
             <a:r>
               <a:rPr lang="en-US" dirty="0"/>
               <a:t>Monthly payment. (For the time, the parking slot was used)</a:t>
             </a:r>
+            <a:endParaRPr lang="en-US" dirty="0"/>
           </a:p>
           <a:p>
             <a:pPr marL="285750" indent="-285750">
-              <a:buFont typeface="Wingdings" pitchFamily="2" charset="2"/>
+              <a:buFont typeface="Wingdings" panose="05000000000000000000" pitchFamily="2" charset="2"/>
               <a:buChar char="q"/>
             </a:pPr>
             <a:endParaRPr lang="en-US" dirty="0"/>
           </a:p>
           <a:p>
             <a:pPr marL="285750" indent="-285750">
-              <a:buFont typeface="Wingdings" pitchFamily="2" charset="2"/>
+              <a:buFont typeface="Wingdings" panose="05000000000000000000" pitchFamily="2" charset="2"/>
               <a:buChar char="q"/>
             </a:pPr>
             <a:r>
               <a:rPr lang="en-US" dirty="0"/>
               <a:t>Net banking. (Automatically money deducted).</a:t>
             </a:r>
+            <a:endParaRPr lang="en-US" dirty="0"/>
           </a:p>
           <a:p>
             <a:pPr marL="285750" indent="-285750">
-              <a:buFont typeface="Wingdings" pitchFamily="2" charset="2"/>
+              <a:buFont typeface="Wingdings" panose="05000000000000000000" pitchFamily="2" charset="2"/>
               <a:buChar char="q"/>
             </a:pPr>
             <a:endParaRPr lang="en-US" dirty="0"/>
           </a:p>
           <a:p>
             <a:pPr marL="285750" indent="-285750">
-              <a:buFont typeface="Wingdings" pitchFamily="2" charset="2"/>
+              <a:buFont typeface="Wingdings" panose="05000000000000000000" pitchFamily="2" charset="2"/>
               <a:buChar char="q"/>
             </a:pPr>
             <a:r>
               <a:rPr lang="en-US" dirty="0"/>
               <a:t>All the visit details (entry and exit time) will be visible to him at all times.</a:t>
             </a:r>
+            <a:endParaRPr lang="en-US" dirty="0"/>
           </a:p>
           <a:p>
             <a:pPr marL="285750" indent="-285750">
-              <a:buFont typeface="Wingdings" pitchFamily="2" charset="2"/>
+              <a:buFont typeface="Wingdings" panose="05000000000000000000" pitchFamily="2" charset="2"/>
               <a:buChar char="q"/>
             </a:pPr>
             <a:endParaRPr lang="en-US" dirty="0"/>
           </a:p>
           <a:p>
             <a:pPr marL="285750" indent="-285750">
-              <a:buFont typeface="Wingdings" pitchFamily="2" charset="2"/>
+              <a:buFont typeface="Wingdings" panose="05000000000000000000" pitchFamily="2" charset="2"/>
               <a:buChar char="q"/>
             </a:pPr>
             <a:r>
               <a:rPr lang="en-US" dirty="0"/>
               <a:t> If his slot gets occupied by someone else, the admin will be notified immediately.</a:t>
             </a:r>
+            <a:endParaRPr lang="en-US" dirty="0"/>
           </a:p>
         </p:txBody>
       </p:sp>
@@ -5780,6 +5449,16 @@
               </a:rPr>
               <a:t>Technology Stack</a:t>
             </a:r>
+            <a:endParaRPr lang="en-IN" sz="2400" b="1" i="1" u="sng" dirty="0">
+              <a:solidFill>
+                <a:schemeClr val="accent5">
+                  <a:lumMod val="75000"/>
+                </a:schemeClr>
+              </a:solidFill>
+              <a:latin typeface="Calibri" panose="020F0502020204030204" pitchFamily="34" charset="0"/>
+              <a:cs typeface="Calibri" panose="020F0502020204030204" pitchFamily="34" charset="0"/>
+              <a:sym typeface="+mn-ea"/>
+            </a:endParaRPr>
           </a:p>
           <a:p>
             <a:pPr marL="285750" indent="-285750">
@@ -5823,6 +5502,7 @@
               <a:rPr lang="en-IN" dirty="0"/>
               <a:t>:-Android Studio, Android SDK</a:t>
             </a:r>
+            <a:endParaRPr lang="en-IN" dirty="0"/>
           </a:p>
           <a:p>
             <a:pPr marL="285750" indent="-285750">
@@ -5860,6 +5540,10 @@
               </a:rPr>
               <a:t> and Firebase.</a:t>
             </a:r>
+            <a:endParaRPr lang="en-IN" dirty="0">
+              <a:latin typeface="Calibri" panose="020F0502020204030204" pitchFamily="34" charset="0"/>
+              <a:cs typeface="Calibri" panose="020F0502020204030204" pitchFamily="34" charset="0"/>
+            </a:endParaRPr>
           </a:p>
           <a:p>
             <a:pPr marL="285750" indent="-285750">
@@ -5961,6 +5645,13 @@
               </a:rPr>
               <a:t>Dependencies</a:t>
             </a:r>
+            <a:endParaRPr lang="en-US" sz="2400" b="1" i="1" u="sng" dirty="0">
+              <a:solidFill>
+                <a:schemeClr val="accent5">
+                  <a:lumMod val="75000"/>
+                </a:schemeClr>
+              </a:solidFill>
+            </a:endParaRPr>
           </a:p>
           <a:p>
             <a:pPr marL="285750" indent="-285750">
@@ -5979,6 +5670,9 @@
               </a:rPr>
               <a:t>Android version Jellybean and higher</a:t>
             </a:r>
+            <a:endParaRPr lang="en-IN" b="1" dirty="0">
+              <a:sym typeface="+mn-ea"/>
+            </a:endParaRPr>
           </a:p>
           <a:p>
             <a:pPr marL="285750" indent="-285750">
@@ -5996,11 +5690,6 @@
         </p:txBody>
       </p:sp>
     </p:spTree>
-    <p:extLst>
-      <p:ext uri="{BB962C8B-B14F-4D97-AF65-F5344CB8AC3E}">
-        <p14:creationId xmlns:p14="http://schemas.microsoft.com/office/powerpoint/2010/main" val="3516557925"/>
-      </p:ext>
-    </p:extLst>
   </p:cSld>
   <p:clrMapOvr>
     <a:masterClrMapping/>
@@ -6052,26 +5741,29 @@
               <a:rPr lang="en-US" b="1" dirty="0"/>
               <a:t>DATA COLLECTION</a:t>
             </a:r>
+            <a:endParaRPr lang="en-US" b="1" dirty="0"/>
           </a:p>
           <a:p>
             <a:pPr marL="285750" indent="-285750">
-              <a:buFont typeface="Wingdings" pitchFamily="2" charset="2"/>
+              <a:buFont typeface="Wingdings" panose="05000000000000000000" pitchFamily="2" charset="2"/>
               <a:buChar char="q"/>
             </a:pPr>
             <a:r>
               <a:rPr lang="en-US" dirty="0"/>
               <a:t>At the gate, the number plate and the entry-exit time is saved to the database using camera module. </a:t>
             </a:r>
+            <a:endParaRPr lang="en-US" dirty="0"/>
           </a:p>
           <a:p>
             <a:pPr marL="285750" indent="-285750">
-              <a:buFont typeface="Wingdings" pitchFamily="2" charset="2"/>
+              <a:buFont typeface="Wingdings" panose="05000000000000000000" pitchFamily="2" charset="2"/>
               <a:buChar char="q"/>
             </a:pPr>
             <a:r>
               <a:rPr lang="en-US" dirty="0"/>
               <a:t>At the parking area, which car(number plate)  is parked in which slot is also saved to the database.  </a:t>
             </a:r>
+            <a:endParaRPr lang="en-US" dirty="0"/>
           </a:p>
         </p:txBody>
       </p:sp>
@@ -6102,26 +5794,29 @@
               <a:rPr lang="en-US" b="1" dirty="0"/>
               <a:t>DATA LOCAL STORAGE</a:t>
             </a:r>
+            <a:endParaRPr lang="en-US" b="1" dirty="0"/>
           </a:p>
           <a:p>
             <a:pPr marL="285750" indent="-285750">
-              <a:buFont typeface="Wingdings" pitchFamily="2" charset="2"/>
+              <a:buFont typeface="Wingdings" panose="05000000000000000000" pitchFamily="2" charset="2"/>
               <a:buChar char="q"/>
             </a:pPr>
             <a:r>
               <a:rPr lang="en-US" dirty="0"/>
               <a:t>The images taken by the camera will be locally stored in the raspberry pi. </a:t>
             </a:r>
+            <a:endParaRPr lang="en-US" dirty="0"/>
           </a:p>
           <a:p>
             <a:pPr marL="285750" indent="-285750">
-              <a:buFont typeface="Wingdings" pitchFamily="2" charset="2"/>
+              <a:buFont typeface="Wingdings" panose="05000000000000000000" pitchFamily="2" charset="2"/>
               <a:buChar char="q"/>
             </a:pPr>
             <a:r>
               <a:rPr lang="en-US" dirty="0"/>
               <a:t>Once the data is processed, the raspberry will automatically free the data.</a:t>
             </a:r>
+            <a:endParaRPr lang="en-US" dirty="0"/>
           </a:p>
         </p:txBody>
       </p:sp>
@@ -6152,26 +5847,29 @@
               <a:rPr lang="en-US" b="1" dirty="0"/>
               <a:t>DATA PROCESSING</a:t>
             </a:r>
+            <a:endParaRPr lang="en-US" b="1" dirty="0"/>
           </a:p>
           <a:p>
             <a:pPr marL="285750" indent="-285750">
-              <a:buFont typeface="Wingdings" pitchFamily="2" charset="2"/>
+              <a:buFont typeface="Wingdings" panose="05000000000000000000" pitchFamily="2" charset="2"/>
               <a:buChar char="q"/>
             </a:pPr>
             <a:r>
               <a:rPr lang="en-US" dirty="0"/>
               <a:t>The number plate detection, motion detection, entry-exit time detection will take place. </a:t>
             </a:r>
+            <a:endParaRPr lang="en-US" dirty="0"/>
           </a:p>
           <a:p>
             <a:pPr marL="285750" indent="-285750">
-              <a:buFont typeface="Wingdings" pitchFamily="2" charset="2"/>
+              <a:buFont typeface="Wingdings" panose="05000000000000000000" pitchFamily="2" charset="2"/>
               <a:buChar char="q"/>
             </a:pPr>
             <a:r>
               <a:rPr lang="en-US" dirty="0"/>
               <a:t>The output of the processed data will be stored in the cloud. </a:t>
             </a:r>
+            <a:endParaRPr lang="en-US" dirty="0"/>
           </a:p>
         </p:txBody>
       </p:sp>
@@ -6202,16 +5900,18 @@
               <a:rPr lang="en-US" b="1" dirty="0"/>
               <a:t>DATA CLOUD STORAGE</a:t>
             </a:r>
+            <a:endParaRPr lang="en-US" b="1" dirty="0"/>
           </a:p>
           <a:p>
             <a:pPr marL="285750" indent="-285750">
-              <a:buFont typeface="Wingdings" pitchFamily="2" charset="2"/>
+              <a:buFont typeface="Wingdings" panose="05000000000000000000" pitchFamily="2" charset="2"/>
               <a:buChar char="q"/>
             </a:pPr>
             <a:r>
               <a:rPr lang="en-US" dirty="0"/>
               <a:t>The filtered output will be stored in the cloud. The data required for the android app and the website that has to be shown to the user, will be retrieved from the cloud.</a:t>
             </a:r>
+            <a:endParaRPr lang="en-US" dirty="0"/>
           </a:p>
         </p:txBody>
       </p:sp>
@@ -6242,26 +5942,29 @@
               <a:rPr lang="en-US" b="1" dirty="0"/>
               <a:t>DATA VISUALIZATION</a:t>
             </a:r>
+            <a:endParaRPr lang="en-US" b="1" dirty="0"/>
           </a:p>
           <a:p>
             <a:pPr marL="285750" indent="-285750">
-              <a:buFont typeface="Wingdings" pitchFamily="2" charset="2"/>
+              <a:buFont typeface="Wingdings" panose="05000000000000000000" pitchFamily="2" charset="2"/>
               <a:buChar char="q"/>
             </a:pPr>
             <a:r>
               <a:rPr lang="en-US" dirty="0"/>
               <a:t>The information which concerns the user will be shown in the android app and the website. </a:t>
             </a:r>
+            <a:endParaRPr lang="en-US" dirty="0"/>
           </a:p>
           <a:p>
             <a:pPr marL="285750" indent="-285750">
-              <a:buFont typeface="Wingdings" pitchFamily="2" charset="2"/>
+              <a:buFont typeface="Wingdings" panose="05000000000000000000" pitchFamily="2" charset="2"/>
               <a:buChar char="q"/>
             </a:pPr>
             <a:r>
               <a:rPr lang="en-US" dirty="0"/>
               <a:t>This information includes the map guidance, the number of available slots, etc.</a:t>
             </a:r>
+            <a:endParaRPr lang="en-US" dirty="0"/>
           </a:p>
         </p:txBody>
       </p:sp>
@@ -6274,7 +5977,7 @@
           <p:nvPr/>
         </p:nvPicPr>
         <p:blipFill>
-          <a:blip r:embed="rId2" cstate="print">
+          <a:blip r:embed="rId1" cstate="print">
             <a:extLst>
               <a:ext uri="{28A0092B-C50C-407E-A947-70E740481C1C}">
                 <a14:useLocalDpi xmlns:a14="http://schemas.microsoft.com/office/drawing/2010/main" val="0"/>
@@ -6296,11 +5999,6 @@
         </p:spPr>
       </p:pic>
     </p:spTree>
-    <p:extLst>
-      <p:ext uri="{BB962C8B-B14F-4D97-AF65-F5344CB8AC3E}">
-        <p14:creationId xmlns:p14="http://schemas.microsoft.com/office/powerpoint/2010/main" val="1853586668"/>
-      </p:ext>
-    </p:extLst>
   </p:cSld>
   <p:clrMapOvr>
     <a:masterClrMapping/>
@@ -6368,26 +6066,29 @@
               <a:rPr lang="en-US" b="1" dirty="0"/>
               <a:t>DATA COLLECTION</a:t>
             </a:r>
+            <a:endParaRPr lang="en-US" b="1" dirty="0"/>
           </a:p>
           <a:p>
             <a:pPr marL="285750" indent="-285750">
-              <a:buFont typeface="Wingdings" pitchFamily="2" charset="2"/>
+              <a:buFont typeface="Wingdings" panose="05000000000000000000" pitchFamily="2" charset="2"/>
               <a:buChar char="q"/>
             </a:pPr>
             <a:r>
               <a:rPr lang="en-US" dirty="0"/>
               <a:t>At the gate, the number plate and the entry-exit time is saved to the database using camera module. </a:t>
             </a:r>
+            <a:endParaRPr lang="en-US" dirty="0"/>
           </a:p>
           <a:p>
             <a:pPr marL="285750" indent="-285750">
-              <a:buFont typeface="Wingdings" pitchFamily="2" charset="2"/>
+              <a:buFont typeface="Wingdings" panose="05000000000000000000" pitchFamily="2" charset="2"/>
               <a:buChar char="q"/>
             </a:pPr>
             <a:r>
               <a:rPr lang="en-US" dirty="0"/>
               <a:t>At the parking area, which car(number plate)  is parked in which slot is also saved to the database.  </a:t>
             </a:r>
+            <a:endParaRPr lang="en-US" dirty="0"/>
           </a:p>
         </p:txBody>
       </p:sp>
@@ -6434,26 +6135,29 @@
               <a:rPr lang="en-US" b="1" dirty="0"/>
               <a:t>DATA LOCAL STORAGE</a:t>
             </a:r>
+            <a:endParaRPr lang="en-US" b="1" dirty="0"/>
           </a:p>
           <a:p>
             <a:pPr marL="285750" indent="-285750">
-              <a:buFont typeface="Wingdings" pitchFamily="2" charset="2"/>
+              <a:buFont typeface="Wingdings" panose="05000000000000000000" pitchFamily="2" charset="2"/>
               <a:buChar char="q"/>
             </a:pPr>
             <a:r>
               <a:rPr lang="en-US" dirty="0"/>
               <a:t>The images taken by the camera will be locally stored in the raspberry pi. </a:t>
             </a:r>
+            <a:endParaRPr lang="en-US" dirty="0"/>
           </a:p>
           <a:p>
             <a:pPr marL="285750" indent="-285750">
-              <a:buFont typeface="Wingdings" pitchFamily="2" charset="2"/>
+              <a:buFont typeface="Wingdings" panose="05000000000000000000" pitchFamily="2" charset="2"/>
               <a:buChar char="q"/>
             </a:pPr>
             <a:r>
               <a:rPr lang="en-US" dirty="0"/>
               <a:t>Once the data is processed, the raspberry will automatically free the data.</a:t>
             </a:r>
+            <a:endParaRPr lang="en-US" dirty="0"/>
           </a:p>
         </p:txBody>
       </p:sp>
@@ -6500,26 +6204,29 @@
               <a:rPr lang="en-US" b="1" dirty="0"/>
               <a:t>DATA PROCESSING</a:t>
             </a:r>
+            <a:endParaRPr lang="en-US" b="1" dirty="0"/>
           </a:p>
           <a:p>
             <a:pPr marL="285750" indent="-285750">
-              <a:buFont typeface="Wingdings" pitchFamily="2" charset="2"/>
+              <a:buFont typeface="Wingdings" panose="05000000000000000000" pitchFamily="2" charset="2"/>
               <a:buChar char="q"/>
             </a:pPr>
             <a:r>
               <a:rPr lang="en-US" dirty="0"/>
               <a:t>The number plate detection, motion detection, entry-exit time detection will take place. </a:t>
             </a:r>
+            <a:endParaRPr lang="en-US" dirty="0"/>
           </a:p>
           <a:p>
             <a:pPr marL="285750" indent="-285750">
-              <a:buFont typeface="Wingdings" pitchFamily="2" charset="2"/>
+              <a:buFont typeface="Wingdings" panose="05000000000000000000" pitchFamily="2" charset="2"/>
               <a:buChar char="q"/>
             </a:pPr>
             <a:r>
               <a:rPr lang="en-US" dirty="0"/>
               <a:t>The output of the processed data will be stored in the cloud. </a:t>
             </a:r>
+            <a:endParaRPr lang="en-US" dirty="0"/>
           </a:p>
         </p:txBody>
       </p:sp>
@@ -6566,26 +6273,29 @@
               <a:rPr lang="en-US" b="1" dirty="0"/>
               <a:t>DATA PROCESSING</a:t>
             </a:r>
+            <a:endParaRPr lang="en-US" b="1" dirty="0"/>
           </a:p>
           <a:p>
             <a:pPr marL="285750" indent="-285750">
-              <a:buFont typeface="Wingdings" pitchFamily="2" charset="2"/>
+              <a:buFont typeface="Wingdings" panose="05000000000000000000" pitchFamily="2" charset="2"/>
               <a:buChar char="q"/>
             </a:pPr>
             <a:r>
               <a:rPr lang="en-US" dirty="0"/>
               <a:t>The number plate detection, motion detection, entry-exit time detection will take place. </a:t>
             </a:r>
+            <a:endParaRPr lang="en-US" dirty="0"/>
           </a:p>
           <a:p>
             <a:pPr marL="285750" indent="-285750">
-              <a:buFont typeface="Wingdings" pitchFamily="2" charset="2"/>
+              <a:buFont typeface="Wingdings" panose="05000000000000000000" pitchFamily="2" charset="2"/>
               <a:buChar char="q"/>
             </a:pPr>
             <a:r>
               <a:rPr lang="en-US" dirty="0"/>
               <a:t>The output of the processed data will be stored in the cloud. </a:t>
             </a:r>
+            <a:endParaRPr lang="en-US" dirty="0"/>
           </a:p>
         </p:txBody>
       </p:sp>
@@ -6632,35 +6342,33 @@
               <a:rPr lang="en-US" b="1" dirty="0"/>
               <a:t>DATA VISUALIZATION</a:t>
             </a:r>
+            <a:endParaRPr lang="en-US" b="1" dirty="0"/>
           </a:p>
           <a:p>
             <a:pPr marL="285750" indent="-285750">
-              <a:buFont typeface="Wingdings" pitchFamily="2" charset="2"/>
+              <a:buFont typeface="Wingdings" panose="05000000000000000000" pitchFamily="2" charset="2"/>
               <a:buChar char="q"/>
             </a:pPr>
             <a:r>
               <a:rPr lang="en-US" dirty="0"/>
               <a:t>The information which concerns the user will be shown in the android app and the website. </a:t>
             </a:r>
+            <a:endParaRPr lang="en-US" dirty="0"/>
           </a:p>
           <a:p>
             <a:pPr marL="285750" indent="-285750">
-              <a:buFont typeface="Wingdings" pitchFamily="2" charset="2"/>
+              <a:buFont typeface="Wingdings" panose="05000000000000000000" pitchFamily="2" charset="2"/>
               <a:buChar char="q"/>
             </a:pPr>
             <a:r>
               <a:rPr lang="en-US" dirty="0"/>
               <a:t>This information includes the map guidance, the number of available slots, etc.</a:t>
             </a:r>
+            <a:endParaRPr lang="en-US" dirty="0"/>
           </a:p>
         </p:txBody>
       </p:sp>
     </p:spTree>
-    <p:extLst>
-      <p:ext uri="{BB962C8B-B14F-4D97-AF65-F5344CB8AC3E}">
-        <p14:creationId xmlns:p14="http://schemas.microsoft.com/office/powerpoint/2010/main" val="2169199557"/>
-      </p:ext>
-    </p:extLst>
   </p:cSld>
   <p:clrMapOvr>
     <a:masterClrMapping/>
@@ -6744,23 +6452,6 @@
         <a:font script="Viet" typeface="Times New Roman"/>
         <a:font script="Uigh" typeface="Microsoft Uighur"/>
         <a:font script="Geor" typeface="Sylfaen"/>
-        <a:font script="Armn" typeface="Arial"/>
-        <a:font script="Bugi" typeface="Leelawadee UI"/>
-        <a:font script="Bopo" typeface="Microsoft JhengHei"/>
-        <a:font script="Java" typeface="Javanese Text"/>
-        <a:font script="Lisu" typeface="Segoe UI"/>
-        <a:font script="Mymr" typeface="Myanmar Text"/>
-        <a:font script="Nkoo" typeface="Ebrima"/>
-        <a:font script="Olck" typeface="Nirmala UI"/>
-        <a:font script="Osma" typeface="Ebrima"/>
-        <a:font script="Phag" typeface="Phagspa"/>
-        <a:font script="Syrn" typeface="Estrangelo Edessa"/>
-        <a:font script="Syrj" typeface="Estrangelo Edessa"/>
-        <a:font script="Syre" typeface="Estrangelo Edessa"/>
-        <a:font script="Sora" typeface="Nirmala UI"/>
-        <a:font script="Tale" typeface="Microsoft Tai Le"/>
-        <a:font script="Talu" typeface="Microsoft New Tai Lue"/>
-        <a:font script="Tfng" typeface="Ebrima"/>
       </a:majorFont>
       <a:minorFont>
         <a:latin typeface="Calibri"/>
@@ -6796,23 +6487,6 @@
         <a:font script="Viet" typeface="Arial"/>
         <a:font script="Uigh" typeface="Microsoft Uighur"/>
         <a:font script="Geor" typeface="Sylfaen"/>
-        <a:font script="Armn" typeface="Arial"/>
-        <a:font script="Bugi" typeface="Leelawadee UI"/>
-        <a:font script="Bopo" typeface="Microsoft JhengHei"/>
-        <a:font script="Java" typeface="Javanese Text"/>
-        <a:font script="Lisu" typeface="Segoe UI"/>
-        <a:font script="Mymr" typeface="Myanmar Text"/>
-        <a:font script="Nkoo" typeface="Ebrima"/>
-        <a:font script="Olck" typeface="Nirmala UI"/>
-        <a:font script="Osma" typeface="Ebrima"/>
-        <a:font script="Phag" typeface="Phagspa"/>
-        <a:font script="Syrn" typeface="Estrangelo Edessa"/>
-        <a:font script="Syrj" typeface="Estrangelo Edessa"/>
-        <a:font script="Syre" typeface="Estrangelo Edessa"/>
-        <a:font script="Sora" typeface="Nirmala UI"/>
-        <a:font script="Tale" typeface="Microsoft Tai Le"/>
-        <a:font script="Talu" typeface="Microsoft New Tai Lue"/>
-        <a:font script="Tfng" typeface="Ebrima"/>
       </a:minorFont>
     </a:fontScheme>
     <a:fmtScheme name="Office">
@@ -6953,8 +6627,6 @@
       </a:bgFillStyleLst>
     </a:fmtScheme>
   </a:themeElements>
-  <a:objectDefaults/>
-  <a:extraClrSchemeLst/>
   <a:extLst>
     <a:ext uri="{05A4C25C-085E-4340-85A3-A5531E510DB2}">
       <thm15:themeFamily xmlns:thm15="http://schemas.microsoft.com/office/thememl/2012/main" name="Office Theme" id="{62F939B6-93AF-4DB8-9C6B-D6C7DFDC589F}" vid="{4A3C46E8-61CC-4603-A589-7422A47A8E4A}"/>
@@ -7243,7 +6915,10 @@
       </a:bgFillStyleLst>
     </a:fmtScheme>
   </a:themeElements>
-  <a:objectDefaults/>
-  <a:extraClrSchemeLst/>
+  <a:extLst>
+    <a:ext uri="{05A4C25C-085E-4340-85A3-A5531E510DB2}">
+      <thm15:themeFamily xmlns:thm15="http://schemas.microsoft.com/office/thememl/2012/main" name="Office Theme" id="{62F939B6-93AF-4DB8-9C6B-D6C7DFDC589F}" vid="{4A3C46E8-61CC-4603-A589-7422A47A8E4A}"/>
+    </a:ext>
+  </a:extLst>
 </a:theme>
 </file>
</xml_diff>